<commit_message>
improved report and presentation modified
</commit_message>
<xml_diff>
--- a/Presentation/Presentation.pptx
+++ b/Presentation/Presentation.pptx
@@ -13,8 +13,8 @@
     <p:sldId id="259" r:id="rId4"/>
     <p:sldId id="284" r:id="rId5"/>
     <p:sldId id="281" r:id="rId6"/>
-    <p:sldId id="282" r:id="rId7"/>
-    <p:sldId id="283" r:id="rId8"/>
+    <p:sldId id="283" r:id="rId7"/>
+    <p:sldId id="282" r:id="rId8"/>
     <p:sldId id="285" r:id="rId9"/>
     <p:sldId id="286" r:id="rId10"/>
     <p:sldId id="261" r:id="rId11"/>
@@ -1690,7 +1690,7 @@
     </p:spTree>
     <p:extLst>
       <p:ext uri="{BB962C8B-B14F-4D97-AF65-F5344CB8AC3E}">
-        <p14:creationId xmlns:p14="http://schemas.microsoft.com/office/powerpoint/2010/main" val="1700399122"/>
+        <p14:creationId xmlns:p14="http://schemas.microsoft.com/office/powerpoint/2010/main" val="2816039107"/>
       </p:ext>
     </p:extLst>
   </p:cSld>
@@ -1799,7 +1799,7 @@
     </p:spTree>
     <p:extLst>
       <p:ext uri="{BB962C8B-B14F-4D97-AF65-F5344CB8AC3E}">
-        <p14:creationId xmlns:p14="http://schemas.microsoft.com/office/powerpoint/2010/main" val="2816039107"/>
+        <p14:creationId xmlns:p14="http://schemas.microsoft.com/office/powerpoint/2010/main" val="1700399122"/>
       </p:ext>
     </p:extLst>
   </p:cSld>
@@ -23205,11 +23205,11 @@
               <a:buNone/>
             </a:pPr>
             <a:r>
-              <a:rPr lang="en"/>
+              <a:rPr lang="en" dirty="0"/>
               <a:t>We will talk about this </a:t>
             </a:r>
             <a:r>
-              <a:rPr lang="en">
+              <a:rPr lang="en" dirty="0">
                 <a:solidFill>
                   <a:schemeClr val="accent1"/>
                 </a:solidFill>
@@ -23217,10 +23217,10 @@
               <a:t>first</a:t>
             </a:r>
             <a:r>
-              <a:rPr lang="en"/>
+              <a:rPr lang="en" dirty="0"/>
               <a:t>.</a:t>
             </a:r>
-            <a:endParaRPr/>
+            <a:endParaRPr dirty="0"/>
           </a:p>
         </p:txBody>
       </p:sp>
@@ -23835,8 +23835,8 @@
         </p:nvSpPr>
         <p:spPr>
           <a:xfrm>
-            <a:off x="3506900" y="2041675"/>
-            <a:ext cx="7345500" cy="1575000"/>
+            <a:off x="3731490" y="1958191"/>
+            <a:ext cx="7345500" cy="1065746"/>
           </a:xfrm>
           <a:prstGeom prst="rect">
             <a:avLst/>
@@ -23858,18 +23858,32 @@
               <a:buNone/>
             </a:pPr>
             <a:r>
-              <a:rPr lang="en" sz="5800" dirty="0"/>
-              <a:t>DDoS Attack </a:t>
+              <a:rPr lang="en" sz="7200" dirty="0"/>
+              <a:t>DDoS </a:t>
             </a:r>
             <a:r>
-              <a:rPr lang="en" sz="6800" dirty="0">
+              <a:rPr lang="en" sz="7200" dirty="0">
                 <a:solidFill>
                   <a:schemeClr val="accent1"/>
                 </a:solidFill>
+                <a:latin typeface="Roboto" panose="02000000000000000000" pitchFamily="2" charset="0"/>
+                <a:ea typeface="Roboto" panose="02000000000000000000" pitchFamily="2" charset="0"/>
+                <a:cs typeface="Roboto" panose="02000000000000000000" pitchFamily="2" charset="0"/>
+                <a:sym typeface="Roboto Mono"/>
               </a:rPr>
-              <a:t>vectors</a:t>
+              <a:t>Attack </a:t>
             </a:r>
-            <a:endParaRPr sz="5800" dirty="0"/>
+            <a:r>
+              <a:rPr lang="en" sz="7200" dirty="0">
+                <a:sym typeface="Roboto Mono"/>
+              </a:rPr>
+              <a:t>Types</a:t>
+            </a:r>
+            <a:r>
+              <a:rPr lang="en" sz="7200" dirty="0"/>
+              <a:t> </a:t>
+            </a:r>
+            <a:endParaRPr sz="7200" dirty="0"/>
           </a:p>
         </p:txBody>
       </p:sp>
@@ -23982,7 +23996,7 @@
               </a:spcAft>
               <a:buNone/>
             </a:pPr>
-            <a:endParaRPr sz="1800" b="0" i="0" u="none" strike="noStrike" cap="none">
+            <a:endParaRPr sz="1800" b="0" i="0" u="none" strike="noStrike" cap="none" dirty="0">
               <a:solidFill>
                 <a:srgbClr val="FFFFFF"/>
               </a:solidFill>
@@ -24007,8 +24021,8 @@
         </p:blipFill>
         <p:spPr>
           <a:xfrm>
-            <a:off x="5755821" y="2560397"/>
-            <a:ext cx="6025243" cy="3154603"/>
+            <a:off x="5233160" y="2829017"/>
+            <a:ext cx="6331240" cy="3409353"/>
           </a:xfrm>
           <a:prstGeom prst="roundRect">
             <a:avLst>
@@ -24036,7 +24050,7 @@
         </p:nvGrpSpPr>
         <p:grpSpPr>
           <a:xfrm>
-            <a:off x="5985670" y="2668969"/>
+            <a:off x="5367912" y="2938266"/>
             <a:ext cx="693284" cy="168491"/>
             <a:chOff x="2147366" y="4139382"/>
             <a:chExt cx="635280" cy="147600"/>
@@ -24364,7 +24378,7 @@
         </p:nvSpPr>
         <p:spPr>
           <a:xfrm>
-            <a:off x="1203692" y="1273347"/>
+            <a:off x="1024686" y="1235533"/>
             <a:ext cx="7794000" cy="763500"/>
           </a:xfrm>
           <a:prstGeom prst="rect">
@@ -24422,7 +24436,7 @@
         </p:nvSpPr>
         <p:spPr>
           <a:xfrm>
-            <a:off x="1172286" y="2362802"/>
+            <a:off x="1455197" y="2946099"/>
             <a:ext cx="3746557" cy="612334"/>
           </a:xfrm>
           <a:prstGeom prst="rect">
@@ -24747,7 +24761,7 @@
         </p:nvSpPr>
         <p:spPr>
           <a:xfrm>
-            <a:off x="1203692" y="2975135"/>
+            <a:off x="1486603" y="3558432"/>
             <a:ext cx="3746557" cy="2218835"/>
           </a:xfrm>
           <a:prstGeom prst="rect">
@@ -25045,19 +25059,6 @@
                 <a:latin typeface="Roboto Mono" pitchFamily="49" charset="0"/>
                 <a:ea typeface="Roboto Mono" pitchFamily="49" charset="0"/>
               </a:rPr>
-              <a:t>DNS Water Torture</a:t>
-            </a:r>
-          </a:p>
-          <a:p>
-            <a:pPr marL="285750" indent="-285750"/>
-            <a:r>
-              <a:rPr lang="it-IT" dirty="0">
-                <a:solidFill>
-                  <a:schemeClr val="bg2"/>
-                </a:solidFill>
-                <a:latin typeface="Roboto Mono" pitchFamily="49" charset="0"/>
-                <a:ea typeface="Roboto Mono" pitchFamily="49" charset="0"/>
-              </a:rPr>
               <a:t>DNS </a:t>
             </a:r>
             <a:r>
@@ -25109,98 +25110,299 @@
                 <a:ea typeface="Roboto Mono" pitchFamily="49" charset="0"/>
               </a:rPr>
             </a:br>
-            <a:r>
-              <a:rPr lang="it-IT" dirty="0">
-                <a:solidFill>
-                  <a:schemeClr val="bg2"/>
-                </a:solidFill>
-                <a:latin typeface="Roboto Mono" pitchFamily="49" charset="0"/>
-                <a:ea typeface="Roboto Mono" pitchFamily="49" charset="0"/>
-              </a:rPr>
-              <a:t>(</a:t>
-            </a:r>
-            <a:r>
-              <a:rPr lang="it-IT" dirty="0" err="1">
-                <a:solidFill>
-                  <a:schemeClr val="bg2"/>
-                </a:solidFill>
-                <a:latin typeface="Roboto Mono" pitchFamily="49" charset="0"/>
-                <a:ea typeface="Roboto Mono" pitchFamily="49" charset="0"/>
-              </a:rPr>
-              <a:t>Most</a:t>
-            </a:r>
-            <a:r>
-              <a:rPr lang="it-IT" dirty="0">
-                <a:solidFill>
-                  <a:schemeClr val="bg2"/>
-                </a:solidFill>
-                <a:latin typeface="Roboto Mono" pitchFamily="49" charset="0"/>
-                <a:ea typeface="Roboto Mono" pitchFamily="49" charset="0"/>
-              </a:rPr>
-              <a:t> </a:t>
-            </a:r>
-            <a:r>
-              <a:rPr lang="it-IT" dirty="0" err="1">
-                <a:solidFill>
-                  <a:schemeClr val="bg2"/>
-                </a:solidFill>
-                <a:latin typeface="Roboto Mono" pitchFamily="49" charset="0"/>
-                <a:ea typeface="Roboto Mono" pitchFamily="49" charset="0"/>
-              </a:rPr>
-              <a:t>used</a:t>
-            </a:r>
-            <a:r>
-              <a:rPr lang="it-IT" dirty="0">
-                <a:solidFill>
-                  <a:schemeClr val="bg2"/>
-                </a:solidFill>
-                <a:latin typeface="Roboto Mono" pitchFamily="49" charset="0"/>
-                <a:ea typeface="Roboto Mono" pitchFamily="49" charset="0"/>
-              </a:rPr>
-              <a:t>)</a:t>
-            </a:r>
+            <a:endParaRPr lang="it-IT" dirty="0">
+              <a:solidFill>
+                <a:schemeClr val="bg2"/>
+              </a:solidFill>
+              <a:latin typeface="Roboto Mono" pitchFamily="49" charset="0"/>
+              <a:ea typeface="Roboto Mono" pitchFamily="49" charset="0"/>
+            </a:endParaRPr>
           </a:p>
         </p:txBody>
       </p:sp>
       <p:sp>
         <p:nvSpPr>
-          <p:cNvPr id="9" name="Google Shape;418;p26">
+          <p:cNvPr id="3" name="Google Shape;418;p26">
             <a:extLst>
               <a:ext uri="{FF2B5EF4-FFF2-40B4-BE49-F238E27FC236}">
-                <a16:creationId xmlns:a16="http://schemas.microsoft.com/office/drawing/2014/main" id="{04BDD9DA-9D32-A5F1-399F-CE3143FE45D0}"/>
+                <a16:creationId xmlns:a16="http://schemas.microsoft.com/office/drawing/2014/main" id="{4ED45DBB-ED7C-A20E-CFC7-B48152D5951B}"/>
               </a:ext>
             </a:extLst>
           </p:cNvPr>
           <p:cNvSpPr txBox="1">
-            <a:spLocks noGrp="1"/>
+            <a:spLocks/>
           </p:cNvSpPr>
-          <p:nvPr>
-            <p:ph type="subTitle" idx="1"/>
-          </p:nvPr>
+          <p:nvPr/>
         </p:nvSpPr>
         <p:spPr>
           <a:xfrm>
-            <a:off x="7130993" y="1939672"/>
-            <a:ext cx="5061007" cy="717900"/>
+            <a:off x="780846" y="2031984"/>
+            <a:ext cx="6711002" cy="717900"/>
           </a:xfrm>
           <a:prstGeom prst="rect">
             <a:avLst/>
           </a:prstGeom>
+          <a:noFill/>
+          <a:ln>
+            <a:noFill/>
+          </a:ln>
         </p:spPr>
         <p:txBody>
           <a:bodyPr spcFirstLastPara="1" wrap="square" lIns="121900" tIns="121900" rIns="121900" bIns="121900" anchor="t" anchorCtr="0">
             <a:noAutofit/>
           </a:bodyPr>
-          <a:lstStyle/>
+          <a:lstStyle>
+            <a:defPPr marR="0" lvl="0" algn="l" rtl="0">
+              <a:lnSpc>
+                <a:spcPct val="100000"/>
+              </a:lnSpc>
+              <a:spcBef>
+                <a:spcPts val="0"/>
+              </a:spcBef>
+              <a:spcAft>
+                <a:spcPts val="0"/>
+              </a:spcAft>
+            </a:defPPr>
+            <a:lvl1pPr marL="457200" marR="0" lvl="0" indent="-342900" algn="l" rtl="0">
+              <a:lnSpc>
+                <a:spcPct val="115000"/>
+              </a:lnSpc>
+              <a:spcBef>
+                <a:spcPts val="0"/>
+              </a:spcBef>
+              <a:spcAft>
+                <a:spcPts val="0"/>
+              </a:spcAft>
+              <a:buClr>
+                <a:schemeClr val="dk2"/>
+              </a:buClr>
+              <a:buSzPts val="1800"/>
+              <a:buFont typeface="Roboto Mono"/>
+              <a:buNone/>
+              <a:defRPr sz="1800" b="0" i="0" u="none" strike="noStrike" cap="none">
+                <a:solidFill>
+                  <a:schemeClr val="dk2"/>
+                </a:solidFill>
+                <a:latin typeface="Roboto Mono"/>
+                <a:ea typeface="Roboto Mono"/>
+                <a:cs typeface="Roboto Mono"/>
+                <a:sym typeface="Roboto Mono"/>
+              </a:defRPr>
+            </a:lvl1pPr>
+            <a:lvl2pPr marL="914400" marR="0" lvl="1" indent="-342900" algn="l" rtl="0">
+              <a:lnSpc>
+                <a:spcPct val="115000"/>
+              </a:lnSpc>
+              <a:spcBef>
+                <a:spcPts val="2100"/>
+              </a:spcBef>
+              <a:spcAft>
+                <a:spcPts val="0"/>
+              </a:spcAft>
+              <a:buClr>
+                <a:schemeClr val="dk2"/>
+              </a:buClr>
+              <a:buSzPts val="1800"/>
+              <a:buFont typeface="Roboto Mono"/>
+              <a:buNone/>
+              <a:defRPr sz="1800" b="0" i="0" u="none" strike="noStrike" cap="none">
+                <a:solidFill>
+                  <a:schemeClr val="dk2"/>
+                </a:solidFill>
+                <a:latin typeface="Roboto Mono"/>
+                <a:ea typeface="Roboto Mono"/>
+                <a:cs typeface="Roboto Mono"/>
+                <a:sym typeface="Roboto Mono"/>
+              </a:defRPr>
+            </a:lvl2pPr>
+            <a:lvl3pPr marL="1371600" marR="0" lvl="2" indent="-342900" algn="l" rtl="0">
+              <a:lnSpc>
+                <a:spcPct val="115000"/>
+              </a:lnSpc>
+              <a:spcBef>
+                <a:spcPts val="2100"/>
+              </a:spcBef>
+              <a:spcAft>
+                <a:spcPts val="0"/>
+              </a:spcAft>
+              <a:buClr>
+                <a:schemeClr val="dk2"/>
+              </a:buClr>
+              <a:buSzPts val="1800"/>
+              <a:buFont typeface="Roboto Mono"/>
+              <a:buNone/>
+              <a:defRPr sz="1800" b="0" i="0" u="none" strike="noStrike" cap="none">
+                <a:solidFill>
+                  <a:schemeClr val="dk2"/>
+                </a:solidFill>
+                <a:latin typeface="Roboto Mono"/>
+                <a:ea typeface="Roboto Mono"/>
+                <a:cs typeface="Roboto Mono"/>
+                <a:sym typeface="Roboto Mono"/>
+              </a:defRPr>
+            </a:lvl3pPr>
+            <a:lvl4pPr marL="1828800" marR="0" lvl="3" indent="-342900" algn="l" rtl="0">
+              <a:lnSpc>
+                <a:spcPct val="115000"/>
+              </a:lnSpc>
+              <a:spcBef>
+                <a:spcPts val="2100"/>
+              </a:spcBef>
+              <a:spcAft>
+                <a:spcPts val="0"/>
+              </a:spcAft>
+              <a:buClr>
+                <a:schemeClr val="dk2"/>
+              </a:buClr>
+              <a:buSzPts val="1800"/>
+              <a:buFont typeface="Roboto Mono"/>
+              <a:buNone/>
+              <a:defRPr sz="1800" b="0" i="0" u="none" strike="noStrike" cap="none">
+                <a:solidFill>
+                  <a:schemeClr val="dk2"/>
+                </a:solidFill>
+                <a:latin typeface="Roboto Mono"/>
+                <a:ea typeface="Roboto Mono"/>
+                <a:cs typeface="Roboto Mono"/>
+                <a:sym typeface="Roboto Mono"/>
+              </a:defRPr>
+            </a:lvl4pPr>
+            <a:lvl5pPr marL="2286000" marR="0" lvl="4" indent="-342900" algn="l" rtl="0">
+              <a:lnSpc>
+                <a:spcPct val="115000"/>
+              </a:lnSpc>
+              <a:spcBef>
+                <a:spcPts val="2100"/>
+              </a:spcBef>
+              <a:spcAft>
+                <a:spcPts val="0"/>
+              </a:spcAft>
+              <a:buClr>
+                <a:schemeClr val="dk2"/>
+              </a:buClr>
+              <a:buSzPts val="1800"/>
+              <a:buFont typeface="Roboto Mono"/>
+              <a:buNone/>
+              <a:defRPr sz="1800" b="0" i="0" u="none" strike="noStrike" cap="none">
+                <a:solidFill>
+                  <a:schemeClr val="dk2"/>
+                </a:solidFill>
+                <a:latin typeface="Roboto Mono"/>
+                <a:ea typeface="Roboto Mono"/>
+                <a:cs typeface="Roboto Mono"/>
+                <a:sym typeface="Roboto Mono"/>
+              </a:defRPr>
+            </a:lvl5pPr>
+            <a:lvl6pPr marL="2743200" marR="0" lvl="5" indent="-342900" algn="l" rtl="0">
+              <a:lnSpc>
+                <a:spcPct val="115000"/>
+              </a:lnSpc>
+              <a:spcBef>
+                <a:spcPts val="2100"/>
+              </a:spcBef>
+              <a:spcAft>
+                <a:spcPts val="0"/>
+              </a:spcAft>
+              <a:buClr>
+                <a:schemeClr val="dk2"/>
+              </a:buClr>
+              <a:buSzPts val="1800"/>
+              <a:buFont typeface="Roboto Mono"/>
+              <a:buNone/>
+              <a:defRPr sz="1800" b="0" i="0" u="none" strike="noStrike" cap="none">
+                <a:solidFill>
+                  <a:schemeClr val="dk2"/>
+                </a:solidFill>
+                <a:latin typeface="Roboto Mono"/>
+                <a:ea typeface="Roboto Mono"/>
+                <a:cs typeface="Roboto Mono"/>
+                <a:sym typeface="Roboto Mono"/>
+              </a:defRPr>
+            </a:lvl6pPr>
+            <a:lvl7pPr marL="3200400" marR="0" lvl="6" indent="-342900" algn="l" rtl="0">
+              <a:lnSpc>
+                <a:spcPct val="115000"/>
+              </a:lnSpc>
+              <a:spcBef>
+                <a:spcPts val="2100"/>
+              </a:spcBef>
+              <a:spcAft>
+                <a:spcPts val="0"/>
+              </a:spcAft>
+              <a:buClr>
+                <a:schemeClr val="dk2"/>
+              </a:buClr>
+              <a:buSzPts val="1800"/>
+              <a:buFont typeface="Roboto Mono"/>
+              <a:buNone/>
+              <a:defRPr sz="1800" b="0" i="0" u="none" strike="noStrike" cap="none">
+                <a:solidFill>
+                  <a:schemeClr val="dk2"/>
+                </a:solidFill>
+                <a:latin typeface="Roboto Mono"/>
+                <a:ea typeface="Roboto Mono"/>
+                <a:cs typeface="Roboto Mono"/>
+                <a:sym typeface="Roboto Mono"/>
+              </a:defRPr>
+            </a:lvl7pPr>
+            <a:lvl8pPr marL="3657600" marR="0" lvl="7" indent="-342900" algn="l" rtl="0">
+              <a:lnSpc>
+                <a:spcPct val="115000"/>
+              </a:lnSpc>
+              <a:spcBef>
+                <a:spcPts val="2100"/>
+              </a:spcBef>
+              <a:spcAft>
+                <a:spcPts val="0"/>
+              </a:spcAft>
+              <a:buClr>
+                <a:schemeClr val="dk2"/>
+              </a:buClr>
+              <a:buSzPts val="1800"/>
+              <a:buFont typeface="Roboto Mono"/>
+              <a:buNone/>
+              <a:defRPr sz="1800" b="0" i="0" u="none" strike="noStrike" cap="none">
+                <a:solidFill>
+                  <a:schemeClr val="dk2"/>
+                </a:solidFill>
+                <a:latin typeface="Roboto Mono"/>
+                <a:ea typeface="Roboto Mono"/>
+                <a:cs typeface="Roboto Mono"/>
+                <a:sym typeface="Roboto Mono"/>
+              </a:defRPr>
+            </a:lvl8pPr>
+            <a:lvl9pPr marL="4114800" marR="0" lvl="8" indent="-342900" algn="l" rtl="0">
+              <a:lnSpc>
+                <a:spcPct val="115000"/>
+              </a:lnSpc>
+              <a:spcBef>
+                <a:spcPts val="2100"/>
+              </a:spcBef>
+              <a:spcAft>
+                <a:spcPts val="2100"/>
+              </a:spcAft>
+              <a:buClr>
+                <a:schemeClr val="dk2"/>
+              </a:buClr>
+              <a:buSzPts val="1800"/>
+              <a:buFont typeface="Roboto Mono"/>
+              <a:buNone/>
+              <a:defRPr sz="1800" b="0" i="0" u="none" strike="noStrike" cap="none">
+                <a:solidFill>
+                  <a:schemeClr val="dk2"/>
+                </a:solidFill>
+                <a:latin typeface="Roboto Mono"/>
+                <a:ea typeface="Roboto Mono"/>
+                <a:cs typeface="Roboto Mono"/>
+                <a:sym typeface="Roboto Mono"/>
+              </a:defRPr>
+            </a:lvl9pPr>
+          </a:lstStyle>
           <a:p>
-            <a:pPr marL="0" lvl="0" indent="0" algn="ctr" rtl="0">
-              <a:spcBef>
-                <a:spcPts val="0"/>
-              </a:spcBef>
-              <a:spcAft>
-                <a:spcPts val="2100"/>
-              </a:spcAft>
-              <a:buNone/>
+            <a:pPr marL="0" indent="0" algn="ctr">
+              <a:spcAft>
+                <a:spcPts val="2100"/>
+              </a:spcAft>
             </a:pPr>
             <a:r>
               <a:rPr lang="en" b="0" dirty="0">
@@ -25212,7 +25414,43 @@
             </a:r>
             <a:r>
               <a:rPr lang="en" b="0" dirty="0"/>
-              <a:t> DDoS vectors </a:t>
+              <a:t> </a:t>
+            </a:r>
+            <a:r>
+              <a:rPr lang="it-IT" dirty="0"/>
+              <a:t>1/3 of </a:t>
+            </a:r>
+            <a:r>
+              <a:rPr lang="it-IT" dirty="0" err="1"/>
+              <a:t>all</a:t>
+            </a:r>
+            <a:r>
+              <a:rPr lang="it-IT" dirty="0"/>
+              <a:t> </a:t>
+            </a:r>
+            <a:r>
+              <a:rPr lang="it-IT" dirty="0" err="1"/>
+              <a:t>DDoS</a:t>
+            </a:r>
+            <a:r>
+              <a:rPr lang="it-IT" dirty="0"/>
+              <a:t> </a:t>
+            </a:r>
+            <a:r>
+              <a:rPr lang="it-IT" dirty="0" err="1"/>
+              <a:t>attacks</a:t>
+            </a:r>
+            <a:r>
+              <a:rPr lang="it-IT" dirty="0"/>
+              <a:t> are DNS-</a:t>
+            </a:r>
+            <a:r>
+              <a:rPr lang="it-IT" dirty="0" err="1"/>
+              <a:t>based</a:t>
+            </a:r>
+            <a:r>
+              <a:rPr lang="it-IT" dirty="0"/>
+              <a:t>. </a:t>
             </a:r>
             <a:r>
               <a:rPr lang="en" b="0" dirty="0">
@@ -25220,13 +25458,13 @@
                   <a:schemeClr val="accent3"/>
                 </a:solidFill>
               </a:rPr>
-              <a:t>&lt;/p&gt;</a:t>
+              <a:t>&lt;p&gt;</a:t>
             </a:r>
-            <a:endParaRPr b="0" dirty="0">
-              <a:solidFill>
-                <a:schemeClr val="accent3"/>
-              </a:solidFill>
-            </a:endParaRPr>
+            <a:r>
+              <a:rPr lang="en" b="0" dirty="0"/>
+              <a:t> </a:t>
+            </a:r>
+            <a:endParaRPr lang="it-IT" dirty="0"/>
           </a:p>
         </p:txBody>
       </p:sp>
@@ -25373,7 +25611,7 @@
         </p:nvSpPr>
         <p:spPr>
           <a:xfrm>
-            <a:off x="1081965" y="2939740"/>
+            <a:off x="1081963" y="2785840"/>
             <a:ext cx="7794000" cy="717900"/>
           </a:xfrm>
           <a:prstGeom prst="rect">
@@ -25642,7 +25880,7 @@
             </a:r>
             <a:r>
               <a:rPr lang="en-US" b="0" dirty="0"/>
-              <a:t>Exhausting recursive target’s resources</a:t>
+              <a:t>Exhausting target’s resources</a:t>
             </a:r>
             <a:endParaRPr lang="en-US" dirty="0"/>
           </a:p>
@@ -25664,7 +25902,7 @@
         </p:nvSpPr>
         <p:spPr>
           <a:xfrm>
-            <a:off x="1081964" y="3549340"/>
+            <a:off x="1081962" y="3395440"/>
             <a:ext cx="8813151" cy="717900"/>
           </a:xfrm>
           <a:prstGeom prst="rect">
@@ -25955,7 +26193,7 @@
         </p:nvSpPr>
         <p:spPr>
           <a:xfrm>
-            <a:off x="1081963" y="4177675"/>
+            <a:off x="1081961" y="4023775"/>
             <a:ext cx="8813151" cy="717900"/>
           </a:xfrm>
           <a:prstGeom prst="rect">
@@ -26220,13 +26458,127 @@
           <a:p>
             <a:r>
               <a:rPr lang="en-US" dirty="0"/>
-              <a:t>Trick: </a:t>
+              <a:t>Target: </a:t>
             </a:r>
             <a:r>
               <a:rPr lang="en-US" b="0" dirty="0"/>
-              <a:t>DNS queries not already cached</a:t>
+              <a:t>Recursive server or Authoritative server</a:t>
             </a:r>
             <a:endParaRPr lang="en-US" dirty="0"/>
+          </a:p>
+        </p:txBody>
+      </p:sp>
+      <p:sp>
+        <p:nvSpPr>
+          <p:cNvPr id="4" name="CasellaDiTesto 3">
+            <a:extLst>
+              <a:ext uri="{FF2B5EF4-FFF2-40B4-BE49-F238E27FC236}">
+                <a16:creationId xmlns:a16="http://schemas.microsoft.com/office/drawing/2014/main" id="{A16F71F5-F9AB-271D-3DEB-335341EE881E}"/>
+              </a:ext>
+            </a:extLst>
+          </p:cNvPr>
+          <p:cNvSpPr txBox="1"/>
+          <p:nvPr/>
+        </p:nvSpPr>
+        <p:spPr>
+          <a:xfrm>
+            <a:off x="1943098" y="4898083"/>
+            <a:ext cx="4794584" cy="338554"/>
+          </a:xfrm>
+          <a:prstGeom prst="rect">
+            <a:avLst/>
+          </a:prstGeom>
+          <a:noFill/>
+        </p:spPr>
+        <p:txBody>
+          <a:bodyPr wrap="square">
+            <a:spAutoFit/>
+          </a:bodyPr>
+          <a:lstStyle/>
+          <a:p>
+            <a:r>
+              <a:rPr lang="en-US" sz="1600" b="1" dirty="0">
+                <a:solidFill>
+                  <a:schemeClr val="bg2"/>
+                </a:solidFill>
+                <a:latin typeface="Roboto Mono" pitchFamily="49" charset="0"/>
+                <a:ea typeface="Roboto Mono" pitchFamily="49" charset="0"/>
+              </a:rPr>
+              <a:t>Trick:</a:t>
+            </a:r>
+            <a:r>
+              <a:rPr lang="en-US" sz="1600" dirty="0">
+                <a:solidFill>
+                  <a:schemeClr val="bg2"/>
+                </a:solidFill>
+                <a:latin typeface="Roboto Mono" pitchFamily="49" charset="0"/>
+                <a:ea typeface="Roboto Mono" pitchFamily="49" charset="0"/>
+              </a:rPr>
+              <a:t> </a:t>
+            </a:r>
+            <a:r>
+              <a:rPr lang="en-US" sz="1600" b="0" dirty="0">
+                <a:solidFill>
+                  <a:schemeClr val="bg2"/>
+                </a:solidFill>
+                <a:latin typeface="Roboto Mono" pitchFamily="49" charset="0"/>
+                <a:ea typeface="Roboto Mono" pitchFamily="49" charset="0"/>
+              </a:rPr>
+              <a:t>DNS queries not already cached </a:t>
+            </a:r>
+            <a:endParaRPr lang="en-US" sz="1600" dirty="0">
+              <a:solidFill>
+                <a:schemeClr val="bg2"/>
+              </a:solidFill>
+              <a:latin typeface="Roboto Mono" pitchFamily="49" charset="0"/>
+              <a:ea typeface="Roboto Mono" pitchFamily="49" charset="0"/>
+            </a:endParaRPr>
+          </a:p>
+        </p:txBody>
+      </p:sp>
+      <p:sp>
+        <p:nvSpPr>
+          <p:cNvPr id="7" name="Freccia giù 6">
+            <a:extLst>
+              <a:ext uri="{FF2B5EF4-FFF2-40B4-BE49-F238E27FC236}">
+                <a16:creationId xmlns:a16="http://schemas.microsoft.com/office/drawing/2014/main" id="{78C3EC2E-CD83-8573-3893-A575674FECD2}"/>
+              </a:ext>
+            </a:extLst>
+          </p:cNvPr>
+          <p:cNvSpPr/>
+          <p:nvPr/>
+        </p:nvSpPr>
+        <p:spPr>
+          <a:xfrm>
+            <a:off x="4042609" y="4601245"/>
+            <a:ext cx="240631" cy="280860"/>
+          </a:xfrm>
+          <a:prstGeom prst="downArrow">
+            <a:avLst/>
+          </a:prstGeom>
+        </p:spPr>
+        <p:style>
+          <a:lnRef idx="2">
+            <a:schemeClr val="accent1">
+              <a:shade val="15000"/>
+            </a:schemeClr>
+          </a:lnRef>
+          <a:fillRef idx="1">
+            <a:schemeClr val="accent1"/>
+          </a:fillRef>
+          <a:effectRef idx="0">
+            <a:schemeClr val="accent1"/>
+          </a:effectRef>
+          <a:fontRef idx="minor">
+            <a:schemeClr val="lt1"/>
+          </a:fontRef>
+        </p:style>
+        <p:txBody>
+          <a:bodyPr rtlCol="0" anchor="ctr"/>
+          <a:lstStyle/>
+          <a:p>
+            <a:pPr algn="ctr"/>
+            <a:endParaRPr lang="en-US"/>
           </a:p>
         </p:txBody>
       </p:sp>
@@ -26244,709 +26596,6 @@
 </file>
 
 <file path=ppt/slides/slide6.xml><?xml version="1.0" encoding="utf-8"?>
-<p:sld xmlns:a="http://schemas.openxmlformats.org/drawingml/2006/main" xmlns:r="http://schemas.openxmlformats.org/officeDocument/2006/relationships" xmlns:p="http://schemas.openxmlformats.org/presentationml/2006/main">
-  <p:cSld>
-    <p:spTree>
-      <p:nvGrpSpPr>
-        <p:cNvPr id="1" name="Shape 416"/>
-        <p:cNvGrpSpPr/>
-        <p:nvPr/>
-      </p:nvGrpSpPr>
-      <p:grpSpPr>
-        <a:xfrm>
-          <a:off x="0" y="0"/>
-          <a:ext cx="0" cy="0"/>
-          <a:chOff x="0" y="0"/>
-          <a:chExt cx="0" cy="0"/>
-        </a:xfrm>
-      </p:grpSpPr>
-      <p:sp>
-        <p:nvSpPr>
-          <p:cNvPr id="417" name="Google Shape;417;p26"/>
-          <p:cNvSpPr txBox="1">
-            <a:spLocks noGrp="1"/>
-          </p:cNvSpPr>
-          <p:nvPr>
-            <p:ph type="title"/>
-          </p:nvPr>
-        </p:nvSpPr>
-        <p:spPr>
-          <a:xfrm>
-            <a:off x="1168343" y="1171885"/>
-            <a:ext cx="7794000" cy="763500"/>
-          </a:xfrm>
-          <a:prstGeom prst="rect">
-            <a:avLst/>
-          </a:prstGeom>
-        </p:spPr>
-        <p:txBody>
-          <a:bodyPr spcFirstLastPara="1" wrap="square" lIns="121900" tIns="121900" rIns="121900" bIns="121900" anchor="t" anchorCtr="0">
-            <a:noAutofit/>
-          </a:bodyPr>
-          <a:lstStyle/>
-          <a:p>
-            <a:pPr marL="0" lvl="0" indent="0" algn="l" rtl="0">
-              <a:spcBef>
-                <a:spcPts val="0"/>
-              </a:spcBef>
-              <a:spcAft>
-                <a:spcPts val="0"/>
-              </a:spcAft>
-              <a:buNone/>
-            </a:pPr>
-            <a:r>
-              <a:rPr lang="en" sz="4800" dirty="0">
-                <a:solidFill>
-                  <a:schemeClr val="accent3"/>
-                </a:solidFill>
-              </a:rPr>
-              <a:t>TCP </a:t>
-            </a:r>
-            <a:r>
-              <a:rPr lang="en" sz="4800" dirty="0">
-                <a:solidFill>
-                  <a:schemeClr val="tx1"/>
-                </a:solidFill>
-              </a:rPr>
-              <a:t>Flood</a:t>
-            </a:r>
-            <a:endParaRPr sz="4800" dirty="0">
-              <a:solidFill>
-                <a:schemeClr val="tx1"/>
-              </a:solidFill>
-            </a:endParaRPr>
-          </a:p>
-        </p:txBody>
-      </p:sp>
-      <p:sp>
-        <p:nvSpPr>
-          <p:cNvPr id="5" name="Sottotitolo 4">
-            <a:extLst>
-              <a:ext uri="{FF2B5EF4-FFF2-40B4-BE49-F238E27FC236}">
-                <a16:creationId xmlns:a16="http://schemas.microsoft.com/office/drawing/2014/main" id="{DDBA7A11-5B52-0490-B253-CDF84CFFB8BF}"/>
-              </a:ext>
-            </a:extLst>
-          </p:cNvPr>
-          <p:cNvSpPr>
-            <a:spLocks noGrp="1"/>
-          </p:cNvSpPr>
-          <p:nvPr>
-            <p:ph type="subTitle" idx="1"/>
-          </p:nvPr>
-        </p:nvSpPr>
-        <p:spPr>
-          <a:xfrm>
-            <a:off x="1081963" y="2022448"/>
-            <a:ext cx="7794000" cy="717900"/>
-          </a:xfrm>
-        </p:spPr>
-        <p:txBody>
-          <a:bodyPr/>
-          <a:lstStyle/>
-          <a:p>
-            <a:r>
-              <a:rPr lang="en-US" sz="2400" dirty="0"/>
-              <a:t>Specifics</a:t>
-            </a:r>
-          </a:p>
-        </p:txBody>
-      </p:sp>
-      <p:sp>
-        <p:nvSpPr>
-          <p:cNvPr id="8" name="Sottotitolo 4">
-            <a:extLst>
-              <a:ext uri="{FF2B5EF4-FFF2-40B4-BE49-F238E27FC236}">
-                <a16:creationId xmlns:a16="http://schemas.microsoft.com/office/drawing/2014/main" id="{F5FBD590-2AD0-651F-7E1C-659576E94810}"/>
-              </a:ext>
-            </a:extLst>
-          </p:cNvPr>
-          <p:cNvSpPr txBox="1">
-            <a:spLocks/>
-          </p:cNvSpPr>
-          <p:nvPr/>
-        </p:nvSpPr>
-        <p:spPr>
-          <a:xfrm>
-            <a:off x="1081964" y="3209161"/>
-            <a:ext cx="7794000" cy="717900"/>
-          </a:xfrm>
-          <a:prstGeom prst="rect">
-            <a:avLst/>
-          </a:prstGeom>
-          <a:noFill/>
-          <a:ln>
-            <a:noFill/>
-          </a:ln>
-        </p:spPr>
-        <p:txBody>
-          <a:bodyPr spcFirstLastPara="1" wrap="square" lIns="121900" tIns="121900" rIns="121900" bIns="121900" anchor="t" anchorCtr="0">
-            <a:noAutofit/>
-          </a:bodyPr>
-          <a:lstStyle>
-            <a:defPPr marR="0" lvl="0" algn="l" rtl="0">
-              <a:lnSpc>
-                <a:spcPct val="100000"/>
-              </a:lnSpc>
-              <a:spcBef>
-                <a:spcPts val="0"/>
-              </a:spcBef>
-              <a:spcAft>
-                <a:spcPts val="0"/>
-              </a:spcAft>
-            </a:defPPr>
-            <a:lvl1pPr marL="457200" marR="0" lvl="0" indent="-342900" algn="l" rtl="0">
-              <a:lnSpc>
-                <a:spcPct val="115000"/>
-              </a:lnSpc>
-              <a:spcBef>
-                <a:spcPts val="0"/>
-              </a:spcBef>
-              <a:spcAft>
-                <a:spcPts val="0"/>
-              </a:spcAft>
-              <a:buClr>
-                <a:schemeClr val="dk2"/>
-              </a:buClr>
-              <a:buSzPts val="2100"/>
-              <a:buFont typeface="Roboto Mono"/>
-              <a:buNone/>
-              <a:defRPr sz="2100" b="1" i="0" u="none" strike="noStrike" cap="none">
-                <a:solidFill>
-                  <a:schemeClr val="dk2"/>
-                </a:solidFill>
-                <a:latin typeface="Roboto Mono"/>
-                <a:ea typeface="Roboto Mono"/>
-                <a:cs typeface="Roboto Mono"/>
-                <a:sym typeface="Roboto Mono"/>
-              </a:defRPr>
-            </a:lvl1pPr>
-            <a:lvl2pPr marL="914400" marR="0" lvl="1" indent="-342900" algn="l" rtl="0">
-              <a:lnSpc>
-                <a:spcPct val="115000"/>
-              </a:lnSpc>
-              <a:spcBef>
-                <a:spcPts val="2100"/>
-              </a:spcBef>
-              <a:spcAft>
-                <a:spcPts val="0"/>
-              </a:spcAft>
-              <a:buClr>
-                <a:schemeClr val="dk2"/>
-              </a:buClr>
-              <a:buSzPts val="2100"/>
-              <a:buFont typeface="Roboto Mono"/>
-              <a:buNone/>
-              <a:defRPr sz="2100" b="1" i="0" u="none" strike="noStrike" cap="none">
-                <a:solidFill>
-                  <a:schemeClr val="dk2"/>
-                </a:solidFill>
-                <a:latin typeface="Roboto Mono"/>
-                <a:ea typeface="Roboto Mono"/>
-                <a:cs typeface="Roboto Mono"/>
-                <a:sym typeface="Roboto Mono"/>
-              </a:defRPr>
-            </a:lvl2pPr>
-            <a:lvl3pPr marL="1371600" marR="0" lvl="2" indent="-342900" algn="l" rtl="0">
-              <a:lnSpc>
-                <a:spcPct val="115000"/>
-              </a:lnSpc>
-              <a:spcBef>
-                <a:spcPts val="2100"/>
-              </a:spcBef>
-              <a:spcAft>
-                <a:spcPts val="0"/>
-              </a:spcAft>
-              <a:buClr>
-                <a:schemeClr val="dk2"/>
-              </a:buClr>
-              <a:buSzPts val="2100"/>
-              <a:buFont typeface="Roboto Mono"/>
-              <a:buNone/>
-              <a:defRPr sz="2100" b="1" i="0" u="none" strike="noStrike" cap="none">
-                <a:solidFill>
-                  <a:schemeClr val="dk2"/>
-                </a:solidFill>
-                <a:latin typeface="Roboto Mono"/>
-                <a:ea typeface="Roboto Mono"/>
-                <a:cs typeface="Roboto Mono"/>
-                <a:sym typeface="Roboto Mono"/>
-              </a:defRPr>
-            </a:lvl3pPr>
-            <a:lvl4pPr marL="1828800" marR="0" lvl="3" indent="-342900" algn="l" rtl="0">
-              <a:lnSpc>
-                <a:spcPct val="115000"/>
-              </a:lnSpc>
-              <a:spcBef>
-                <a:spcPts val="2100"/>
-              </a:spcBef>
-              <a:spcAft>
-                <a:spcPts val="0"/>
-              </a:spcAft>
-              <a:buClr>
-                <a:schemeClr val="dk2"/>
-              </a:buClr>
-              <a:buSzPts val="2100"/>
-              <a:buFont typeface="Roboto Mono"/>
-              <a:buNone/>
-              <a:defRPr sz="2100" b="1" i="0" u="none" strike="noStrike" cap="none">
-                <a:solidFill>
-                  <a:schemeClr val="dk2"/>
-                </a:solidFill>
-                <a:latin typeface="Roboto Mono"/>
-                <a:ea typeface="Roboto Mono"/>
-                <a:cs typeface="Roboto Mono"/>
-                <a:sym typeface="Roboto Mono"/>
-              </a:defRPr>
-            </a:lvl4pPr>
-            <a:lvl5pPr marL="2286000" marR="0" lvl="4" indent="-342900" algn="l" rtl="0">
-              <a:lnSpc>
-                <a:spcPct val="115000"/>
-              </a:lnSpc>
-              <a:spcBef>
-                <a:spcPts val="2100"/>
-              </a:spcBef>
-              <a:spcAft>
-                <a:spcPts val="0"/>
-              </a:spcAft>
-              <a:buClr>
-                <a:schemeClr val="dk2"/>
-              </a:buClr>
-              <a:buSzPts val="2100"/>
-              <a:buFont typeface="Roboto Mono"/>
-              <a:buNone/>
-              <a:defRPr sz="2100" b="1" i="0" u="none" strike="noStrike" cap="none">
-                <a:solidFill>
-                  <a:schemeClr val="dk2"/>
-                </a:solidFill>
-                <a:latin typeface="Roboto Mono"/>
-                <a:ea typeface="Roboto Mono"/>
-                <a:cs typeface="Roboto Mono"/>
-                <a:sym typeface="Roboto Mono"/>
-              </a:defRPr>
-            </a:lvl5pPr>
-            <a:lvl6pPr marL="2743200" marR="0" lvl="5" indent="-342900" algn="l" rtl="0">
-              <a:lnSpc>
-                <a:spcPct val="115000"/>
-              </a:lnSpc>
-              <a:spcBef>
-                <a:spcPts val="2100"/>
-              </a:spcBef>
-              <a:spcAft>
-                <a:spcPts val="0"/>
-              </a:spcAft>
-              <a:buClr>
-                <a:schemeClr val="dk2"/>
-              </a:buClr>
-              <a:buSzPts val="2100"/>
-              <a:buFont typeface="Roboto Mono"/>
-              <a:buNone/>
-              <a:defRPr sz="2100" b="1" i="0" u="none" strike="noStrike" cap="none">
-                <a:solidFill>
-                  <a:schemeClr val="dk2"/>
-                </a:solidFill>
-                <a:latin typeface="Roboto Mono"/>
-                <a:ea typeface="Roboto Mono"/>
-                <a:cs typeface="Roboto Mono"/>
-                <a:sym typeface="Roboto Mono"/>
-              </a:defRPr>
-            </a:lvl6pPr>
-            <a:lvl7pPr marL="3200400" marR="0" lvl="6" indent="-342900" algn="l" rtl="0">
-              <a:lnSpc>
-                <a:spcPct val="115000"/>
-              </a:lnSpc>
-              <a:spcBef>
-                <a:spcPts val="2100"/>
-              </a:spcBef>
-              <a:spcAft>
-                <a:spcPts val="0"/>
-              </a:spcAft>
-              <a:buClr>
-                <a:schemeClr val="dk2"/>
-              </a:buClr>
-              <a:buSzPts val="2100"/>
-              <a:buFont typeface="Roboto Mono"/>
-              <a:buNone/>
-              <a:defRPr sz="2100" b="1" i="0" u="none" strike="noStrike" cap="none">
-                <a:solidFill>
-                  <a:schemeClr val="dk2"/>
-                </a:solidFill>
-                <a:latin typeface="Roboto Mono"/>
-                <a:ea typeface="Roboto Mono"/>
-                <a:cs typeface="Roboto Mono"/>
-                <a:sym typeface="Roboto Mono"/>
-              </a:defRPr>
-            </a:lvl7pPr>
-            <a:lvl8pPr marL="3657600" marR="0" lvl="7" indent="-342900" algn="l" rtl="0">
-              <a:lnSpc>
-                <a:spcPct val="115000"/>
-              </a:lnSpc>
-              <a:spcBef>
-                <a:spcPts val="2100"/>
-              </a:spcBef>
-              <a:spcAft>
-                <a:spcPts val="0"/>
-              </a:spcAft>
-              <a:buClr>
-                <a:schemeClr val="dk2"/>
-              </a:buClr>
-              <a:buSzPts val="2100"/>
-              <a:buFont typeface="Roboto Mono"/>
-              <a:buNone/>
-              <a:defRPr sz="2100" b="1" i="0" u="none" strike="noStrike" cap="none">
-                <a:solidFill>
-                  <a:schemeClr val="dk2"/>
-                </a:solidFill>
-                <a:latin typeface="Roboto Mono"/>
-                <a:ea typeface="Roboto Mono"/>
-                <a:cs typeface="Roboto Mono"/>
-                <a:sym typeface="Roboto Mono"/>
-              </a:defRPr>
-            </a:lvl8pPr>
-            <a:lvl9pPr marL="4114800" marR="0" lvl="8" indent="-342900" algn="l" rtl="0">
-              <a:lnSpc>
-                <a:spcPct val="115000"/>
-              </a:lnSpc>
-              <a:spcBef>
-                <a:spcPts val="2100"/>
-              </a:spcBef>
-              <a:spcAft>
-                <a:spcPts val="2100"/>
-              </a:spcAft>
-              <a:buClr>
-                <a:schemeClr val="dk2"/>
-              </a:buClr>
-              <a:buSzPts val="2100"/>
-              <a:buFont typeface="Roboto Mono"/>
-              <a:buNone/>
-              <a:defRPr sz="2100" b="1" i="0" u="none" strike="noStrike" cap="none">
-                <a:solidFill>
-                  <a:schemeClr val="dk2"/>
-                </a:solidFill>
-                <a:latin typeface="Roboto Mono"/>
-                <a:ea typeface="Roboto Mono"/>
-                <a:cs typeface="Roboto Mono"/>
-                <a:sym typeface="Roboto Mono"/>
-              </a:defRPr>
-            </a:lvl9pPr>
-          </a:lstStyle>
-          <a:p>
-            <a:r>
-              <a:rPr lang="en-US" dirty="0"/>
-              <a:t>Goal: </a:t>
-            </a:r>
-            <a:r>
-              <a:rPr lang="en-US" b="0" dirty="0"/>
-              <a:t>Exhausting target’s resources</a:t>
-            </a:r>
-            <a:endParaRPr lang="en-US" dirty="0"/>
-          </a:p>
-        </p:txBody>
-      </p:sp>
-      <p:sp>
-        <p:nvSpPr>
-          <p:cNvPr id="9" name="Sottotitolo 4">
-            <a:extLst>
-              <a:ext uri="{FF2B5EF4-FFF2-40B4-BE49-F238E27FC236}">
-                <a16:creationId xmlns:a16="http://schemas.microsoft.com/office/drawing/2014/main" id="{28C0E11C-D0B0-907F-9740-16979CF0D955}"/>
-              </a:ext>
-            </a:extLst>
-          </p:cNvPr>
-          <p:cNvSpPr txBox="1">
-            <a:spLocks/>
-          </p:cNvSpPr>
-          <p:nvPr/>
-        </p:nvSpPr>
-        <p:spPr>
-          <a:xfrm>
-            <a:off x="1081963" y="3818761"/>
-            <a:ext cx="8813151" cy="717900"/>
-          </a:xfrm>
-          <a:prstGeom prst="rect">
-            <a:avLst/>
-          </a:prstGeom>
-          <a:noFill/>
-          <a:ln>
-            <a:noFill/>
-          </a:ln>
-        </p:spPr>
-        <p:txBody>
-          <a:bodyPr spcFirstLastPara="1" wrap="square" lIns="121900" tIns="121900" rIns="121900" bIns="121900" anchor="t" anchorCtr="0">
-            <a:noAutofit/>
-          </a:bodyPr>
-          <a:lstStyle>
-            <a:defPPr marR="0" lvl="0" algn="l" rtl="0">
-              <a:lnSpc>
-                <a:spcPct val="100000"/>
-              </a:lnSpc>
-              <a:spcBef>
-                <a:spcPts val="0"/>
-              </a:spcBef>
-              <a:spcAft>
-                <a:spcPts val="0"/>
-              </a:spcAft>
-            </a:defPPr>
-            <a:lvl1pPr marL="457200" marR="0" lvl="0" indent="-342900" algn="l" rtl="0">
-              <a:lnSpc>
-                <a:spcPct val="115000"/>
-              </a:lnSpc>
-              <a:spcBef>
-                <a:spcPts val="0"/>
-              </a:spcBef>
-              <a:spcAft>
-                <a:spcPts val="0"/>
-              </a:spcAft>
-              <a:buClr>
-                <a:schemeClr val="dk2"/>
-              </a:buClr>
-              <a:buSzPts val="2100"/>
-              <a:buFont typeface="Roboto Mono"/>
-              <a:buNone/>
-              <a:defRPr sz="2100" b="1" i="0" u="none" strike="noStrike" cap="none">
-                <a:solidFill>
-                  <a:schemeClr val="dk2"/>
-                </a:solidFill>
-                <a:latin typeface="Roboto Mono"/>
-                <a:ea typeface="Roboto Mono"/>
-                <a:cs typeface="Roboto Mono"/>
-                <a:sym typeface="Roboto Mono"/>
-              </a:defRPr>
-            </a:lvl1pPr>
-            <a:lvl2pPr marL="914400" marR="0" lvl="1" indent="-342900" algn="l" rtl="0">
-              <a:lnSpc>
-                <a:spcPct val="115000"/>
-              </a:lnSpc>
-              <a:spcBef>
-                <a:spcPts val="2100"/>
-              </a:spcBef>
-              <a:spcAft>
-                <a:spcPts val="0"/>
-              </a:spcAft>
-              <a:buClr>
-                <a:schemeClr val="dk2"/>
-              </a:buClr>
-              <a:buSzPts val="2100"/>
-              <a:buFont typeface="Roboto Mono"/>
-              <a:buNone/>
-              <a:defRPr sz="2100" b="1" i="0" u="none" strike="noStrike" cap="none">
-                <a:solidFill>
-                  <a:schemeClr val="dk2"/>
-                </a:solidFill>
-                <a:latin typeface="Roboto Mono"/>
-                <a:ea typeface="Roboto Mono"/>
-                <a:cs typeface="Roboto Mono"/>
-                <a:sym typeface="Roboto Mono"/>
-              </a:defRPr>
-            </a:lvl2pPr>
-            <a:lvl3pPr marL="1371600" marR="0" lvl="2" indent="-342900" algn="l" rtl="0">
-              <a:lnSpc>
-                <a:spcPct val="115000"/>
-              </a:lnSpc>
-              <a:spcBef>
-                <a:spcPts val="2100"/>
-              </a:spcBef>
-              <a:spcAft>
-                <a:spcPts val="0"/>
-              </a:spcAft>
-              <a:buClr>
-                <a:schemeClr val="dk2"/>
-              </a:buClr>
-              <a:buSzPts val="2100"/>
-              <a:buFont typeface="Roboto Mono"/>
-              <a:buNone/>
-              <a:defRPr sz="2100" b="1" i="0" u="none" strike="noStrike" cap="none">
-                <a:solidFill>
-                  <a:schemeClr val="dk2"/>
-                </a:solidFill>
-                <a:latin typeface="Roboto Mono"/>
-                <a:ea typeface="Roboto Mono"/>
-                <a:cs typeface="Roboto Mono"/>
-                <a:sym typeface="Roboto Mono"/>
-              </a:defRPr>
-            </a:lvl3pPr>
-            <a:lvl4pPr marL="1828800" marR="0" lvl="3" indent="-342900" algn="l" rtl="0">
-              <a:lnSpc>
-                <a:spcPct val="115000"/>
-              </a:lnSpc>
-              <a:spcBef>
-                <a:spcPts val="2100"/>
-              </a:spcBef>
-              <a:spcAft>
-                <a:spcPts val="0"/>
-              </a:spcAft>
-              <a:buClr>
-                <a:schemeClr val="dk2"/>
-              </a:buClr>
-              <a:buSzPts val="2100"/>
-              <a:buFont typeface="Roboto Mono"/>
-              <a:buNone/>
-              <a:defRPr sz="2100" b="1" i="0" u="none" strike="noStrike" cap="none">
-                <a:solidFill>
-                  <a:schemeClr val="dk2"/>
-                </a:solidFill>
-                <a:latin typeface="Roboto Mono"/>
-                <a:ea typeface="Roboto Mono"/>
-                <a:cs typeface="Roboto Mono"/>
-                <a:sym typeface="Roboto Mono"/>
-              </a:defRPr>
-            </a:lvl4pPr>
-            <a:lvl5pPr marL="2286000" marR="0" lvl="4" indent="-342900" algn="l" rtl="0">
-              <a:lnSpc>
-                <a:spcPct val="115000"/>
-              </a:lnSpc>
-              <a:spcBef>
-                <a:spcPts val="2100"/>
-              </a:spcBef>
-              <a:spcAft>
-                <a:spcPts val="0"/>
-              </a:spcAft>
-              <a:buClr>
-                <a:schemeClr val="dk2"/>
-              </a:buClr>
-              <a:buSzPts val="2100"/>
-              <a:buFont typeface="Roboto Mono"/>
-              <a:buNone/>
-              <a:defRPr sz="2100" b="1" i="0" u="none" strike="noStrike" cap="none">
-                <a:solidFill>
-                  <a:schemeClr val="dk2"/>
-                </a:solidFill>
-                <a:latin typeface="Roboto Mono"/>
-                <a:ea typeface="Roboto Mono"/>
-                <a:cs typeface="Roboto Mono"/>
-                <a:sym typeface="Roboto Mono"/>
-              </a:defRPr>
-            </a:lvl5pPr>
-            <a:lvl6pPr marL="2743200" marR="0" lvl="5" indent="-342900" algn="l" rtl="0">
-              <a:lnSpc>
-                <a:spcPct val="115000"/>
-              </a:lnSpc>
-              <a:spcBef>
-                <a:spcPts val="2100"/>
-              </a:spcBef>
-              <a:spcAft>
-                <a:spcPts val="0"/>
-              </a:spcAft>
-              <a:buClr>
-                <a:schemeClr val="dk2"/>
-              </a:buClr>
-              <a:buSzPts val="2100"/>
-              <a:buFont typeface="Roboto Mono"/>
-              <a:buNone/>
-              <a:defRPr sz="2100" b="1" i="0" u="none" strike="noStrike" cap="none">
-                <a:solidFill>
-                  <a:schemeClr val="dk2"/>
-                </a:solidFill>
-                <a:latin typeface="Roboto Mono"/>
-                <a:ea typeface="Roboto Mono"/>
-                <a:cs typeface="Roboto Mono"/>
-                <a:sym typeface="Roboto Mono"/>
-              </a:defRPr>
-            </a:lvl6pPr>
-            <a:lvl7pPr marL="3200400" marR="0" lvl="6" indent="-342900" algn="l" rtl="0">
-              <a:lnSpc>
-                <a:spcPct val="115000"/>
-              </a:lnSpc>
-              <a:spcBef>
-                <a:spcPts val="2100"/>
-              </a:spcBef>
-              <a:spcAft>
-                <a:spcPts val="0"/>
-              </a:spcAft>
-              <a:buClr>
-                <a:schemeClr val="dk2"/>
-              </a:buClr>
-              <a:buSzPts val="2100"/>
-              <a:buFont typeface="Roboto Mono"/>
-              <a:buNone/>
-              <a:defRPr sz="2100" b="1" i="0" u="none" strike="noStrike" cap="none">
-                <a:solidFill>
-                  <a:schemeClr val="dk2"/>
-                </a:solidFill>
-                <a:latin typeface="Roboto Mono"/>
-                <a:ea typeface="Roboto Mono"/>
-                <a:cs typeface="Roboto Mono"/>
-                <a:sym typeface="Roboto Mono"/>
-              </a:defRPr>
-            </a:lvl7pPr>
-            <a:lvl8pPr marL="3657600" marR="0" lvl="7" indent="-342900" algn="l" rtl="0">
-              <a:lnSpc>
-                <a:spcPct val="115000"/>
-              </a:lnSpc>
-              <a:spcBef>
-                <a:spcPts val="2100"/>
-              </a:spcBef>
-              <a:spcAft>
-                <a:spcPts val="0"/>
-              </a:spcAft>
-              <a:buClr>
-                <a:schemeClr val="dk2"/>
-              </a:buClr>
-              <a:buSzPts val="2100"/>
-              <a:buFont typeface="Roboto Mono"/>
-              <a:buNone/>
-              <a:defRPr sz="2100" b="1" i="0" u="none" strike="noStrike" cap="none">
-                <a:solidFill>
-                  <a:schemeClr val="dk2"/>
-                </a:solidFill>
-                <a:latin typeface="Roboto Mono"/>
-                <a:ea typeface="Roboto Mono"/>
-                <a:cs typeface="Roboto Mono"/>
-                <a:sym typeface="Roboto Mono"/>
-              </a:defRPr>
-            </a:lvl8pPr>
-            <a:lvl9pPr marL="4114800" marR="0" lvl="8" indent="-342900" algn="l" rtl="0">
-              <a:lnSpc>
-                <a:spcPct val="115000"/>
-              </a:lnSpc>
-              <a:spcBef>
-                <a:spcPts val="2100"/>
-              </a:spcBef>
-              <a:spcAft>
-                <a:spcPts val="2100"/>
-              </a:spcAft>
-              <a:buClr>
-                <a:schemeClr val="dk2"/>
-              </a:buClr>
-              <a:buSzPts val="2100"/>
-              <a:buFont typeface="Roboto Mono"/>
-              <a:buNone/>
-              <a:defRPr sz="2100" b="1" i="0" u="none" strike="noStrike" cap="none">
-                <a:solidFill>
-                  <a:schemeClr val="dk2"/>
-                </a:solidFill>
-                <a:latin typeface="Roboto Mono"/>
-                <a:ea typeface="Roboto Mono"/>
-                <a:cs typeface="Roboto Mono"/>
-                <a:sym typeface="Roboto Mono"/>
-              </a:defRPr>
-            </a:lvl9pPr>
-          </a:lstStyle>
-          <a:p>
-            <a:r>
-              <a:rPr lang="en-US" dirty="0"/>
-              <a:t>How: </a:t>
-            </a:r>
-            <a:r>
-              <a:rPr lang="en-US" b="0" dirty="0"/>
-              <a:t>Opening lots of TCP connections</a:t>
-            </a:r>
-            <a:endParaRPr lang="en-US" dirty="0"/>
-          </a:p>
-        </p:txBody>
-      </p:sp>
-    </p:spTree>
-    <p:extLst>
-      <p:ext uri="{BB962C8B-B14F-4D97-AF65-F5344CB8AC3E}">
-        <p14:creationId xmlns:p14="http://schemas.microsoft.com/office/powerpoint/2010/main" val="2218624532"/>
-      </p:ext>
-    </p:extLst>
-  </p:cSld>
-  <p:clrMapOvr>
-    <a:masterClrMapping/>
-  </p:clrMapOvr>
-</p:sld>
-</file>
-
-<file path=ppt/slides/slide7.xml><?xml version="1.0" encoding="utf-8"?>
 <p:sld xmlns:a="http://schemas.openxmlformats.org/drawingml/2006/main" xmlns:r="http://schemas.openxmlformats.org/officeDocument/2006/relationships" xmlns:p="http://schemas.openxmlformats.org/presentationml/2006/main">
   <p:cSld>
     <p:spTree>
@@ -27638,7 +27287,7 @@
             </a:r>
             <a:r>
               <a:rPr lang="en-US" b="0" dirty="0"/>
-              <a:t>Sending NXDOMAIN queries</a:t>
+              <a:t>Sending a huge amount of queries</a:t>
             </a:r>
             <a:endParaRPr lang="en-US" dirty="0"/>
           </a:p>
@@ -27939,6 +27588,1000 @@
     <p:extLst>
       <p:ext uri="{BB962C8B-B14F-4D97-AF65-F5344CB8AC3E}">
         <p14:creationId xmlns:p14="http://schemas.microsoft.com/office/powerpoint/2010/main" val="3923058950"/>
+      </p:ext>
+    </p:extLst>
+  </p:cSld>
+  <p:clrMapOvr>
+    <a:masterClrMapping/>
+  </p:clrMapOvr>
+</p:sld>
+</file>
+
+<file path=ppt/slides/slide7.xml><?xml version="1.0" encoding="utf-8"?>
+<p:sld xmlns:a="http://schemas.openxmlformats.org/drawingml/2006/main" xmlns:r="http://schemas.openxmlformats.org/officeDocument/2006/relationships" xmlns:p="http://schemas.openxmlformats.org/presentationml/2006/main">
+  <p:cSld>
+    <p:spTree>
+      <p:nvGrpSpPr>
+        <p:cNvPr id="1" name="Shape 416"/>
+        <p:cNvGrpSpPr/>
+        <p:nvPr/>
+      </p:nvGrpSpPr>
+      <p:grpSpPr>
+        <a:xfrm>
+          <a:off x="0" y="0"/>
+          <a:ext cx="0" cy="0"/>
+          <a:chOff x="0" y="0"/>
+          <a:chExt cx="0" cy="0"/>
+        </a:xfrm>
+      </p:grpSpPr>
+      <p:sp>
+        <p:nvSpPr>
+          <p:cNvPr id="417" name="Google Shape;417;p26"/>
+          <p:cNvSpPr txBox="1">
+            <a:spLocks noGrp="1"/>
+          </p:cNvSpPr>
+          <p:nvPr>
+            <p:ph type="title"/>
+          </p:nvPr>
+        </p:nvSpPr>
+        <p:spPr>
+          <a:xfrm>
+            <a:off x="1168343" y="1179906"/>
+            <a:ext cx="7794000" cy="763500"/>
+          </a:xfrm>
+          <a:prstGeom prst="rect">
+            <a:avLst/>
+          </a:prstGeom>
+        </p:spPr>
+        <p:txBody>
+          <a:bodyPr spcFirstLastPara="1" wrap="square" lIns="121900" tIns="121900" rIns="121900" bIns="121900" anchor="t" anchorCtr="0">
+            <a:noAutofit/>
+          </a:bodyPr>
+          <a:lstStyle/>
+          <a:p>
+            <a:pPr marL="0" lvl="0" indent="0" algn="l" rtl="0">
+              <a:spcBef>
+                <a:spcPts val="0"/>
+              </a:spcBef>
+              <a:spcAft>
+                <a:spcPts val="0"/>
+              </a:spcAft>
+              <a:buNone/>
+            </a:pPr>
+            <a:r>
+              <a:rPr lang="en" sz="4800" dirty="0">
+                <a:solidFill>
+                  <a:schemeClr val="accent3"/>
+                </a:solidFill>
+              </a:rPr>
+              <a:t>TCP </a:t>
+            </a:r>
+            <a:r>
+              <a:rPr lang="en" sz="4800" dirty="0">
+                <a:solidFill>
+                  <a:schemeClr val="tx1"/>
+                </a:solidFill>
+              </a:rPr>
+              <a:t>Flood</a:t>
+            </a:r>
+            <a:endParaRPr sz="4800" dirty="0">
+              <a:solidFill>
+                <a:schemeClr val="tx1"/>
+              </a:solidFill>
+            </a:endParaRPr>
+          </a:p>
+        </p:txBody>
+      </p:sp>
+      <p:sp>
+        <p:nvSpPr>
+          <p:cNvPr id="5" name="Sottotitolo 4">
+            <a:extLst>
+              <a:ext uri="{FF2B5EF4-FFF2-40B4-BE49-F238E27FC236}">
+                <a16:creationId xmlns:a16="http://schemas.microsoft.com/office/drawing/2014/main" id="{DDBA7A11-5B52-0490-B253-CDF84CFFB8BF}"/>
+              </a:ext>
+            </a:extLst>
+          </p:cNvPr>
+          <p:cNvSpPr>
+            <a:spLocks noGrp="1"/>
+          </p:cNvSpPr>
+          <p:nvPr>
+            <p:ph type="subTitle" idx="1"/>
+          </p:nvPr>
+        </p:nvSpPr>
+        <p:spPr>
+          <a:xfrm>
+            <a:off x="1081963" y="2022448"/>
+            <a:ext cx="7794000" cy="717900"/>
+          </a:xfrm>
+        </p:spPr>
+        <p:txBody>
+          <a:bodyPr/>
+          <a:lstStyle/>
+          <a:p>
+            <a:r>
+              <a:rPr lang="en-US" sz="2400" dirty="0"/>
+              <a:t>Specifics</a:t>
+            </a:r>
+          </a:p>
+        </p:txBody>
+      </p:sp>
+      <p:sp>
+        <p:nvSpPr>
+          <p:cNvPr id="8" name="Sottotitolo 4">
+            <a:extLst>
+              <a:ext uri="{FF2B5EF4-FFF2-40B4-BE49-F238E27FC236}">
+                <a16:creationId xmlns:a16="http://schemas.microsoft.com/office/drawing/2014/main" id="{F5FBD590-2AD0-651F-7E1C-659576E94810}"/>
+              </a:ext>
+            </a:extLst>
+          </p:cNvPr>
+          <p:cNvSpPr txBox="1">
+            <a:spLocks/>
+          </p:cNvSpPr>
+          <p:nvPr/>
+        </p:nvSpPr>
+        <p:spPr>
+          <a:xfrm>
+            <a:off x="1081963" y="2827411"/>
+            <a:ext cx="7794000" cy="717900"/>
+          </a:xfrm>
+          <a:prstGeom prst="rect">
+            <a:avLst/>
+          </a:prstGeom>
+          <a:noFill/>
+          <a:ln>
+            <a:noFill/>
+          </a:ln>
+        </p:spPr>
+        <p:txBody>
+          <a:bodyPr spcFirstLastPara="1" wrap="square" lIns="121900" tIns="121900" rIns="121900" bIns="121900" anchor="t" anchorCtr="0">
+            <a:noAutofit/>
+          </a:bodyPr>
+          <a:lstStyle>
+            <a:defPPr marR="0" lvl="0" algn="l" rtl="0">
+              <a:lnSpc>
+                <a:spcPct val="100000"/>
+              </a:lnSpc>
+              <a:spcBef>
+                <a:spcPts val="0"/>
+              </a:spcBef>
+              <a:spcAft>
+                <a:spcPts val="0"/>
+              </a:spcAft>
+            </a:defPPr>
+            <a:lvl1pPr marL="457200" marR="0" lvl="0" indent="-342900" algn="l" rtl="0">
+              <a:lnSpc>
+                <a:spcPct val="115000"/>
+              </a:lnSpc>
+              <a:spcBef>
+                <a:spcPts val="0"/>
+              </a:spcBef>
+              <a:spcAft>
+                <a:spcPts val="0"/>
+              </a:spcAft>
+              <a:buClr>
+                <a:schemeClr val="dk2"/>
+              </a:buClr>
+              <a:buSzPts val="2100"/>
+              <a:buFont typeface="Roboto Mono"/>
+              <a:buNone/>
+              <a:defRPr sz="2100" b="1" i="0" u="none" strike="noStrike" cap="none">
+                <a:solidFill>
+                  <a:schemeClr val="dk2"/>
+                </a:solidFill>
+                <a:latin typeface="Roboto Mono"/>
+                <a:ea typeface="Roboto Mono"/>
+                <a:cs typeface="Roboto Mono"/>
+                <a:sym typeface="Roboto Mono"/>
+              </a:defRPr>
+            </a:lvl1pPr>
+            <a:lvl2pPr marL="914400" marR="0" lvl="1" indent="-342900" algn="l" rtl="0">
+              <a:lnSpc>
+                <a:spcPct val="115000"/>
+              </a:lnSpc>
+              <a:spcBef>
+                <a:spcPts val="2100"/>
+              </a:spcBef>
+              <a:spcAft>
+                <a:spcPts val="0"/>
+              </a:spcAft>
+              <a:buClr>
+                <a:schemeClr val="dk2"/>
+              </a:buClr>
+              <a:buSzPts val="2100"/>
+              <a:buFont typeface="Roboto Mono"/>
+              <a:buNone/>
+              <a:defRPr sz="2100" b="1" i="0" u="none" strike="noStrike" cap="none">
+                <a:solidFill>
+                  <a:schemeClr val="dk2"/>
+                </a:solidFill>
+                <a:latin typeface="Roboto Mono"/>
+                <a:ea typeface="Roboto Mono"/>
+                <a:cs typeface="Roboto Mono"/>
+                <a:sym typeface="Roboto Mono"/>
+              </a:defRPr>
+            </a:lvl2pPr>
+            <a:lvl3pPr marL="1371600" marR="0" lvl="2" indent="-342900" algn="l" rtl="0">
+              <a:lnSpc>
+                <a:spcPct val="115000"/>
+              </a:lnSpc>
+              <a:spcBef>
+                <a:spcPts val="2100"/>
+              </a:spcBef>
+              <a:spcAft>
+                <a:spcPts val="0"/>
+              </a:spcAft>
+              <a:buClr>
+                <a:schemeClr val="dk2"/>
+              </a:buClr>
+              <a:buSzPts val="2100"/>
+              <a:buFont typeface="Roboto Mono"/>
+              <a:buNone/>
+              <a:defRPr sz="2100" b="1" i="0" u="none" strike="noStrike" cap="none">
+                <a:solidFill>
+                  <a:schemeClr val="dk2"/>
+                </a:solidFill>
+                <a:latin typeface="Roboto Mono"/>
+                <a:ea typeface="Roboto Mono"/>
+                <a:cs typeface="Roboto Mono"/>
+                <a:sym typeface="Roboto Mono"/>
+              </a:defRPr>
+            </a:lvl3pPr>
+            <a:lvl4pPr marL="1828800" marR="0" lvl="3" indent="-342900" algn="l" rtl="0">
+              <a:lnSpc>
+                <a:spcPct val="115000"/>
+              </a:lnSpc>
+              <a:spcBef>
+                <a:spcPts val="2100"/>
+              </a:spcBef>
+              <a:spcAft>
+                <a:spcPts val="0"/>
+              </a:spcAft>
+              <a:buClr>
+                <a:schemeClr val="dk2"/>
+              </a:buClr>
+              <a:buSzPts val="2100"/>
+              <a:buFont typeface="Roboto Mono"/>
+              <a:buNone/>
+              <a:defRPr sz="2100" b="1" i="0" u="none" strike="noStrike" cap="none">
+                <a:solidFill>
+                  <a:schemeClr val="dk2"/>
+                </a:solidFill>
+                <a:latin typeface="Roboto Mono"/>
+                <a:ea typeface="Roboto Mono"/>
+                <a:cs typeface="Roboto Mono"/>
+                <a:sym typeface="Roboto Mono"/>
+              </a:defRPr>
+            </a:lvl4pPr>
+            <a:lvl5pPr marL="2286000" marR="0" lvl="4" indent="-342900" algn="l" rtl="0">
+              <a:lnSpc>
+                <a:spcPct val="115000"/>
+              </a:lnSpc>
+              <a:spcBef>
+                <a:spcPts val="2100"/>
+              </a:spcBef>
+              <a:spcAft>
+                <a:spcPts val="0"/>
+              </a:spcAft>
+              <a:buClr>
+                <a:schemeClr val="dk2"/>
+              </a:buClr>
+              <a:buSzPts val="2100"/>
+              <a:buFont typeface="Roboto Mono"/>
+              <a:buNone/>
+              <a:defRPr sz="2100" b="1" i="0" u="none" strike="noStrike" cap="none">
+                <a:solidFill>
+                  <a:schemeClr val="dk2"/>
+                </a:solidFill>
+                <a:latin typeface="Roboto Mono"/>
+                <a:ea typeface="Roboto Mono"/>
+                <a:cs typeface="Roboto Mono"/>
+                <a:sym typeface="Roboto Mono"/>
+              </a:defRPr>
+            </a:lvl5pPr>
+            <a:lvl6pPr marL="2743200" marR="0" lvl="5" indent="-342900" algn="l" rtl="0">
+              <a:lnSpc>
+                <a:spcPct val="115000"/>
+              </a:lnSpc>
+              <a:spcBef>
+                <a:spcPts val="2100"/>
+              </a:spcBef>
+              <a:spcAft>
+                <a:spcPts val="0"/>
+              </a:spcAft>
+              <a:buClr>
+                <a:schemeClr val="dk2"/>
+              </a:buClr>
+              <a:buSzPts val="2100"/>
+              <a:buFont typeface="Roboto Mono"/>
+              <a:buNone/>
+              <a:defRPr sz="2100" b="1" i="0" u="none" strike="noStrike" cap="none">
+                <a:solidFill>
+                  <a:schemeClr val="dk2"/>
+                </a:solidFill>
+                <a:latin typeface="Roboto Mono"/>
+                <a:ea typeface="Roboto Mono"/>
+                <a:cs typeface="Roboto Mono"/>
+                <a:sym typeface="Roboto Mono"/>
+              </a:defRPr>
+            </a:lvl6pPr>
+            <a:lvl7pPr marL="3200400" marR="0" lvl="6" indent="-342900" algn="l" rtl="0">
+              <a:lnSpc>
+                <a:spcPct val="115000"/>
+              </a:lnSpc>
+              <a:spcBef>
+                <a:spcPts val="2100"/>
+              </a:spcBef>
+              <a:spcAft>
+                <a:spcPts val="0"/>
+              </a:spcAft>
+              <a:buClr>
+                <a:schemeClr val="dk2"/>
+              </a:buClr>
+              <a:buSzPts val="2100"/>
+              <a:buFont typeface="Roboto Mono"/>
+              <a:buNone/>
+              <a:defRPr sz="2100" b="1" i="0" u="none" strike="noStrike" cap="none">
+                <a:solidFill>
+                  <a:schemeClr val="dk2"/>
+                </a:solidFill>
+                <a:latin typeface="Roboto Mono"/>
+                <a:ea typeface="Roboto Mono"/>
+                <a:cs typeface="Roboto Mono"/>
+                <a:sym typeface="Roboto Mono"/>
+              </a:defRPr>
+            </a:lvl7pPr>
+            <a:lvl8pPr marL="3657600" marR="0" lvl="7" indent="-342900" algn="l" rtl="0">
+              <a:lnSpc>
+                <a:spcPct val="115000"/>
+              </a:lnSpc>
+              <a:spcBef>
+                <a:spcPts val="2100"/>
+              </a:spcBef>
+              <a:spcAft>
+                <a:spcPts val="0"/>
+              </a:spcAft>
+              <a:buClr>
+                <a:schemeClr val="dk2"/>
+              </a:buClr>
+              <a:buSzPts val="2100"/>
+              <a:buFont typeface="Roboto Mono"/>
+              <a:buNone/>
+              <a:defRPr sz="2100" b="1" i="0" u="none" strike="noStrike" cap="none">
+                <a:solidFill>
+                  <a:schemeClr val="dk2"/>
+                </a:solidFill>
+                <a:latin typeface="Roboto Mono"/>
+                <a:ea typeface="Roboto Mono"/>
+                <a:cs typeface="Roboto Mono"/>
+                <a:sym typeface="Roboto Mono"/>
+              </a:defRPr>
+            </a:lvl8pPr>
+            <a:lvl9pPr marL="4114800" marR="0" lvl="8" indent="-342900" algn="l" rtl="0">
+              <a:lnSpc>
+                <a:spcPct val="115000"/>
+              </a:lnSpc>
+              <a:spcBef>
+                <a:spcPts val="2100"/>
+              </a:spcBef>
+              <a:spcAft>
+                <a:spcPts val="2100"/>
+              </a:spcAft>
+              <a:buClr>
+                <a:schemeClr val="dk2"/>
+              </a:buClr>
+              <a:buSzPts val="2100"/>
+              <a:buFont typeface="Roboto Mono"/>
+              <a:buNone/>
+              <a:defRPr sz="2100" b="1" i="0" u="none" strike="noStrike" cap="none">
+                <a:solidFill>
+                  <a:schemeClr val="dk2"/>
+                </a:solidFill>
+                <a:latin typeface="Roboto Mono"/>
+                <a:ea typeface="Roboto Mono"/>
+                <a:cs typeface="Roboto Mono"/>
+                <a:sym typeface="Roboto Mono"/>
+              </a:defRPr>
+            </a:lvl9pPr>
+          </a:lstStyle>
+          <a:p>
+            <a:r>
+              <a:rPr lang="en-US" dirty="0"/>
+              <a:t>Goal: </a:t>
+            </a:r>
+            <a:r>
+              <a:rPr lang="en-US" b="0" dirty="0"/>
+              <a:t>Exhausting target’s resources</a:t>
+            </a:r>
+            <a:endParaRPr lang="en-US" dirty="0"/>
+          </a:p>
+        </p:txBody>
+      </p:sp>
+      <p:sp>
+        <p:nvSpPr>
+          <p:cNvPr id="9" name="Sottotitolo 4">
+            <a:extLst>
+              <a:ext uri="{FF2B5EF4-FFF2-40B4-BE49-F238E27FC236}">
+                <a16:creationId xmlns:a16="http://schemas.microsoft.com/office/drawing/2014/main" id="{28C0E11C-D0B0-907F-9740-16979CF0D955}"/>
+              </a:ext>
+            </a:extLst>
+          </p:cNvPr>
+          <p:cNvSpPr txBox="1">
+            <a:spLocks/>
+          </p:cNvSpPr>
+          <p:nvPr/>
+        </p:nvSpPr>
+        <p:spPr>
+          <a:xfrm>
+            <a:off x="1081962" y="3437011"/>
+            <a:ext cx="8813151" cy="717900"/>
+          </a:xfrm>
+          <a:prstGeom prst="rect">
+            <a:avLst/>
+          </a:prstGeom>
+          <a:noFill/>
+          <a:ln>
+            <a:noFill/>
+          </a:ln>
+        </p:spPr>
+        <p:txBody>
+          <a:bodyPr spcFirstLastPara="1" wrap="square" lIns="121900" tIns="121900" rIns="121900" bIns="121900" anchor="t" anchorCtr="0">
+            <a:noAutofit/>
+          </a:bodyPr>
+          <a:lstStyle>
+            <a:defPPr marR="0" lvl="0" algn="l" rtl="0">
+              <a:lnSpc>
+                <a:spcPct val="100000"/>
+              </a:lnSpc>
+              <a:spcBef>
+                <a:spcPts val="0"/>
+              </a:spcBef>
+              <a:spcAft>
+                <a:spcPts val="0"/>
+              </a:spcAft>
+            </a:defPPr>
+            <a:lvl1pPr marL="457200" marR="0" lvl="0" indent="-342900" algn="l" rtl="0">
+              <a:lnSpc>
+                <a:spcPct val="115000"/>
+              </a:lnSpc>
+              <a:spcBef>
+                <a:spcPts val="0"/>
+              </a:spcBef>
+              <a:spcAft>
+                <a:spcPts val="0"/>
+              </a:spcAft>
+              <a:buClr>
+                <a:schemeClr val="dk2"/>
+              </a:buClr>
+              <a:buSzPts val="2100"/>
+              <a:buFont typeface="Roboto Mono"/>
+              <a:buNone/>
+              <a:defRPr sz="2100" b="1" i="0" u="none" strike="noStrike" cap="none">
+                <a:solidFill>
+                  <a:schemeClr val="dk2"/>
+                </a:solidFill>
+                <a:latin typeface="Roboto Mono"/>
+                <a:ea typeface="Roboto Mono"/>
+                <a:cs typeface="Roboto Mono"/>
+                <a:sym typeface="Roboto Mono"/>
+              </a:defRPr>
+            </a:lvl1pPr>
+            <a:lvl2pPr marL="914400" marR="0" lvl="1" indent="-342900" algn="l" rtl="0">
+              <a:lnSpc>
+                <a:spcPct val="115000"/>
+              </a:lnSpc>
+              <a:spcBef>
+                <a:spcPts val="2100"/>
+              </a:spcBef>
+              <a:spcAft>
+                <a:spcPts val="0"/>
+              </a:spcAft>
+              <a:buClr>
+                <a:schemeClr val="dk2"/>
+              </a:buClr>
+              <a:buSzPts val="2100"/>
+              <a:buFont typeface="Roboto Mono"/>
+              <a:buNone/>
+              <a:defRPr sz="2100" b="1" i="0" u="none" strike="noStrike" cap="none">
+                <a:solidFill>
+                  <a:schemeClr val="dk2"/>
+                </a:solidFill>
+                <a:latin typeface="Roboto Mono"/>
+                <a:ea typeface="Roboto Mono"/>
+                <a:cs typeface="Roboto Mono"/>
+                <a:sym typeface="Roboto Mono"/>
+              </a:defRPr>
+            </a:lvl2pPr>
+            <a:lvl3pPr marL="1371600" marR="0" lvl="2" indent="-342900" algn="l" rtl="0">
+              <a:lnSpc>
+                <a:spcPct val="115000"/>
+              </a:lnSpc>
+              <a:spcBef>
+                <a:spcPts val="2100"/>
+              </a:spcBef>
+              <a:spcAft>
+                <a:spcPts val="0"/>
+              </a:spcAft>
+              <a:buClr>
+                <a:schemeClr val="dk2"/>
+              </a:buClr>
+              <a:buSzPts val="2100"/>
+              <a:buFont typeface="Roboto Mono"/>
+              <a:buNone/>
+              <a:defRPr sz="2100" b="1" i="0" u="none" strike="noStrike" cap="none">
+                <a:solidFill>
+                  <a:schemeClr val="dk2"/>
+                </a:solidFill>
+                <a:latin typeface="Roboto Mono"/>
+                <a:ea typeface="Roboto Mono"/>
+                <a:cs typeface="Roboto Mono"/>
+                <a:sym typeface="Roboto Mono"/>
+              </a:defRPr>
+            </a:lvl3pPr>
+            <a:lvl4pPr marL="1828800" marR="0" lvl="3" indent="-342900" algn="l" rtl="0">
+              <a:lnSpc>
+                <a:spcPct val="115000"/>
+              </a:lnSpc>
+              <a:spcBef>
+                <a:spcPts val="2100"/>
+              </a:spcBef>
+              <a:spcAft>
+                <a:spcPts val="0"/>
+              </a:spcAft>
+              <a:buClr>
+                <a:schemeClr val="dk2"/>
+              </a:buClr>
+              <a:buSzPts val="2100"/>
+              <a:buFont typeface="Roboto Mono"/>
+              <a:buNone/>
+              <a:defRPr sz="2100" b="1" i="0" u="none" strike="noStrike" cap="none">
+                <a:solidFill>
+                  <a:schemeClr val="dk2"/>
+                </a:solidFill>
+                <a:latin typeface="Roboto Mono"/>
+                <a:ea typeface="Roboto Mono"/>
+                <a:cs typeface="Roboto Mono"/>
+                <a:sym typeface="Roboto Mono"/>
+              </a:defRPr>
+            </a:lvl4pPr>
+            <a:lvl5pPr marL="2286000" marR="0" lvl="4" indent="-342900" algn="l" rtl="0">
+              <a:lnSpc>
+                <a:spcPct val="115000"/>
+              </a:lnSpc>
+              <a:spcBef>
+                <a:spcPts val="2100"/>
+              </a:spcBef>
+              <a:spcAft>
+                <a:spcPts val="0"/>
+              </a:spcAft>
+              <a:buClr>
+                <a:schemeClr val="dk2"/>
+              </a:buClr>
+              <a:buSzPts val="2100"/>
+              <a:buFont typeface="Roboto Mono"/>
+              <a:buNone/>
+              <a:defRPr sz="2100" b="1" i="0" u="none" strike="noStrike" cap="none">
+                <a:solidFill>
+                  <a:schemeClr val="dk2"/>
+                </a:solidFill>
+                <a:latin typeface="Roboto Mono"/>
+                <a:ea typeface="Roboto Mono"/>
+                <a:cs typeface="Roboto Mono"/>
+                <a:sym typeface="Roboto Mono"/>
+              </a:defRPr>
+            </a:lvl5pPr>
+            <a:lvl6pPr marL="2743200" marR="0" lvl="5" indent="-342900" algn="l" rtl="0">
+              <a:lnSpc>
+                <a:spcPct val="115000"/>
+              </a:lnSpc>
+              <a:spcBef>
+                <a:spcPts val="2100"/>
+              </a:spcBef>
+              <a:spcAft>
+                <a:spcPts val="0"/>
+              </a:spcAft>
+              <a:buClr>
+                <a:schemeClr val="dk2"/>
+              </a:buClr>
+              <a:buSzPts val="2100"/>
+              <a:buFont typeface="Roboto Mono"/>
+              <a:buNone/>
+              <a:defRPr sz="2100" b="1" i="0" u="none" strike="noStrike" cap="none">
+                <a:solidFill>
+                  <a:schemeClr val="dk2"/>
+                </a:solidFill>
+                <a:latin typeface="Roboto Mono"/>
+                <a:ea typeface="Roboto Mono"/>
+                <a:cs typeface="Roboto Mono"/>
+                <a:sym typeface="Roboto Mono"/>
+              </a:defRPr>
+            </a:lvl6pPr>
+            <a:lvl7pPr marL="3200400" marR="0" lvl="6" indent="-342900" algn="l" rtl="0">
+              <a:lnSpc>
+                <a:spcPct val="115000"/>
+              </a:lnSpc>
+              <a:spcBef>
+                <a:spcPts val="2100"/>
+              </a:spcBef>
+              <a:spcAft>
+                <a:spcPts val="0"/>
+              </a:spcAft>
+              <a:buClr>
+                <a:schemeClr val="dk2"/>
+              </a:buClr>
+              <a:buSzPts val="2100"/>
+              <a:buFont typeface="Roboto Mono"/>
+              <a:buNone/>
+              <a:defRPr sz="2100" b="1" i="0" u="none" strike="noStrike" cap="none">
+                <a:solidFill>
+                  <a:schemeClr val="dk2"/>
+                </a:solidFill>
+                <a:latin typeface="Roboto Mono"/>
+                <a:ea typeface="Roboto Mono"/>
+                <a:cs typeface="Roboto Mono"/>
+                <a:sym typeface="Roboto Mono"/>
+              </a:defRPr>
+            </a:lvl7pPr>
+            <a:lvl8pPr marL="3657600" marR="0" lvl="7" indent="-342900" algn="l" rtl="0">
+              <a:lnSpc>
+                <a:spcPct val="115000"/>
+              </a:lnSpc>
+              <a:spcBef>
+                <a:spcPts val="2100"/>
+              </a:spcBef>
+              <a:spcAft>
+                <a:spcPts val="0"/>
+              </a:spcAft>
+              <a:buClr>
+                <a:schemeClr val="dk2"/>
+              </a:buClr>
+              <a:buSzPts val="2100"/>
+              <a:buFont typeface="Roboto Mono"/>
+              <a:buNone/>
+              <a:defRPr sz="2100" b="1" i="0" u="none" strike="noStrike" cap="none">
+                <a:solidFill>
+                  <a:schemeClr val="dk2"/>
+                </a:solidFill>
+                <a:latin typeface="Roboto Mono"/>
+                <a:ea typeface="Roboto Mono"/>
+                <a:cs typeface="Roboto Mono"/>
+                <a:sym typeface="Roboto Mono"/>
+              </a:defRPr>
+            </a:lvl8pPr>
+            <a:lvl9pPr marL="4114800" marR="0" lvl="8" indent="-342900" algn="l" rtl="0">
+              <a:lnSpc>
+                <a:spcPct val="115000"/>
+              </a:lnSpc>
+              <a:spcBef>
+                <a:spcPts val="2100"/>
+              </a:spcBef>
+              <a:spcAft>
+                <a:spcPts val="2100"/>
+              </a:spcAft>
+              <a:buClr>
+                <a:schemeClr val="dk2"/>
+              </a:buClr>
+              <a:buSzPts val="2100"/>
+              <a:buFont typeface="Roboto Mono"/>
+              <a:buNone/>
+              <a:defRPr sz="2100" b="1" i="0" u="none" strike="noStrike" cap="none">
+                <a:solidFill>
+                  <a:schemeClr val="dk2"/>
+                </a:solidFill>
+                <a:latin typeface="Roboto Mono"/>
+                <a:ea typeface="Roboto Mono"/>
+                <a:cs typeface="Roboto Mono"/>
+                <a:sym typeface="Roboto Mono"/>
+              </a:defRPr>
+            </a:lvl9pPr>
+          </a:lstStyle>
+          <a:p>
+            <a:r>
+              <a:rPr lang="en-US" dirty="0"/>
+              <a:t>How: </a:t>
+            </a:r>
+            <a:r>
+              <a:rPr lang="en-US" b="0" dirty="0"/>
+              <a:t>Opening lots of TCP connections</a:t>
+            </a:r>
+            <a:endParaRPr lang="en-US" dirty="0"/>
+          </a:p>
+        </p:txBody>
+      </p:sp>
+      <p:sp>
+        <p:nvSpPr>
+          <p:cNvPr id="2" name="Sottotitolo 4">
+            <a:extLst>
+              <a:ext uri="{FF2B5EF4-FFF2-40B4-BE49-F238E27FC236}">
+                <a16:creationId xmlns:a16="http://schemas.microsoft.com/office/drawing/2014/main" id="{FE501A94-738E-6049-3B47-B64C1BD8B1DF}"/>
+              </a:ext>
+            </a:extLst>
+          </p:cNvPr>
+          <p:cNvSpPr txBox="1">
+            <a:spLocks/>
+          </p:cNvSpPr>
+          <p:nvPr/>
+        </p:nvSpPr>
+        <p:spPr>
+          <a:xfrm>
+            <a:off x="1081962" y="4046611"/>
+            <a:ext cx="8813151" cy="717900"/>
+          </a:xfrm>
+          <a:prstGeom prst="rect">
+            <a:avLst/>
+          </a:prstGeom>
+          <a:noFill/>
+          <a:ln>
+            <a:noFill/>
+          </a:ln>
+        </p:spPr>
+        <p:txBody>
+          <a:bodyPr spcFirstLastPara="1" wrap="square" lIns="121900" tIns="121900" rIns="121900" bIns="121900" anchor="t" anchorCtr="0">
+            <a:noAutofit/>
+          </a:bodyPr>
+          <a:lstStyle>
+            <a:defPPr marR="0" lvl="0" algn="l" rtl="0">
+              <a:lnSpc>
+                <a:spcPct val="100000"/>
+              </a:lnSpc>
+              <a:spcBef>
+                <a:spcPts val="0"/>
+              </a:spcBef>
+              <a:spcAft>
+                <a:spcPts val="0"/>
+              </a:spcAft>
+            </a:defPPr>
+            <a:lvl1pPr marL="457200" marR="0" lvl="0" indent="-342900" algn="l" rtl="0">
+              <a:lnSpc>
+                <a:spcPct val="115000"/>
+              </a:lnSpc>
+              <a:spcBef>
+                <a:spcPts val="0"/>
+              </a:spcBef>
+              <a:spcAft>
+                <a:spcPts val="0"/>
+              </a:spcAft>
+              <a:buClr>
+                <a:schemeClr val="dk2"/>
+              </a:buClr>
+              <a:buSzPts val="2100"/>
+              <a:buFont typeface="Roboto Mono"/>
+              <a:buNone/>
+              <a:defRPr sz="2100" b="1" i="0" u="none" strike="noStrike" cap="none">
+                <a:solidFill>
+                  <a:schemeClr val="dk2"/>
+                </a:solidFill>
+                <a:latin typeface="Roboto Mono"/>
+                <a:ea typeface="Roboto Mono"/>
+                <a:cs typeface="Roboto Mono"/>
+                <a:sym typeface="Roboto Mono"/>
+              </a:defRPr>
+            </a:lvl1pPr>
+            <a:lvl2pPr marL="914400" marR="0" lvl="1" indent="-342900" algn="l" rtl="0">
+              <a:lnSpc>
+                <a:spcPct val="115000"/>
+              </a:lnSpc>
+              <a:spcBef>
+                <a:spcPts val="2100"/>
+              </a:spcBef>
+              <a:spcAft>
+                <a:spcPts val="0"/>
+              </a:spcAft>
+              <a:buClr>
+                <a:schemeClr val="dk2"/>
+              </a:buClr>
+              <a:buSzPts val="2100"/>
+              <a:buFont typeface="Roboto Mono"/>
+              <a:buNone/>
+              <a:defRPr sz="2100" b="1" i="0" u="none" strike="noStrike" cap="none">
+                <a:solidFill>
+                  <a:schemeClr val="dk2"/>
+                </a:solidFill>
+                <a:latin typeface="Roboto Mono"/>
+                <a:ea typeface="Roboto Mono"/>
+                <a:cs typeface="Roboto Mono"/>
+                <a:sym typeface="Roboto Mono"/>
+              </a:defRPr>
+            </a:lvl2pPr>
+            <a:lvl3pPr marL="1371600" marR="0" lvl="2" indent="-342900" algn="l" rtl="0">
+              <a:lnSpc>
+                <a:spcPct val="115000"/>
+              </a:lnSpc>
+              <a:spcBef>
+                <a:spcPts val="2100"/>
+              </a:spcBef>
+              <a:spcAft>
+                <a:spcPts val="0"/>
+              </a:spcAft>
+              <a:buClr>
+                <a:schemeClr val="dk2"/>
+              </a:buClr>
+              <a:buSzPts val="2100"/>
+              <a:buFont typeface="Roboto Mono"/>
+              <a:buNone/>
+              <a:defRPr sz="2100" b="1" i="0" u="none" strike="noStrike" cap="none">
+                <a:solidFill>
+                  <a:schemeClr val="dk2"/>
+                </a:solidFill>
+                <a:latin typeface="Roboto Mono"/>
+                <a:ea typeface="Roboto Mono"/>
+                <a:cs typeface="Roboto Mono"/>
+                <a:sym typeface="Roboto Mono"/>
+              </a:defRPr>
+            </a:lvl3pPr>
+            <a:lvl4pPr marL="1828800" marR="0" lvl="3" indent="-342900" algn="l" rtl="0">
+              <a:lnSpc>
+                <a:spcPct val="115000"/>
+              </a:lnSpc>
+              <a:spcBef>
+                <a:spcPts val="2100"/>
+              </a:spcBef>
+              <a:spcAft>
+                <a:spcPts val="0"/>
+              </a:spcAft>
+              <a:buClr>
+                <a:schemeClr val="dk2"/>
+              </a:buClr>
+              <a:buSzPts val="2100"/>
+              <a:buFont typeface="Roboto Mono"/>
+              <a:buNone/>
+              <a:defRPr sz="2100" b="1" i="0" u="none" strike="noStrike" cap="none">
+                <a:solidFill>
+                  <a:schemeClr val="dk2"/>
+                </a:solidFill>
+                <a:latin typeface="Roboto Mono"/>
+                <a:ea typeface="Roboto Mono"/>
+                <a:cs typeface="Roboto Mono"/>
+                <a:sym typeface="Roboto Mono"/>
+              </a:defRPr>
+            </a:lvl4pPr>
+            <a:lvl5pPr marL="2286000" marR="0" lvl="4" indent="-342900" algn="l" rtl="0">
+              <a:lnSpc>
+                <a:spcPct val="115000"/>
+              </a:lnSpc>
+              <a:spcBef>
+                <a:spcPts val="2100"/>
+              </a:spcBef>
+              <a:spcAft>
+                <a:spcPts val="0"/>
+              </a:spcAft>
+              <a:buClr>
+                <a:schemeClr val="dk2"/>
+              </a:buClr>
+              <a:buSzPts val="2100"/>
+              <a:buFont typeface="Roboto Mono"/>
+              <a:buNone/>
+              <a:defRPr sz="2100" b="1" i="0" u="none" strike="noStrike" cap="none">
+                <a:solidFill>
+                  <a:schemeClr val="dk2"/>
+                </a:solidFill>
+                <a:latin typeface="Roboto Mono"/>
+                <a:ea typeface="Roboto Mono"/>
+                <a:cs typeface="Roboto Mono"/>
+                <a:sym typeface="Roboto Mono"/>
+              </a:defRPr>
+            </a:lvl5pPr>
+            <a:lvl6pPr marL="2743200" marR="0" lvl="5" indent="-342900" algn="l" rtl="0">
+              <a:lnSpc>
+                <a:spcPct val="115000"/>
+              </a:lnSpc>
+              <a:spcBef>
+                <a:spcPts val="2100"/>
+              </a:spcBef>
+              <a:spcAft>
+                <a:spcPts val="0"/>
+              </a:spcAft>
+              <a:buClr>
+                <a:schemeClr val="dk2"/>
+              </a:buClr>
+              <a:buSzPts val="2100"/>
+              <a:buFont typeface="Roboto Mono"/>
+              <a:buNone/>
+              <a:defRPr sz="2100" b="1" i="0" u="none" strike="noStrike" cap="none">
+                <a:solidFill>
+                  <a:schemeClr val="dk2"/>
+                </a:solidFill>
+                <a:latin typeface="Roboto Mono"/>
+                <a:ea typeface="Roboto Mono"/>
+                <a:cs typeface="Roboto Mono"/>
+                <a:sym typeface="Roboto Mono"/>
+              </a:defRPr>
+            </a:lvl6pPr>
+            <a:lvl7pPr marL="3200400" marR="0" lvl="6" indent="-342900" algn="l" rtl="0">
+              <a:lnSpc>
+                <a:spcPct val="115000"/>
+              </a:lnSpc>
+              <a:spcBef>
+                <a:spcPts val="2100"/>
+              </a:spcBef>
+              <a:spcAft>
+                <a:spcPts val="0"/>
+              </a:spcAft>
+              <a:buClr>
+                <a:schemeClr val="dk2"/>
+              </a:buClr>
+              <a:buSzPts val="2100"/>
+              <a:buFont typeface="Roboto Mono"/>
+              <a:buNone/>
+              <a:defRPr sz="2100" b="1" i="0" u="none" strike="noStrike" cap="none">
+                <a:solidFill>
+                  <a:schemeClr val="dk2"/>
+                </a:solidFill>
+                <a:latin typeface="Roboto Mono"/>
+                <a:ea typeface="Roboto Mono"/>
+                <a:cs typeface="Roboto Mono"/>
+                <a:sym typeface="Roboto Mono"/>
+              </a:defRPr>
+            </a:lvl7pPr>
+            <a:lvl8pPr marL="3657600" marR="0" lvl="7" indent="-342900" algn="l" rtl="0">
+              <a:lnSpc>
+                <a:spcPct val="115000"/>
+              </a:lnSpc>
+              <a:spcBef>
+                <a:spcPts val="2100"/>
+              </a:spcBef>
+              <a:spcAft>
+                <a:spcPts val="0"/>
+              </a:spcAft>
+              <a:buClr>
+                <a:schemeClr val="dk2"/>
+              </a:buClr>
+              <a:buSzPts val="2100"/>
+              <a:buFont typeface="Roboto Mono"/>
+              <a:buNone/>
+              <a:defRPr sz="2100" b="1" i="0" u="none" strike="noStrike" cap="none">
+                <a:solidFill>
+                  <a:schemeClr val="dk2"/>
+                </a:solidFill>
+                <a:latin typeface="Roboto Mono"/>
+                <a:ea typeface="Roboto Mono"/>
+                <a:cs typeface="Roboto Mono"/>
+                <a:sym typeface="Roboto Mono"/>
+              </a:defRPr>
+            </a:lvl8pPr>
+            <a:lvl9pPr marL="4114800" marR="0" lvl="8" indent="-342900" algn="l" rtl="0">
+              <a:lnSpc>
+                <a:spcPct val="115000"/>
+              </a:lnSpc>
+              <a:spcBef>
+                <a:spcPts val="2100"/>
+              </a:spcBef>
+              <a:spcAft>
+                <a:spcPts val="2100"/>
+              </a:spcAft>
+              <a:buClr>
+                <a:schemeClr val="dk2"/>
+              </a:buClr>
+              <a:buSzPts val="2100"/>
+              <a:buFont typeface="Roboto Mono"/>
+              <a:buNone/>
+              <a:defRPr sz="2100" b="1" i="0" u="none" strike="noStrike" cap="none">
+                <a:solidFill>
+                  <a:schemeClr val="dk2"/>
+                </a:solidFill>
+                <a:latin typeface="Roboto Mono"/>
+                <a:ea typeface="Roboto Mono"/>
+                <a:cs typeface="Roboto Mono"/>
+                <a:sym typeface="Roboto Mono"/>
+              </a:defRPr>
+            </a:lvl9pPr>
+          </a:lstStyle>
+          <a:p>
+            <a:r>
+              <a:rPr lang="en-US" dirty="0"/>
+              <a:t>Trick: </a:t>
+            </a:r>
+            <a:r>
+              <a:rPr lang="en-US" b="0" dirty="0"/>
+              <a:t>Do not close TCP connections</a:t>
+            </a:r>
+            <a:endParaRPr lang="en-US" dirty="0"/>
+          </a:p>
+        </p:txBody>
+      </p:sp>
+    </p:spTree>
+    <p:extLst>
+      <p:ext uri="{BB962C8B-B14F-4D97-AF65-F5344CB8AC3E}">
+        <p14:creationId xmlns:p14="http://schemas.microsoft.com/office/powerpoint/2010/main" val="2218624532"/>
       </p:ext>
     </p:extLst>
   </p:cSld>
@@ -28955,6 +29598,52 @@
               <a:rPr lang="en-US" b="0" dirty="0"/>
               <a:t>Spoofing IP (not difficult with UDP protocol)</a:t>
             </a:r>
+          </a:p>
+        </p:txBody>
+      </p:sp>
+      <p:sp>
+        <p:nvSpPr>
+          <p:cNvPr id="3" name="CasellaDiTesto 2">
+            <a:extLst>
+              <a:ext uri="{FF2B5EF4-FFF2-40B4-BE49-F238E27FC236}">
+                <a16:creationId xmlns:a16="http://schemas.microsoft.com/office/drawing/2014/main" id="{CB630AEC-1255-B3A4-9719-413B9CA58BA5}"/>
+              </a:ext>
+            </a:extLst>
+          </p:cNvPr>
+          <p:cNvSpPr txBox="1"/>
+          <p:nvPr/>
+        </p:nvSpPr>
+        <p:spPr>
+          <a:xfrm>
+            <a:off x="1150724" y="4918465"/>
+            <a:ext cx="6132094" cy="369332"/>
+          </a:xfrm>
+          <a:prstGeom prst="rect">
+            <a:avLst/>
+          </a:prstGeom>
+          <a:noFill/>
+        </p:spPr>
+        <p:txBody>
+          <a:bodyPr wrap="square">
+            <a:spAutoFit/>
+          </a:bodyPr>
+          <a:lstStyle/>
+          <a:p>
+            <a:r>
+              <a:rPr lang="en-US" sz="1800" u="sng" dirty="0">
+                <a:solidFill>
+                  <a:schemeClr val="bg2"/>
+                </a:solidFill>
+                <a:latin typeface="Roboto Mono" pitchFamily="49" charset="0"/>
+                <a:ea typeface="Roboto Mono" pitchFamily="49" charset="0"/>
+              </a:rPr>
+              <a:t>It is the Most used DNS-based DDoS attack</a:t>
+            </a:r>
+            <a:endParaRPr lang="en-US" sz="1800" u="sng" dirty="0">
+              <a:solidFill>
+                <a:schemeClr val="bg2"/>
+              </a:solidFill>
+            </a:endParaRPr>
           </a:p>
         </p:txBody>
       </p:sp>

</xml_diff>

<commit_message>
added speech and updated presentation
</commit_message>
<xml_diff>
--- a/Presentation/Presentation.pptx
+++ b/Presentation/Presentation.pptx
@@ -5,49 +5,50 @@
     <p:sldMasterId id="2147483668" r:id="rId1"/>
   </p:sldMasterIdLst>
   <p:notesMasterIdLst>
-    <p:notesMasterId r:id="rId14"/>
+    <p:notesMasterId r:id="rId15"/>
   </p:notesMasterIdLst>
   <p:sldIdLst>
     <p:sldId id="256" r:id="rId2"/>
     <p:sldId id="258" r:id="rId3"/>
     <p:sldId id="259" r:id="rId4"/>
-    <p:sldId id="284" r:id="rId5"/>
-    <p:sldId id="281" r:id="rId6"/>
-    <p:sldId id="283" r:id="rId7"/>
-    <p:sldId id="282" r:id="rId8"/>
-    <p:sldId id="285" r:id="rId9"/>
-    <p:sldId id="286" r:id="rId10"/>
-    <p:sldId id="261" r:id="rId11"/>
-    <p:sldId id="287" r:id="rId12"/>
-    <p:sldId id="289" r:id="rId13"/>
+    <p:sldId id="268" r:id="rId5"/>
+    <p:sldId id="284" r:id="rId6"/>
+    <p:sldId id="281" r:id="rId7"/>
+    <p:sldId id="283" r:id="rId8"/>
+    <p:sldId id="282" r:id="rId9"/>
+    <p:sldId id="285" r:id="rId10"/>
+    <p:sldId id="286" r:id="rId11"/>
+    <p:sldId id="261" r:id="rId12"/>
+    <p:sldId id="287" r:id="rId13"/>
+    <p:sldId id="289" r:id="rId14"/>
   </p:sldIdLst>
   <p:sldSz cx="12192000" cy="6858000"/>
   <p:notesSz cx="6858000" cy="9144000"/>
   <p:embeddedFontLst>
     <p:embeddedFont>
       <p:font typeface="Abril Fatface" panose="02000503000000020003" pitchFamily="2" charset="77"/>
-      <p:regular r:id="rId15"/>
+      <p:regular r:id="rId16"/>
     </p:embeddedFont>
     <p:embeddedFont>
       <p:font typeface="Calibri" panose="020F0502020204030204" pitchFamily="34" charset="0"/>
-      <p:regular r:id="rId16"/>
-      <p:bold r:id="rId17"/>
-      <p:italic r:id="rId18"/>
-      <p:boldItalic r:id="rId19"/>
+      <p:regular r:id="rId17"/>
+      <p:bold r:id="rId18"/>
+      <p:italic r:id="rId19"/>
+      <p:boldItalic r:id="rId20"/>
     </p:embeddedFont>
     <p:embeddedFont>
       <p:font typeface="Roboto" panose="02000000000000000000" pitchFamily="2" charset="0"/>
-      <p:regular r:id="rId20"/>
-      <p:bold r:id="rId21"/>
-      <p:italic r:id="rId22"/>
-      <p:boldItalic r:id="rId23"/>
+      <p:regular r:id="rId21"/>
+      <p:bold r:id="rId22"/>
+      <p:italic r:id="rId23"/>
+      <p:boldItalic r:id="rId24"/>
     </p:embeddedFont>
     <p:embeddedFont>
       <p:font typeface="Roboto Mono" pitchFamily="49" charset="0"/>
-      <p:regular r:id="rId24"/>
-      <p:bold r:id="rId25"/>
-      <p:italic r:id="rId26"/>
-      <p:boldItalic r:id="rId27"/>
+      <p:regular r:id="rId25"/>
+      <p:bold r:id="rId26"/>
+      <p:italic r:id="rId27"/>
+      <p:boldItalic r:id="rId28"/>
     </p:embeddedFont>
   </p:embeddedFontLst>
   <p:defaultTextStyle>
@@ -848,6 +849,115 @@
   <p:cSld>
     <p:spTree>
       <p:nvGrpSpPr>
+        <p:cNvPr id="1" name="Shape 453"/>
+        <p:cNvGrpSpPr/>
+        <p:nvPr/>
+      </p:nvGrpSpPr>
+      <p:grpSpPr>
+        <a:xfrm>
+          <a:off x="0" y="0"/>
+          <a:ext cx="0" cy="0"/>
+          <a:chOff x="0" y="0"/>
+          <a:chExt cx="0" cy="0"/>
+        </a:xfrm>
+      </p:grpSpPr>
+      <p:sp>
+        <p:nvSpPr>
+          <p:cNvPr id="454" name="Google Shape;454;g13a4d1c76c4_0_373:notes"/>
+          <p:cNvSpPr>
+            <a:spLocks noGrp="1" noRot="1" noChangeAspect="1"/>
+          </p:cNvSpPr>
+          <p:nvPr>
+            <p:ph type="sldImg" idx="2"/>
+          </p:nvPr>
+        </p:nvSpPr>
+        <p:spPr>
+          <a:xfrm>
+            <a:off x="381000" y="685800"/>
+            <a:ext cx="6096000" cy="3429000"/>
+          </a:xfrm>
+          <a:custGeom>
+            <a:avLst/>
+            <a:gdLst/>
+            <a:ahLst/>
+            <a:cxnLst/>
+            <a:rect l="l" t="t" r="r" b="b"/>
+            <a:pathLst>
+              <a:path w="120000" h="120000" extrusionOk="0">
+                <a:moveTo>
+                  <a:pt x="0" y="0"/>
+                </a:moveTo>
+                <a:lnTo>
+                  <a:pt x="120000" y="0"/>
+                </a:lnTo>
+                <a:lnTo>
+                  <a:pt x="120000" y="120000"/>
+                </a:lnTo>
+                <a:lnTo>
+                  <a:pt x="0" y="120000"/>
+                </a:lnTo>
+                <a:close/>
+              </a:path>
+            </a:pathLst>
+          </a:custGeom>
+        </p:spPr>
+      </p:sp>
+      <p:sp>
+        <p:nvSpPr>
+          <p:cNvPr id="455" name="Google Shape;455;g13a4d1c76c4_0_373:notes"/>
+          <p:cNvSpPr txBox="1">
+            <a:spLocks noGrp="1"/>
+          </p:cNvSpPr>
+          <p:nvPr>
+            <p:ph type="body" idx="1"/>
+          </p:nvPr>
+        </p:nvSpPr>
+        <p:spPr>
+          <a:xfrm>
+            <a:off x="685800" y="4343400"/>
+            <a:ext cx="5486400" cy="4114800"/>
+          </a:xfrm>
+          <a:prstGeom prst="rect">
+            <a:avLst/>
+          </a:prstGeom>
+        </p:spPr>
+        <p:txBody>
+          <a:bodyPr spcFirstLastPara="1" wrap="square" lIns="91425" tIns="91425" rIns="91425" bIns="91425" anchor="t" anchorCtr="0">
+            <a:noAutofit/>
+          </a:bodyPr>
+          <a:lstStyle/>
+          <a:p>
+            <a:pPr marL="0" lvl="0" indent="0" algn="l" rtl="0">
+              <a:spcBef>
+                <a:spcPts val="0"/>
+              </a:spcBef>
+              <a:spcAft>
+                <a:spcPts val="0"/>
+              </a:spcAft>
+              <a:buNone/>
+            </a:pPr>
+            <a:endParaRPr/>
+          </a:p>
+        </p:txBody>
+      </p:sp>
+    </p:spTree>
+    <p:extLst>
+      <p:ext uri="{BB962C8B-B14F-4D97-AF65-F5344CB8AC3E}">
+        <p14:creationId xmlns:p14="http://schemas.microsoft.com/office/powerpoint/2010/main" val="4106909393"/>
+      </p:ext>
+    </p:extLst>
+  </p:cSld>
+  <p:clrMapOvr>
+    <a:masterClrMapping/>
+  </p:clrMapOvr>
+</p:notes>
+</file>
+
+<file path=ppt/notesSlides/notesSlide11.xml><?xml version="1.0" encoding="utf-8"?>
+<p:notes xmlns:a="http://schemas.openxmlformats.org/drawingml/2006/main" xmlns:r="http://schemas.openxmlformats.org/officeDocument/2006/relationships" xmlns:p="http://schemas.openxmlformats.org/presentationml/2006/main" showMasterSp="0" showMasterPhAnim="0">
+  <p:cSld>
+    <p:spTree>
+      <p:nvGrpSpPr>
         <p:cNvPr id="1" name="Shape 420"/>
         <p:cNvGrpSpPr/>
         <p:nvPr/>
@@ -947,7 +1057,7 @@
 </p:notes>
 </file>
 
-<file path=ppt/notesSlides/notesSlide11.xml><?xml version="1.0" encoding="utf-8"?>
+<file path=ppt/notesSlides/notesSlide12.xml><?xml version="1.0" encoding="utf-8"?>
 <p:notes xmlns:a="http://schemas.openxmlformats.org/drawingml/2006/main" xmlns:r="http://schemas.openxmlformats.org/officeDocument/2006/relationships" xmlns:p="http://schemas.openxmlformats.org/presentationml/2006/main" showMasterSp="0" showMasterPhAnim="0">
   <p:cSld>
     <p:spTree>
@@ -1056,7 +1166,7 @@
 </p:notes>
 </file>
 
-<file path=ppt/notesSlides/notesSlide12.xml><?xml version="1.0" encoding="utf-8"?>
+<file path=ppt/notesSlides/notesSlide13.xml><?xml version="1.0" encoding="utf-8"?>
 <p:notes xmlns:a="http://schemas.openxmlformats.org/drawingml/2006/main" xmlns:r="http://schemas.openxmlformats.org/officeDocument/2006/relationships" xmlns:p="http://schemas.openxmlformats.org/presentationml/2006/main" showMasterSp="0" showMasterPhAnim="0">
   <p:cSld>
     <p:spTree>
@@ -1361,7 +1471,365 @@
               </a:spcAft>
               <a:buNone/>
             </a:pPr>
-            <a:endParaRPr/>
+            <a:r>
+              <a:rPr lang="it-IT" dirty="0" err="1"/>
+              <a:t>As</a:t>
+            </a:r>
+            <a:r>
+              <a:rPr lang="it-IT" dirty="0"/>
+              <a:t> </a:t>
+            </a:r>
+            <a:r>
+              <a:rPr lang="it-IT" dirty="0" err="1"/>
+              <a:t>you</a:t>
+            </a:r>
+            <a:r>
+              <a:rPr lang="it-IT" dirty="0"/>
+              <a:t> </a:t>
+            </a:r>
+            <a:r>
+              <a:rPr lang="it-IT" dirty="0" err="1"/>
+              <a:t>have</a:t>
+            </a:r>
+            <a:r>
+              <a:rPr lang="it-IT" dirty="0"/>
+              <a:t> </a:t>
+            </a:r>
+            <a:r>
+              <a:rPr lang="it-IT" dirty="0" err="1"/>
+              <a:t>seen</a:t>
+            </a:r>
+            <a:r>
+              <a:rPr lang="it-IT" dirty="0"/>
+              <a:t> from the first slide, </a:t>
+            </a:r>
+            <a:r>
+              <a:rPr lang="it-IT" dirty="0" err="1"/>
+              <a:t>our</a:t>
+            </a:r>
+            <a:r>
+              <a:rPr lang="it-IT" dirty="0"/>
+              <a:t> project </a:t>
+            </a:r>
+            <a:r>
+              <a:rPr lang="it-IT" dirty="0" err="1"/>
+              <a:t>is</a:t>
+            </a:r>
+            <a:r>
+              <a:rPr lang="it-IT" dirty="0"/>
+              <a:t> </a:t>
+            </a:r>
+            <a:r>
+              <a:rPr lang="it-IT" dirty="0" err="1"/>
+              <a:t>about</a:t>
+            </a:r>
+            <a:r>
+              <a:rPr lang="it-IT" dirty="0"/>
+              <a:t> the </a:t>
+            </a:r>
+            <a:r>
+              <a:rPr lang="it-IT" dirty="0" err="1"/>
+              <a:t>implmenetation</a:t>
+            </a:r>
+            <a:r>
+              <a:rPr lang="it-IT" dirty="0"/>
+              <a:t> of a </a:t>
+            </a:r>
+            <a:r>
+              <a:rPr lang="it-IT" dirty="0" err="1"/>
+              <a:t>DDoS</a:t>
+            </a:r>
+            <a:r>
+              <a:rPr lang="it-IT" dirty="0"/>
+              <a:t> </a:t>
+            </a:r>
+            <a:r>
+              <a:rPr lang="it-IT" dirty="0" err="1"/>
+              <a:t>attack</a:t>
+            </a:r>
+            <a:r>
+              <a:rPr lang="it-IT" dirty="0"/>
+              <a:t>, </a:t>
+            </a:r>
+            <a:r>
+              <a:rPr lang="it-IT" dirty="0" err="1"/>
+              <a:t>specifically</a:t>
+            </a:r>
+            <a:r>
+              <a:rPr lang="it-IT" dirty="0"/>
+              <a:t> a DNS </a:t>
+            </a:r>
+            <a:r>
+              <a:rPr lang="it-IT" dirty="0" err="1"/>
+              <a:t>reflection</a:t>
+            </a:r>
+            <a:r>
+              <a:rPr lang="it-IT" dirty="0"/>
+              <a:t> and </a:t>
+            </a:r>
+            <a:r>
+              <a:rPr lang="it-IT" dirty="0" err="1"/>
+              <a:t>amplification</a:t>
+            </a:r>
+            <a:r>
+              <a:rPr lang="it-IT" dirty="0"/>
+              <a:t> </a:t>
+            </a:r>
+            <a:r>
+              <a:rPr lang="it-IT" dirty="0" err="1"/>
+              <a:t>attack</a:t>
+            </a:r>
+            <a:r>
+              <a:rPr lang="it-IT" dirty="0"/>
+              <a:t>.</a:t>
+            </a:r>
+          </a:p>
+          <a:p>
+            <a:pPr marL="0" lvl="0" indent="0" algn="l" rtl="0">
+              <a:spcBef>
+                <a:spcPts val="0"/>
+              </a:spcBef>
+              <a:spcAft>
+                <a:spcPts val="0"/>
+              </a:spcAft>
+              <a:buNone/>
+            </a:pPr>
+            <a:endParaRPr lang="it-IT" dirty="0"/>
+          </a:p>
+          <a:p>
+            <a:pPr marL="0" lvl="0" indent="0" algn="l" rtl="0">
+              <a:spcBef>
+                <a:spcPts val="0"/>
+              </a:spcBef>
+              <a:spcAft>
+                <a:spcPts val="0"/>
+              </a:spcAft>
+              <a:buNone/>
+            </a:pPr>
+            <a:r>
+              <a:rPr lang="it-IT" dirty="0"/>
+              <a:t>The </a:t>
+            </a:r>
+            <a:r>
+              <a:rPr lang="it-IT" dirty="0" err="1"/>
+              <a:t>choice</a:t>
+            </a:r>
+            <a:r>
+              <a:rPr lang="it-IT" dirty="0"/>
+              <a:t> </a:t>
+            </a:r>
+            <a:r>
+              <a:rPr lang="it-IT" dirty="0" err="1"/>
+              <a:t>was</a:t>
+            </a:r>
+            <a:r>
+              <a:rPr lang="it-IT" dirty="0"/>
+              <a:t> </a:t>
+            </a:r>
+            <a:r>
+              <a:rPr lang="it-IT" dirty="0" err="1"/>
+              <a:t>not</a:t>
+            </a:r>
+            <a:r>
+              <a:rPr lang="it-IT" dirty="0"/>
+              <a:t> made </a:t>
+            </a:r>
+            <a:r>
+              <a:rPr lang="it-IT" dirty="0" err="1"/>
+              <a:t>at</a:t>
+            </a:r>
+            <a:r>
+              <a:rPr lang="it-IT" dirty="0"/>
+              <a:t> random, </a:t>
+            </a:r>
+            <a:r>
+              <a:rPr lang="it-IT" dirty="0" err="1"/>
+              <a:t>instead</a:t>
+            </a:r>
+            <a:r>
+              <a:rPr lang="it-IT" dirty="0"/>
+              <a:t> </a:t>
+            </a:r>
+            <a:r>
+              <a:rPr lang="it-IT" dirty="0" err="1"/>
+              <a:t>it</a:t>
+            </a:r>
+            <a:r>
+              <a:rPr lang="it-IT" dirty="0"/>
+              <a:t> </a:t>
+            </a:r>
+            <a:r>
+              <a:rPr lang="it-IT" dirty="0" err="1"/>
+              <a:t>was</a:t>
+            </a:r>
+            <a:r>
+              <a:rPr lang="it-IT" dirty="0"/>
+              <a:t> the </a:t>
+            </a:r>
+            <a:r>
+              <a:rPr lang="it-IT" dirty="0" err="1"/>
+              <a:t>result</a:t>
+            </a:r>
+            <a:r>
+              <a:rPr lang="it-IT" dirty="0"/>
+              <a:t> of a </a:t>
+            </a:r>
+            <a:r>
+              <a:rPr lang="it-IT" dirty="0" err="1"/>
+              <a:t>selection</a:t>
+            </a:r>
+            <a:r>
+              <a:rPr lang="it-IT" dirty="0"/>
+              <a:t> and </a:t>
+            </a:r>
+            <a:r>
+              <a:rPr lang="it-IT" dirty="0" err="1"/>
+              <a:t>research</a:t>
+            </a:r>
+            <a:r>
+              <a:rPr lang="it-IT" dirty="0"/>
+              <a:t> </a:t>
+            </a:r>
+            <a:r>
+              <a:rPr lang="it-IT" dirty="0" err="1"/>
+              <a:t>process</a:t>
+            </a:r>
+            <a:r>
+              <a:rPr lang="it-IT" dirty="0"/>
+              <a:t>.</a:t>
+            </a:r>
+          </a:p>
+          <a:p>
+            <a:pPr marL="0" lvl="0" indent="0" algn="l" rtl="0">
+              <a:spcBef>
+                <a:spcPts val="0"/>
+              </a:spcBef>
+              <a:spcAft>
+                <a:spcPts val="0"/>
+              </a:spcAft>
+              <a:buNone/>
+            </a:pPr>
+            <a:endParaRPr lang="it-IT" dirty="0"/>
+          </a:p>
+          <a:p>
+            <a:pPr marL="0" lvl="0" indent="0" algn="l" rtl="0">
+              <a:spcBef>
+                <a:spcPts val="0"/>
+              </a:spcBef>
+              <a:spcAft>
+                <a:spcPts val="0"/>
+              </a:spcAft>
+              <a:buNone/>
+            </a:pPr>
+            <a:r>
+              <a:rPr lang="it-IT" dirty="0"/>
+              <a:t>In the </a:t>
+            </a:r>
+            <a:r>
+              <a:rPr lang="it-IT" dirty="0" err="1"/>
+              <a:t>next</a:t>
+            </a:r>
+            <a:r>
+              <a:rPr lang="it-IT" dirty="0"/>
+              <a:t> slides </a:t>
+            </a:r>
+            <a:r>
+              <a:rPr lang="it-IT" dirty="0" err="1"/>
+              <a:t>i'm</a:t>
+            </a:r>
+            <a:r>
+              <a:rPr lang="it-IT" dirty="0"/>
+              <a:t> gonna introduce </a:t>
+            </a:r>
+            <a:r>
+              <a:rPr lang="it-IT" dirty="0" err="1"/>
+              <a:t>you</a:t>
+            </a:r>
+            <a:r>
+              <a:rPr lang="it-IT" dirty="0"/>
+              <a:t> to the </a:t>
+            </a:r>
+            <a:r>
+              <a:rPr lang="it-IT" dirty="0" err="1"/>
+              <a:t>reasons</a:t>
+            </a:r>
+            <a:r>
+              <a:rPr lang="it-IT" dirty="0"/>
+              <a:t> </a:t>
+            </a:r>
+            <a:r>
+              <a:rPr lang="it-IT" dirty="0" err="1"/>
+              <a:t>behind</a:t>
+            </a:r>
+            <a:r>
+              <a:rPr lang="it-IT" dirty="0"/>
+              <a:t> </a:t>
+            </a:r>
+            <a:r>
+              <a:rPr lang="it-IT" dirty="0" err="1"/>
+              <a:t>our</a:t>
+            </a:r>
+            <a:r>
+              <a:rPr lang="it-IT" dirty="0"/>
+              <a:t> </a:t>
+            </a:r>
+            <a:r>
+              <a:rPr lang="it-IT" dirty="0" err="1"/>
+              <a:t>choice</a:t>
+            </a:r>
+            <a:r>
+              <a:rPr lang="it-IT" dirty="0"/>
+              <a:t> and </a:t>
+            </a:r>
+            <a:r>
+              <a:rPr lang="it-IT" dirty="0" err="1"/>
+              <a:t>we</a:t>
+            </a:r>
+            <a:r>
+              <a:rPr lang="it-IT" dirty="0"/>
+              <a:t> are gonna </a:t>
+            </a:r>
+            <a:r>
+              <a:rPr lang="it-IT" dirty="0" err="1"/>
+              <a:t>see</a:t>
+            </a:r>
+            <a:r>
+              <a:rPr lang="it-IT" dirty="0"/>
+              <a:t> </a:t>
+            </a:r>
+            <a:r>
+              <a:rPr lang="it-IT" dirty="0" err="1"/>
+              <a:t>briefly</a:t>
+            </a:r>
+            <a:r>
+              <a:rPr lang="it-IT" dirty="0"/>
+              <a:t> some </a:t>
+            </a:r>
+            <a:r>
+              <a:rPr lang="it-IT" dirty="0" err="1"/>
+              <a:t>kinds</a:t>
+            </a:r>
+            <a:r>
+              <a:rPr lang="it-IT" dirty="0"/>
+              <a:t> of </a:t>
+            </a:r>
+            <a:r>
+              <a:rPr lang="it-IT" dirty="0" err="1"/>
+              <a:t>DDoS</a:t>
+            </a:r>
+            <a:r>
+              <a:rPr lang="it-IT" dirty="0"/>
+              <a:t> </a:t>
+            </a:r>
+            <a:r>
+              <a:rPr lang="it-IT" dirty="0" err="1"/>
+              <a:t>attacks</a:t>
+            </a:r>
+            <a:r>
+              <a:rPr lang="it-IT" dirty="0"/>
+              <a:t>.</a:t>
+            </a:r>
+            <a:endParaRPr dirty="0"/>
           </a:p>
         </p:txBody>
       </p:sp>
@@ -1374,6 +1842,365 @@
 </file>
 
 <file path=ppt/notesSlides/notesSlide4.xml><?xml version="1.0" encoding="utf-8"?>
+<p:notes xmlns:a="http://schemas.openxmlformats.org/drawingml/2006/main" xmlns:r="http://schemas.openxmlformats.org/officeDocument/2006/relationships" xmlns:p="http://schemas.openxmlformats.org/presentationml/2006/main" showMasterSp="0" showMasterPhAnim="0">
+  <p:cSld>
+    <p:spTree>
+      <p:nvGrpSpPr>
+        <p:cNvPr id="1" name="Shape 492"/>
+        <p:cNvGrpSpPr/>
+        <p:nvPr/>
+      </p:nvGrpSpPr>
+      <p:grpSpPr>
+        <a:xfrm>
+          <a:off x="0" y="0"/>
+          <a:ext cx="0" cy="0"/>
+          <a:chOff x="0" y="0"/>
+          <a:chExt cx="0" cy="0"/>
+        </a:xfrm>
+      </p:grpSpPr>
+      <p:sp>
+        <p:nvSpPr>
+          <p:cNvPr id="493" name="Google Shape;493;g111c3728c19_0_108:notes"/>
+          <p:cNvSpPr>
+            <a:spLocks noGrp="1" noRot="1" noChangeAspect="1"/>
+          </p:cNvSpPr>
+          <p:nvPr>
+            <p:ph type="sldImg" idx="2"/>
+          </p:nvPr>
+        </p:nvSpPr>
+        <p:spPr>
+          <a:xfrm>
+            <a:off x="381000" y="685800"/>
+            <a:ext cx="6096000" cy="3429000"/>
+          </a:xfrm>
+          <a:custGeom>
+            <a:avLst/>
+            <a:gdLst/>
+            <a:ahLst/>
+            <a:cxnLst/>
+            <a:rect l="l" t="t" r="r" b="b"/>
+            <a:pathLst>
+              <a:path w="120000" h="120000" extrusionOk="0">
+                <a:moveTo>
+                  <a:pt x="0" y="0"/>
+                </a:moveTo>
+                <a:lnTo>
+                  <a:pt x="120000" y="0"/>
+                </a:lnTo>
+                <a:lnTo>
+                  <a:pt x="120000" y="120000"/>
+                </a:lnTo>
+                <a:lnTo>
+                  <a:pt x="0" y="120000"/>
+                </a:lnTo>
+                <a:close/>
+              </a:path>
+            </a:pathLst>
+          </a:custGeom>
+        </p:spPr>
+      </p:sp>
+      <p:sp>
+        <p:nvSpPr>
+          <p:cNvPr id="494" name="Google Shape;494;g111c3728c19_0_108:notes"/>
+          <p:cNvSpPr txBox="1">
+            <a:spLocks noGrp="1"/>
+          </p:cNvSpPr>
+          <p:nvPr>
+            <p:ph type="body" idx="1"/>
+          </p:nvPr>
+        </p:nvSpPr>
+        <p:spPr>
+          <a:xfrm>
+            <a:off x="685800" y="4343400"/>
+            <a:ext cx="5486400" cy="4114800"/>
+          </a:xfrm>
+          <a:prstGeom prst="rect">
+            <a:avLst/>
+          </a:prstGeom>
+        </p:spPr>
+        <p:txBody>
+          <a:bodyPr spcFirstLastPara="1" wrap="square" lIns="91425" tIns="91425" rIns="91425" bIns="91425" anchor="t" anchorCtr="0">
+            <a:noAutofit/>
+          </a:bodyPr>
+          <a:lstStyle/>
+          <a:p>
+            <a:pPr marL="0" lvl="0" indent="0" algn="l" rtl="0">
+              <a:spcBef>
+                <a:spcPts val="0"/>
+              </a:spcBef>
+              <a:spcAft>
+                <a:spcPts val="0"/>
+              </a:spcAft>
+              <a:buNone/>
+            </a:pPr>
+            <a:r>
+              <a:rPr lang="it-IT" dirty="0" err="1"/>
+              <a:t>We</a:t>
+            </a:r>
+            <a:r>
+              <a:rPr lang="it-IT" dirty="0"/>
+              <a:t> </a:t>
+            </a:r>
+            <a:r>
+              <a:rPr lang="it-IT" dirty="0" err="1"/>
+              <a:t>started</a:t>
+            </a:r>
+            <a:r>
+              <a:rPr lang="it-IT" dirty="0"/>
+              <a:t> from the </a:t>
+            </a:r>
+            <a:r>
+              <a:rPr lang="it-IT" dirty="0" err="1"/>
+              <a:t>intention</a:t>
+            </a:r>
+            <a:r>
+              <a:rPr lang="it-IT" dirty="0"/>
+              <a:t> of </a:t>
+            </a:r>
+            <a:r>
+              <a:rPr lang="it-IT" dirty="0" err="1"/>
+              <a:t>simulating</a:t>
+            </a:r>
+            <a:r>
+              <a:rPr lang="it-IT" dirty="0"/>
+              <a:t> a </a:t>
+            </a:r>
+            <a:r>
+              <a:rPr lang="it-IT" dirty="0" err="1"/>
+              <a:t>DDoS</a:t>
+            </a:r>
+            <a:r>
+              <a:rPr lang="it-IT" dirty="0"/>
+              <a:t> </a:t>
+            </a:r>
+            <a:r>
+              <a:rPr lang="it-IT" dirty="0" err="1"/>
+              <a:t>attack</a:t>
+            </a:r>
+            <a:r>
+              <a:rPr lang="it-IT" dirty="0"/>
+              <a:t>, </a:t>
+            </a:r>
+            <a:r>
+              <a:rPr lang="it-IT" dirty="0" err="1"/>
+              <a:t>however</a:t>
+            </a:r>
+            <a:r>
+              <a:rPr lang="it-IT" dirty="0"/>
+              <a:t> </a:t>
+            </a:r>
+            <a:r>
+              <a:rPr lang="it-IT" dirty="0" err="1"/>
+              <a:t>as</a:t>
+            </a:r>
+            <a:r>
+              <a:rPr lang="it-IT" dirty="0"/>
+              <a:t> </a:t>
+            </a:r>
+            <a:r>
+              <a:rPr lang="it-IT" dirty="0" err="1"/>
+              <a:t>you</a:t>
+            </a:r>
+            <a:r>
+              <a:rPr lang="it-IT" dirty="0"/>
+              <a:t> can </a:t>
+            </a:r>
+            <a:r>
+              <a:rPr lang="it-IT" dirty="0" err="1"/>
+              <a:t>see</a:t>
+            </a:r>
+            <a:r>
+              <a:rPr lang="it-IT" dirty="0"/>
+              <a:t> from the figure, </a:t>
+            </a:r>
+            <a:r>
+              <a:rPr lang="it-IT" dirty="0" err="1"/>
+              <a:t>there</a:t>
+            </a:r>
+            <a:r>
+              <a:rPr lang="it-IT" dirty="0"/>
+              <a:t> </a:t>
+            </a:r>
+            <a:r>
+              <a:rPr lang="it-IT" dirty="0" err="1"/>
+              <a:t>many</a:t>
+            </a:r>
+            <a:r>
+              <a:rPr lang="it-IT" dirty="0"/>
+              <a:t> </a:t>
+            </a:r>
+            <a:r>
+              <a:rPr lang="it-IT" dirty="0" err="1"/>
+              <a:t>different</a:t>
+            </a:r>
+            <a:r>
+              <a:rPr lang="it-IT" dirty="0"/>
+              <a:t> ways in </a:t>
+            </a:r>
+            <a:r>
+              <a:rPr lang="it-IT" dirty="0" err="1"/>
+              <a:t>which</a:t>
+            </a:r>
+            <a:r>
+              <a:rPr lang="it-IT" dirty="0"/>
+              <a:t> </a:t>
+            </a:r>
+            <a:r>
+              <a:rPr lang="it-IT" dirty="0" err="1"/>
+              <a:t>this</a:t>
+            </a:r>
+            <a:r>
+              <a:rPr lang="it-IT" dirty="0"/>
+              <a:t> </a:t>
+            </a:r>
+            <a:r>
+              <a:rPr lang="it-IT" dirty="0" err="1"/>
+              <a:t>type</a:t>
+            </a:r>
+            <a:r>
+              <a:rPr lang="it-IT" dirty="0"/>
+              <a:t> of </a:t>
+            </a:r>
+            <a:r>
+              <a:rPr lang="it-IT" dirty="0" err="1"/>
+              <a:t>attack</a:t>
+            </a:r>
+            <a:r>
+              <a:rPr lang="it-IT" dirty="0"/>
+              <a:t> can be </a:t>
+            </a:r>
+            <a:r>
+              <a:rPr lang="it-IT" dirty="0" err="1"/>
+              <a:t>performed</a:t>
+            </a:r>
+            <a:r>
+              <a:rPr lang="it-IT" dirty="0"/>
+              <a:t>. </a:t>
+            </a:r>
+          </a:p>
+          <a:p>
+            <a:pPr marL="0" lvl="0" indent="0" algn="l" rtl="0">
+              <a:spcBef>
+                <a:spcPts val="0"/>
+              </a:spcBef>
+              <a:spcAft>
+                <a:spcPts val="0"/>
+              </a:spcAft>
+              <a:buNone/>
+            </a:pPr>
+            <a:endParaRPr lang="it-IT" dirty="0"/>
+          </a:p>
+          <a:p>
+            <a:pPr marL="0" lvl="0" indent="0" algn="l" rtl="0">
+              <a:spcBef>
+                <a:spcPts val="0"/>
+              </a:spcBef>
+              <a:spcAft>
+                <a:spcPts val="0"/>
+              </a:spcAft>
+              <a:buNone/>
+            </a:pPr>
+            <a:r>
+              <a:rPr lang="it-IT" dirty="0" err="1"/>
+              <a:t>Our</a:t>
+            </a:r>
+            <a:r>
+              <a:rPr lang="it-IT" dirty="0"/>
+              <a:t> goal </a:t>
+            </a:r>
+            <a:r>
+              <a:rPr lang="it-IT" dirty="0" err="1"/>
+              <a:t>was</a:t>
+            </a:r>
+            <a:r>
+              <a:rPr lang="it-IT" dirty="0"/>
+              <a:t> </a:t>
+            </a:r>
+            <a:r>
+              <a:rPr lang="it-IT" dirty="0" err="1"/>
+              <a:t>that</a:t>
+            </a:r>
+            <a:r>
+              <a:rPr lang="it-IT" dirty="0"/>
+              <a:t> of </a:t>
+            </a:r>
+            <a:r>
+              <a:rPr lang="it-IT" dirty="0" err="1"/>
+              <a:t>experimenting</a:t>
+            </a:r>
+            <a:r>
+              <a:rPr lang="it-IT" dirty="0"/>
+              <a:t> </a:t>
+            </a:r>
+            <a:r>
+              <a:rPr lang="it-IT" dirty="0" err="1"/>
+              <a:t>something</a:t>
+            </a:r>
+            <a:r>
+              <a:rPr lang="it-IT" dirty="0"/>
+              <a:t> </a:t>
+            </a:r>
+            <a:r>
+              <a:rPr lang="it-IT" dirty="0" err="1"/>
+              <a:t>commonly</a:t>
+            </a:r>
+            <a:r>
+              <a:rPr lang="it-IT" dirty="0"/>
+              <a:t> </a:t>
+            </a:r>
+            <a:r>
+              <a:rPr lang="it-IT" dirty="0" err="1"/>
+              <a:t>used</a:t>
+            </a:r>
+            <a:r>
+              <a:rPr lang="it-IT" dirty="0"/>
+              <a:t> in </a:t>
+            </a:r>
+            <a:r>
+              <a:rPr lang="it-IT" dirty="0" err="1"/>
+              <a:t>real</a:t>
+            </a:r>
+            <a:r>
+              <a:rPr lang="it-IT" dirty="0"/>
+              <a:t> word situations and </a:t>
+            </a:r>
+            <a:r>
+              <a:rPr lang="it-IT" dirty="0" err="1"/>
+              <a:t>not</a:t>
+            </a:r>
+            <a:r>
+              <a:rPr lang="it-IT" dirty="0"/>
+              <a:t> just in </a:t>
+            </a:r>
+            <a:r>
+              <a:rPr lang="it-IT" dirty="0" err="1"/>
+              <a:t>sporadic</a:t>
+            </a:r>
+            <a:r>
+              <a:rPr lang="it-IT" dirty="0"/>
+              <a:t> </a:t>
+            </a:r>
+            <a:r>
+              <a:rPr lang="it-IT" dirty="0" err="1"/>
+              <a:t>cases</a:t>
+            </a:r>
+            <a:r>
+              <a:rPr lang="it-IT" dirty="0"/>
+              <a:t>.</a:t>
+            </a:r>
+            <a:endParaRPr dirty="0"/>
+          </a:p>
+        </p:txBody>
+      </p:sp>
+    </p:spTree>
+  </p:cSld>
+  <p:clrMapOvr>
+    <a:masterClrMapping/>
+  </p:clrMapOvr>
+</p:notes>
+</file>
+
+<file path=ppt/notesSlides/notesSlide5.xml><?xml version="1.0" encoding="utf-8"?>
 <p:notes xmlns:a="http://schemas.openxmlformats.org/drawingml/2006/main" xmlns:r="http://schemas.openxmlformats.org/officeDocument/2006/relationships" xmlns:p="http://schemas.openxmlformats.org/presentationml/2006/main" showMasterSp="0" showMasterPhAnim="0">
   <p:cSld>
     <p:spTree>
@@ -1465,7 +2292,273 @@
               </a:spcAft>
               <a:buNone/>
             </a:pPr>
-            <a:endParaRPr/>
+            <a:r>
+              <a:rPr lang="it-IT" dirty="0" err="1"/>
+              <a:t>We</a:t>
+            </a:r>
+            <a:r>
+              <a:rPr lang="it-IT" dirty="0"/>
+              <a:t> </a:t>
+            </a:r>
+            <a:r>
+              <a:rPr lang="it-IT" dirty="0" err="1"/>
+              <a:t>discovered</a:t>
+            </a:r>
+            <a:r>
+              <a:rPr lang="it-IT" dirty="0"/>
+              <a:t> </a:t>
+            </a:r>
+            <a:r>
+              <a:rPr lang="it-IT" dirty="0" err="1"/>
+              <a:t>that</a:t>
+            </a:r>
+            <a:r>
+              <a:rPr lang="it-IT" dirty="0"/>
+              <a:t> </a:t>
+            </a:r>
+            <a:r>
+              <a:rPr lang="it-IT" dirty="0" err="1"/>
+              <a:t>according</a:t>
+            </a:r>
+            <a:r>
+              <a:rPr lang="it-IT" dirty="0"/>
+              <a:t> to a </a:t>
+            </a:r>
+            <a:r>
+              <a:rPr lang="it-IT" dirty="0" err="1"/>
+              <a:t>recent</a:t>
+            </a:r>
+            <a:r>
+              <a:rPr lang="it-IT" dirty="0"/>
+              <a:t> report by </a:t>
+            </a:r>
+            <a:r>
+              <a:rPr lang="it-IT" dirty="0" err="1"/>
+              <a:t>cloudflare</a:t>
+            </a:r>
+            <a:r>
+              <a:rPr lang="it-IT" dirty="0"/>
+              <a:t>, </a:t>
+            </a:r>
+            <a:r>
+              <a:rPr lang="it-IT" dirty="0" err="1"/>
+              <a:t>published</a:t>
+            </a:r>
+            <a:r>
+              <a:rPr lang="it-IT" dirty="0"/>
+              <a:t> in the first quarter of 2023, </a:t>
+            </a:r>
+            <a:r>
+              <a:rPr lang="it-IT" dirty="0" err="1"/>
+              <a:t>almost</a:t>
+            </a:r>
+            <a:r>
+              <a:rPr lang="it-IT" dirty="0"/>
+              <a:t> 1/3 of </a:t>
+            </a:r>
+            <a:r>
+              <a:rPr lang="it-IT" dirty="0" err="1"/>
+              <a:t>all</a:t>
+            </a:r>
+            <a:r>
+              <a:rPr lang="it-IT" dirty="0"/>
+              <a:t> the </a:t>
+            </a:r>
+            <a:r>
+              <a:rPr lang="it-IT" dirty="0" err="1"/>
+              <a:t>DDoS</a:t>
+            </a:r>
+            <a:r>
+              <a:rPr lang="it-IT" dirty="0"/>
+              <a:t> </a:t>
+            </a:r>
+            <a:r>
+              <a:rPr lang="it-IT" dirty="0" err="1"/>
+              <a:t>attacks</a:t>
+            </a:r>
+            <a:r>
+              <a:rPr lang="it-IT" dirty="0"/>
+              <a:t> are DNS </a:t>
+            </a:r>
+            <a:r>
+              <a:rPr lang="it-IT" dirty="0" err="1"/>
+              <a:t>based</a:t>
+            </a:r>
+            <a:r>
+              <a:rPr lang="it-IT" dirty="0"/>
+              <a:t>.</a:t>
+            </a:r>
+          </a:p>
+          <a:p>
+            <a:pPr marL="0" lvl="0" indent="0" algn="l" rtl="0">
+              <a:spcBef>
+                <a:spcPts val="0"/>
+              </a:spcBef>
+              <a:spcAft>
+                <a:spcPts val="0"/>
+              </a:spcAft>
+              <a:buNone/>
+            </a:pPr>
+            <a:endParaRPr lang="it-IT" dirty="0"/>
+          </a:p>
+          <a:p>
+            <a:pPr marL="0" lvl="0" indent="0" algn="l" rtl="0">
+              <a:spcBef>
+                <a:spcPts val="0"/>
+              </a:spcBef>
+              <a:spcAft>
+                <a:spcPts val="0"/>
+              </a:spcAft>
+              <a:buNone/>
+            </a:pPr>
+            <a:r>
+              <a:rPr lang="it-IT" dirty="0" err="1"/>
+              <a:t>However</a:t>
+            </a:r>
+            <a:r>
+              <a:rPr lang="it-IT" dirty="0"/>
+              <a:t> </a:t>
+            </a:r>
+            <a:r>
+              <a:rPr lang="it-IT" dirty="0" err="1"/>
+              <a:t>also</a:t>
+            </a:r>
+            <a:r>
+              <a:rPr lang="it-IT" dirty="0"/>
+              <a:t> inside the sub-</a:t>
+            </a:r>
+            <a:r>
+              <a:rPr lang="it-IT" dirty="0" err="1"/>
+              <a:t>category</a:t>
+            </a:r>
+            <a:r>
+              <a:rPr lang="it-IT" dirty="0"/>
+              <a:t> of the </a:t>
+            </a:r>
+            <a:r>
+              <a:rPr lang="it-IT" dirty="0" err="1"/>
+              <a:t>dns-based</a:t>
+            </a:r>
+            <a:r>
+              <a:rPr lang="it-IT" dirty="0"/>
+              <a:t> </a:t>
+            </a:r>
+            <a:r>
+              <a:rPr lang="it-IT" dirty="0" err="1"/>
+              <a:t>attack</a:t>
+            </a:r>
+            <a:r>
+              <a:rPr lang="it-IT" dirty="0"/>
+              <a:t> </a:t>
+            </a:r>
+            <a:r>
+              <a:rPr lang="it-IT" dirty="0" err="1"/>
+              <a:t>there</a:t>
+            </a:r>
+            <a:r>
+              <a:rPr lang="it-IT" dirty="0"/>
+              <a:t> are </a:t>
+            </a:r>
+            <a:r>
+              <a:rPr lang="it-IT" dirty="0" err="1"/>
+              <a:t>several</a:t>
+            </a:r>
+            <a:r>
+              <a:rPr lang="it-IT" dirty="0"/>
+              <a:t> </a:t>
+            </a:r>
+            <a:r>
+              <a:rPr lang="it-IT" dirty="0" err="1"/>
+              <a:t>possibilites</a:t>
+            </a:r>
+            <a:r>
+              <a:rPr lang="it-IT" dirty="0"/>
+              <a:t> and </a:t>
+            </a:r>
+            <a:r>
+              <a:rPr lang="it-IT" dirty="0" err="1"/>
+              <a:t>here</a:t>
+            </a:r>
+            <a:r>
+              <a:rPr lang="it-IT" dirty="0"/>
+              <a:t> are </a:t>
+            </a:r>
+            <a:r>
+              <a:rPr lang="it-IT" dirty="0" err="1"/>
+              <a:t>listed</a:t>
+            </a:r>
+            <a:r>
+              <a:rPr lang="it-IT" dirty="0"/>
+              <a:t> the </a:t>
+            </a:r>
+            <a:r>
+              <a:rPr lang="it-IT" dirty="0" err="1"/>
+              <a:t>three</a:t>
+            </a:r>
+            <a:r>
+              <a:rPr lang="it-IT" dirty="0"/>
+              <a:t> </a:t>
+            </a:r>
+            <a:r>
+              <a:rPr lang="it-IT" dirty="0" err="1"/>
+              <a:t>most</a:t>
+            </a:r>
+            <a:r>
+              <a:rPr lang="it-IT" dirty="0"/>
+              <a:t> </a:t>
+            </a:r>
+            <a:r>
+              <a:rPr lang="it-IT" dirty="0" err="1"/>
+              <a:t>important</a:t>
+            </a:r>
+            <a:r>
+              <a:rPr lang="it-IT" dirty="0"/>
+              <a:t>.</a:t>
+            </a:r>
+          </a:p>
+          <a:p>
+            <a:pPr marL="0" lvl="0" indent="0" algn="l" rtl="0">
+              <a:spcBef>
+                <a:spcPts val="0"/>
+              </a:spcBef>
+              <a:spcAft>
+                <a:spcPts val="0"/>
+              </a:spcAft>
+              <a:buNone/>
+            </a:pPr>
+            <a:endParaRPr lang="it-IT" dirty="0"/>
+          </a:p>
+          <a:p>
+            <a:pPr marL="0" lvl="0" indent="0" algn="l" rtl="0">
+              <a:spcBef>
+                <a:spcPts val="0"/>
+              </a:spcBef>
+              <a:spcAft>
+                <a:spcPts val="0"/>
+              </a:spcAft>
+              <a:buNone/>
+            </a:pPr>
+            <a:r>
+              <a:rPr lang="it-IT" dirty="0"/>
+              <a:t>DNS query flood, TCP flood and DNS </a:t>
+            </a:r>
+            <a:r>
+              <a:rPr lang="it-IT" dirty="0" err="1"/>
+              <a:t>reflection</a:t>
+            </a:r>
+            <a:r>
+              <a:rPr lang="it-IT" dirty="0"/>
+              <a:t> and </a:t>
+            </a:r>
+            <a:r>
+              <a:rPr lang="it-IT" dirty="0" err="1"/>
+              <a:t>amplification</a:t>
+            </a:r>
+            <a:r>
+              <a:rPr lang="it-IT" dirty="0"/>
+              <a:t>.</a:t>
+            </a:r>
+            <a:endParaRPr dirty="0"/>
           </a:p>
         </p:txBody>
       </p:sp>
@@ -1473,115 +2566,6 @@
     <p:extLst>
       <p:ext uri="{BB962C8B-B14F-4D97-AF65-F5344CB8AC3E}">
         <p14:creationId xmlns:p14="http://schemas.microsoft.com/office/powerpoint/2010/main" val="1316498722"/>
-      </p:ext>
-    </p:extLst>
-  </p:cSld>
-  <p:clrMapOvr>
-    <a:masterClrMapping/>
-  </p:clrMapOvr>
-</p:notes>
-</file>
-
-<file path=ppt/notesSlides/notesSlide5.xml><?xml version="1.0" encoding="utf-8"?>
-<p:notes xmlns:a="http://schemas.openxmlformats.org/drawingml/2006/main" xmlns:r="http://schemas.openxmlformats.org/officeDocument/2006/relationships" xmlns:p="http://schemas.openxmlformats.org/presentationml/2006/main" showMasterSp="0" showMasterPhAnim="0">
-  <p:cSld>
-    <p:spTree>
-      <p:nvGrpSpPr>
-        <p:cNvPr id="1" name="Shape 413"/>
-        <p:cNvGrpSpPr/>
-        <p:nvPr/>
-      </p:nvGrpSpPr>
-      <p:grpSpPr>
-        <a:xfrm>
-          <a:off x="0" y="0"/>
-          <a:ext cx="0" cy="0"/>
-          <a:chOff x="0" y="0"/>
-          <a:chExt cx="0" cy="0"/>
-        </a:xfrm>
-      </p:grpSpPr>
-      <p:sp>
-        <p:nvSpPr>
-          <p:cNvPr id="414" name="Google Shape;414;ga073618e60_0_63:notes"/>
-          <p:cNvSpPr>
-            <a:spLocks noGrp="1" noRot="1" noChangeAspect="1"/>
-          </p:cNvSpPr>
-          <p:nvPr>
-            <p:ph type="sldImg" idx="2"/>
-          </p:nvPr>
-        </p:nvSpPr>
-        <p:spPr>
-          <a:xfrm>
-            <a:off x="381000" y="685800"/>
-            <a:ext cx="6096000" cy="3429000"/>
-          </a:xfrm>
-          <a:custGeom>
-            <a:avLst/>
-            <a:gdLst/>
-            <a:ahLst/>
-            <a:cxnLst/>
-            <a:rect l="l" t="t" r="r" b="b"/>
-            <a:pathLst>
-              <a:path w="120000" h="120000" extrusionOk="0">
-                <a:moveTo>
-                  <a:pt x="0" y="0"/>
-                </a:moveTo>
-                <a:lnTo>
-                  <a:pt x="120000" y="0"/>
-                </a:lnTo>
-                <a:lnTo>
-                  <a:pt x="120000" y="120000"/>
-                </a:lnTo>
-                <a:lnTo>
-                  <a:pt x="0" y="120000"/>
-                </a:lnTo>
-                <a:close/>
-              </a:path>
-            </a:pathLst>
-          </a:custGeom>
-        </p:spPr>
-      </p:sp>
-      <p:sp>
-        <p:nvSpPr>
-          <p:cNvPr id="415" name="Google Shape;415;ga073618e60_0_63:notes"/>
-          <p:cNvSpPr txBox="1">
-            <a:spLocks noGrp="1"/>
-          </p:cNvSpPr>
-          <p:nvPr>
-            <p:ph type="body" idx="1"/>
-          </p:nvPr>
-        </p:nvSpPr>
-        <p:spPr>
-          <a:xfrm>
-            <a:off x="685800" y="4343400"/>
-            <a:ext cx="5486400" cy="4114800"/>
-          </a:xfrm>
-          <a:prstGeom prst="rect">
-            <a:avLst/>
-          </a:prstGeom>
-        </p:spPr>
-        <p:txBody>
-          <a:bodyPr spcFirstLastPara="1" wrap="square" lIns="91425" tIns="91425" rIns="91425" bIns="91425" anchor="t" anchorCtr="0">
-            <a:noAutofit/>
-          </a:bodyPr>
-          <a:lstStyle/>
-          <a:p>
-            <a:pPr marL="0" lvl="0" indent="0" algn="l" rtl="0">
-              <a:spcBef>
-                <a:spcPts val="0"/>
-              </a:spcBef>
-              <a:spcAft>
-                <a:spcPts val="0"/>
-              </a:spcAft>
-              <a:buNone/>
-            </a:pPr>
-            <a:endParaRPr/>
-          </a:p>
-        </p:txBody>
-      </p:sp>
-    </p:spTree>
-    <p:extLst>
-      <p:ext uri="{BB962C8B-B14F-4D97-AF65-F5344CB8AC3E}">
-        <p14:creationId xmlns:p14="http://schemas.microsoft.com/office/powerpoint/2010/main" val="2592282445"/>
       </p:ext>
     </p:extLst>
   </p:cSld>
@@ -1683,14 +2667,538 @@
               </a:spcAft>
               <a:buNone/>
             </a:pPr>
-            <a:endParaRPr/>
+            <a:r>
+              <a:rPr lang="it-IT" dirty="0"/>
+              <a:t>The DNS query flood </a:t>
+            </a:r>
+            <a:r>
+              <a:rPr lang="it-IT" dirty="0" err="1"/>
+              <a:t>is</a:t>
+            </a:r>
+            <a:r>
+              <a:rPr lang="it-IT" dirty="0"/>
+              <a:t> </a:t>
+            </a:r>
+            <a:r>
+              <a:rPr lang="it-IT" dirty="0" err="1"/>
+              <a:t>aimed</a:t>
+            </a:r>
+            <a:r>
+              <a:rPr lang="it-IT" dirty="0"/>
+              <a:t> </a:t>
+            </a:r>
+            <a:r>
+              <a:rPr lang="it-IT" dirty="0" err="1"/>
+              <a:t>at</a:t>
+            </a:r>
+            <a:r>
+              <a:rPr lang="it-IT" dirty="0"/>
+              <a:t> </a:t>
+            </a:r>
+            <a:r>
+              <a:rPr lang="it-IT" dirty="0" err="1"/>
+              <a:t>exahusting</a:t>
+            </a:r>
+            <a:r>
+              <a:rPr lang="it-IT" dirty="0"/>
+              <a:t> the target </a:t>
+            </a:r>
+            <a:r>
+              <a:rPr lang="it-IT" dirty="0" err="1"/>
+              <a:t>resources</a:t>
+            </a:r>
+            <a:r>
+              <a:rPr lang="it-IT" dirty="0"/>
+              <a:t>, by </a:t>
+            </a:r>
+            <a:r>
+              <a:rPr lang="it-IT" dirty="0" err="1"/>
+              <a:t>sending</a:t>
+            </a:r>
+            <a:r>
+              <a:rPr lang="it-IT" dirty="0"/>
+              <a:t> a </a:t>
+            </a:r>
+            <a:r>
+              <a:rPr lang="it-IT" dirty="0" err="1"/>
+              <a:t>huge</a:t>
+            </a:r>
+            <a:r>
+              <a:rPr lang="it-IT" dirty="0"/>
+              <a:t> </a:t>
+            </a:r>
+            <a:r>
+              <a:rPr lang="it-IT" dirty="0" err="1"/>
+              <a:t>amount</a:t>
+            </a:r>
+            <a:r>
+              <a:rPr lang="it-IT" dirty="0"/>
+              <a:t> of DNS queries.</a:t>
+            </a:r>
+          </a:p>
+          <a:p>
+            <a:pPr marL="0" lvl="0" indent="0" algn="l" rtl="0">
+              <a:spcBef>
+                <a:spcPts val="0"/>
+              </a:spcBef>
+              <a:spcAft>
+                <a:spcPts val="0"/>
+              </a:spcAft>
+              <a:buNone/>
+            </a:pPr>
+            <a:endParaRPr lang="it-IT" dirty="0"/>
+          </a:p>
+          <a:p>
+            <a:pPr marL="0" lvl="0" indent="0" algn="l" rtl="0">
+              <a:spcBef>
+                <a:spcPts val="0"/>
+              </a:spcBef>
+              <a:spcAft>
+                <a:spcPts val="0"/>
+              </a:spcAft>
+              <a:buNone/>
+            </a:pPr>
+            <a:r>
+              <a:rPr lang="it-IT" dirty="0"/>
+              <a:t>The key point </a:t>
+            </a:r>
+            <a:r>
+              <a:rPr lang="it-IT" dirty="0" err="1"/>
+              <a:t>is</a:t>
+            </a:r>
+            <a:r>
+              <a:rPr lang="it-IT" dirty="0"/>
+              <a:t> </a:t>
+            </a:r>
+            <a:r>
+              <a:rPr lang="it-IT" dirty="0" err="1"/>
+              <a:t>sending</a:t>
+            </a:r>
+            <a:r>
+              <a:rPr lang="it-IT" dirty="0"/>
+              <a:t> </a:t>
+            </a:r>
+            <a:r>
+              <a:rPr lang="it-IT" dirty="0" err="1"/>
+              <a:t>lots</a:t>
+            </a:r>
+            <a:r>
+              <a:rPr lang="it-IT" dirty="0"/>
+              <a:t> of queries and </a:t>
+            </a:r>
+            <a:r>
+              <a:rPr lang="it-IT" dirty="0" err="1"/>
+              <a:t>this</a:t>
+            </a:r>
+            <a:r>
+              <a:rPr lang="it-IT" dirty="0"/>
+              <a:t> </a:t>
+            </a:r>
+            <a:r>
+              <a:rPr lang="it-IT" dirty="0" err="1"/>
+              <a:t>is</a:t>
+            </a:r>
+            <a:r>
+              <a:rPr lang="it-IT" dirty="0"/>
+              <a:t> </a:t>
+            </a:r>
+            <a:r>
+              <a:rPr lang="it-IT" dirty="0" err="1"/>
+              <a:t>achieved</a:t>
+            </a:r>
+            <a:r>
+              <a:rPr lang="it-IT" dirty="0"/>
+              <a:t> by the </a:t>
+            </a:r>
+            <a:r>
+              <a:rPr lang="it-IT" dirty="0" err="1"/>
+              <a:t>attackers</a:t>
+            </a:r>
+            <a:r>
+              <a:rPr lang="it-IT" dirty="0"/>
+              <a:t> </a:t>
+            </a:r>
+            <a:r>
+              <a:rPr lang="it-IT" dirty="0" err="1"/>
+              <a:t>using</a:t>
+            </a:r>
+            <a:r>
+              <a:rPr lang="it-IT" dirty="0"/>
+              <a:t> a botnet. A botnet </a:t>
+            </a:r>
+            <a:r>
+              <a:rPr lang="it-IT" dirty="0" err="1"/>
+              <a:t>is</a:t>
+            </a:r>
+            <a:r>
+              <a:rPr lang="it-IT" dirty="0"/>
+              <a:t> an </a:t>
+            </a:r>
+            <a:r>
+              <a:rPr lang="it-IT" dirty="0" err="1"/>
+              <a:t>army</a:t>
+            </a:r>
+            <a:r>
+              <a:rPr lang="it-IT" dirty="0"/>
+              <a:t> of </a:t>
+            </a:r>
+            <a:r>
+              <a:rPr lang="it-IT" dirty="0" err="1"/>
+              <a:t>compormised</a:t>
+            </a:r>
+            <a:r>
+              <a:rPr lang="it-IT" dirty="0"/>
+              <a:t> devices </a:t>
+            </a:r>
+            <a:r>
+              <a:rPr lang="it-IT" dirty="0" err="1"/>
+              <a:t>controlled</a:t>
+            </a:r>
+            <a:r>
+              <a:rPr lang="it-IT" dirty="0"/>
+              <a:t> by the </a:t>
+            </a:r>
+            <a:r>
+              <a:rPr lang="it-IT" dirty="0" err="1"/>
+              <a:t>attacker</a:t>
+            </a:r>
+            <a:r>
+              <a:rPr lang="it-IT" dirty="0"/>
+              <a:t> to </a:t>
+            </a:r>
+            <a:r>
+              <a:rPr lang="it-IT" dirty="0" err="1"/>
+              <a:t>send</a:t>
+            </a:r>
+            <a:r>
+              <a:rPr lang="it-IT" dirty="0"/>
+              <a:t> DNS queries.</a:t>
+            </a:r>
+          </a:p>
+          <a:p>
+            <a:pPr marL="0" lvl="0" indent="0" algn="l" rtl="0">
+              <a:spcBef>
+                <a:spcPts val="0"/>
+              </a:spcBef>
+              <a:spcAft>
+                <a:spcPts val="0"/>
+              </a:spcAft>
+              <a:buNone/>
+            </a:pPr>
+            <a:endParaRPr lang="it-IT" dirty="0"/>
+          </a:p>
+          <a:p>
+            <a:pPr marL="0" lvl="0" indent="0" algn="l" rtl="0">
+              <a:spcBef>
+                <a:spcPts val="0"/>
+              </a:spcBef>
+              <a:spcAft>
+                <a:spcPts val="0"/>
+              </a:spcAft>
+              <a:buNone/>
+            </a:pPr>
+            <a:r>
+              <a:rPr lang="it-IT" dirty="0" err="1"/>
+              <a:t>This</a:t>
+            </a:r>
+            <a:r>
+              <a:rPr lang="it-IT" dirty="0"/>
+              <a:t> </a:t>
+            </a:r>
+            <a:r>
+              <a:rPr lang="it-IT" dirty="0" err="1"/>
+              <a:t>attack</a:t>
+            </a:r>
+            <a:r>
+              <a:rPr lang="it-IT" dirty="0"/>
+              <a:t> can </a:t>
+            </a:r>
+            <a:r>
+              <a:rPr lang="it-IT" dirty="0" err="1"/>
+              <a:t>mainly</a:t>
+            </a:r>
+            <a:r>
+              <a:rPr lang="it-IT" dirty="0"/>
+              <a:t> </a:t>
+            </a:r>
+            <a:r>
+              <a:rPr lang="it-IT" dirty="0" err="1"/>
+              <a:t>have</a:t>
+            </a:r>
+            <a:r>
+              <a:rPr lang="it-IT" dirty="0"/>
+              <a:t> </a:t>
+            </a:r>
+            <a:r>
+              <a:rPr lang="it-IT" dirty="0" err="1"/>
+              <a:t>two</a:t>
+            </a:r>
+            <a:r>
+              <a:rPr lang="it-IT" dirty="0"/>
+              <a:t> target, a recursive NS or an </a:t>
+            </a:r>
+            <a:r>
+              <a:rPr lang="it-IT" dirty="0" err="1"/>
+              <a:t>authoritative</a:t>
+            </a:r>
+            <a:r>
+              <a:rPr lang="it-IT" dirty="0"/>
+              <a:t> one. </a:t>
+            </a:r>
+          </a:p>
+          <a:p>
+            <a:pPr marL="0" lvl="0" indent="0" algn="l" rtl="0">
+              <a:spcBef>
+                <a:spcPts val="0"/>
+              </a:spcBef>
+              <a:spcAft>
+                <a:spcPts val="0"/>
+              </a:spcAft>
+              <a:buNone/>
+            </a:pPr>
+            <a:endParaRPr lang="it-IT" dirty="0"/>
+          </a:p>
+          <a:p>
+            <a:pPr marL="0" lvl="0" indent="0" algn="l" rtl="0">
+              <a:spcBef>
+                <a:spcPts val="0"/>
+              </a:spcBef>
+              <a:spcAft>
+                <a:spcPts val="0"/>
+              </a:spcAft>
+              <a:buNone/>
+            </a:pPr>
+            <a:r>
+              <a:rPr lang="it-IT" dirty="0"/>
+              <a:t>In the case the target </a:t>
+            </a:r>
+            <a:r>
+              <a:rPr lang="it-IT" dirty="0" err="1"/>
+              <a:t>is</a:t>
+            </a:r>
+            <a:r>
+              <a:rPr lang="it-IT" dirty="0"/>
+              <a:t> the first one, </a:t>
+            </a:r>
+            <a:r>
+              <a:rPr lang="it-IT" dirty="0" err="1"/>
+              <a:t>there</a:t>
+            </a:r>
+            <a:r>
+              <a:rPr lang="it-IT" dirty="0"/>
+              <a:t> </a:t>
+            </a:r>
+            <a:r>
+              <a:rPr lang="it-IT" dirty="0" err="1"/>
+              <a:t>is</a:t>
+            </a:r>
+            <a:r>
+              <a:rPr lang="it-IT" dirty="0"/>
+              <a:t> a </a:t>
+            </a:r>
+            <a:r>
+              <a:rPr lang="it-IT" dirty="0" err="1"/>
+              <a:t>trick</a:t>
+            </a:r>
+            <a:r>
+              <a:rPr lang="it-IT" dirty="0"/>
+              <a:t> </a:t>
+            </a:r>
+            <a:r>
+              <a:rPr lang="it-IT" dirty="0" err="1"/>
+              <a:t>played</a:t>
+            </a:r>
+            <a:r>
+              <a:rPr lang="it-IT" dirty="0"/>
+              <a:t> by the </a:t>
+            </a:r>
+            <a:r>
+              <a:rPr lang="it-IT" dirty="0" err="1"/>
+              <a:t>attacker</a:t>
+            </a:r>
+            <a:r>
+              <a:rPr lang="it-IT" dirty="0"/>
+              <a:t>, </a:t>
+            </a:r>
+            <a:r>
+              <a:rPr lang="it-IT" dirty="0" err="1"/>
+              <a:t>that</a:t>
+            </a:r>
+            <a:r>
+              <a:rPr lang="it-IT" dirty="0"/>
+              <a:t> </a:t>
+            </a:r>
+            <a:r>
+              <a:rPr lang="it-IT" dirty="0" err="1"/>
+              <a:t>consists</a:t>
+            </a:r>
+            <a:r>
+              <a:rPr lang="it-IT" dirty="0"/>
+              <a:t> in </a:t>
+            </a:r>
+            <a:r>
+              <a:rPr lang="it-IT" dirty="0" err="1"/>
+              <a:t>crafting</a:t>
+            </a:r>
+            <a:r>
+              <a:rPr lang="it-IT" dirty="0"/>
+              <a:t> the queries in a </a:t>
+            </a:r>
+            <a:r>
+              <a:rPr lang="it-IT" dirty="0" err="1"/>
+              <a:t>such</a:t>
+            </a:r>
+            <a:r>
+              <a:rPr lang="it-IT" dirty="0"/>
+              <a:t> a way </a:t>
+            </a:r>
+            <a:r>
+              <a:rPr lang="it-IT" dirty="0" err="1"/>
+              <a:t>that</a:t>
+            </a:r>
+            <a:r>
+              <a:rPr lang="it-IT" dirty="0"/>
+              <a:t> </a:t>
+            </a:r>
+            <a:r>
+              <a:rPr lang="it-IT" dirty="0" err="1"/>
+              <a:t>they</a:t>
+            </a:r>
+            <a:r>
+              <a:rPr lang="it-IT" dirty="0"/>
+              <a:t> are </a:t>
+            </a:r>
+            <a:r>
+              <a:rPr lang="it-IT" dirty="0" err="1"/>
+              <a:t>not</a:t>
+            </a:r>
+            <a:r>
+              <a:rPr lang="it-IT" dirty="0"/>
+              <a:t> </a:t>
+            </a:r>
+            <a:r>
+              <a:rPr lang="it-IT" dirty="0" err="1"/>
+              <a:t>already</a:t>
+            </a:r>
+            <a:r>
+              <a:rPr lang="it-IT" dirty="0"/>
+              <a:t> </a:t>
+            </a:r>
+            <a:r>
+              <a:rPr lang="it-IT" dirty="0" err="1"/>
+              <a:t>cached</a:t>
+            </a:r>
+            <a:r>
+              <a:rPr lang="it-IT" dirty="0"/>
+              <a:t> in the server. </a:t>
+            </a:r>
+            <a:r>
+              <a:rPr lang="it-IT" dirty="0" err="1"/>
+              <a:t>That</a:t>
+            </a:r>
+            <a:r>
+              <a:rPr lang="it-IT" dirty="0"/>
+              <a:t> way the server </a:t>
+            </a:r>
+            <a:r>
+              <a:rPr lang="it-IT" dirty="0" err="1"/>
+              <a:t>is</a:t>
+            </a:r>
+            <a:r>
+              <a:rPr lang="it-IT" dirty="0"/>
+              <a:t> </a:t>
+            </a:r>
+            <a:r>
+              <a:rPr lang="it-IT" dirty="0" err="1"/>
+              <a:t>forced</a:t>
+            </a:r>
+            <a:r>
+              <a:rPr lang="it-IT" dirty="0"/>
+              <a:t> to query </a:t>
+            </a:r>
+            <a:r>
+              <a:rPr lang="it-IT" dirty="0" err="1"/>
+              <a:t>other</a:t>
+            </a:r>
+            <a:r>
+              <a:rPr lang="it-IT" dirty="0"/>
+              <a:t> NS </a:t>
+            </a:r>
+            <a:r>
+              <a:rPr lang="it-IT" dirty="0" err="1"/>
+              <a:t>until</a:t>
+            </a:r>
+            <a:r>
+              <a:rPr lang="it-IT" dirty="0"/>
+              <a:t>, </a:t>
+            </a:r>
+            <a:r>
+              <a:rPr lang="it-IT" dirty="0" err="1"/>
+              <a:t>eventually</a:t>
+            </a:r>
+            <a:r>
+              <a:rPr lang="it-IT" dirty="0"/>
+              <a:t> </a:t>
+            </a:r>
+            <a:r>
+              <a:rPr lang="it-IT" dirty="0" err="1"/>
+              <a:t>it</a:t>
+            </a:r>
+            <a:r>
+              <a:rPr lang="it-IT" dirty="0"/>
+              <a:t> </a:t>
+            </a:r>
+            <a:r>
+              <a:rPr lang="it-IT" dirty="0" err="1"/>
+              <a:t>gets</a:t>
+            </a:r>
+            <a:r>
+              <a:rPr lang="it-IT" dirty="0"/>
+              <a:t> the </a:t>
+            </a:r>
+            <a:r>
+              <a:rPr lang="it-IT" dirty="0" err="1"/>
+              <a:t>response</a:t>
+            </a:r>
+            <a:r>
+              <a:rPr lang="it-IT" dirty="0"/>
+              <a:t> and </a:t>
+            </a:r>
+            <a:r>
+              <a:rPr lang="it-IT" dirty="0" err="1"/>
+              <a:t>sends</a:t>
+            </a:r>
+            <a:r>
+              <a:rPr lang="it-IT" dirty="0"/>
+              <a:t> </a:t>
+            </a:r>
+            <a:r>
+              <a:rPr lang="it-IT" dirty="0" err="1"/>
+              <a:t>it</a:t>
+            </a:r>
+            <a:r>
+              <a:rPr lang="it-IT" dirty="0"/>
+              <a:t> back to the client.</a:t>
+            </a:r>
+          </a:p>
+          <a:p>
+            <a:pPr marL="0" lvl="0" indent="0" algn="l" rtl="0">
+              <a:spcBef>
+                <a:spcPts val="0"/>
+              </a:spcBef>
+              <a:spcAft>
+                <a:spcPts val="0"/>
+              </a:spcAft>
+              <a:buNone/>
+            </a:pPr>
+            <a:endParaRPr lang="it-IT" dirty="0"/>
           </a:p>
         </p:txBody>
       </p:sp>
     </p:spTree>
     <p:extLst>
       <p:ext uri="{BB962C8B-B14F-4D97-AF65-F5344CB8AC3E}">
-        <p14:creationId xmlns:p14="http://schemas.microsoft.com/office/powerpoint/2010/main" val="2816039107"/>
+        <p14:creationId xmlns:p14="http://schemas.microsoft.com/office/powerpoint/2010/main" val="2592282445"/>
       </p:ext>
     </p:extLst>
   </p:cSld>
@@ -1792,14 +3300,280 @@
               </a:spcAft>
               <a:buNone/>
             </a:pPr>
-            <a:endParaRPr/>
+            <a:r>
+              <a:rPr lang="it-IT" dirty="0" err="1"/>
+              <a:t>If</a:t>
+            </a:r>
+            <a:r>
+              <a:rPr lang="it-IT" dirty="0"/>
+              <a:t> the target </a:t>
+            </a:r>
+            <a:r>
+              <a:rPr lang="it-IT" dirty="0" err="1"/>
+              <a:t>is</a:t>
+            </a:r>
+            <a:r>
+              <a:rPr lang="it-IT" dirty="0"/>
+              <a:t> a </a:t>
+            </a:r>
+            <a:r>
+              <a:rPr lang="it-IT" dirty="0" err="1"/>
+              <a:t>specific</a:t>
+            </a:r>
+            <a:r>
+              <a:rPr lang="it-IT" dirty="0"/>
+              <a:t> </a:t>
+            </a:r>
+            <a:r>
+              <a:rPr lang="it-IT" dirty="0" err="1"/>
+              <a:t>authoritative</a:t>
+            </a:r>
+            <a:r>
+              <a:rPr lang="it-IT" dirty="0"/>
+              <a:t> NS, the </a:t>
+            </a:r>
+            <a:r>
+              <a:rPr lang="it-IT" dirty="0" err="1"/>
+              <a:t>attack</a:t>
+            </a:r>
+            <a:r>
+              <a:rPr lang="it-IT" dirty="0"/>
+              <a:t> takes the name of water torture.</a:t>
+            </a:r>
+          </a:p>
+          <a:p>
+            <a:pPr marL="0" lvl="0" indent="0" algn="l" rtl="0">
+              <a:spcBef>
+                <a:spcPts val="0"/>
+              </a:spcBef>
+              <a:spcAft>
+                <a:spcPts val="0"/>
+              </a:spcAft>
+              <a:buNone/>
+            </a:pPr>
+            <a:endParaRPr lang="it-IT" dirty="0"/>
+          </a:p>
+          <a:p>
+            <a:pPr marL="0" lvl="0" indent="0" algn="l" rtl="0">
+              <a:spcBef>
+                <a:spcPts val="0"/>
+              </a:spcBef>
+              <a:spcAft>
+                <a:spcPts val="0"/>
+              </a:spcAft>
+              <a:buNone/>
+            </a:pPr>
+            <a:r>
+              <a:rPr lang="it-IT" dirty="0"/>
+              <a:t>The goal </a:t>
+            </a:r>
+            <a:r>
+              <a:rPr lang="it-IT" dirty="0" err="1"/>
+              <a:t>is</a:t>
+            </a:r>
+            <a:r>
+              <a:rPr lang="it-IT" dirty="0"/>
+              <a:t> the </a:t>
+            </a:r>
+            <a:r>
+              <a:rPr lang="it-IT" dirty="0" err="1"/>
+              <a:t>same</a:t>
+            </a:r>
+            <a:r>
+              <a:rPr lang="it-IT" dirty="0"/>
+              <a:t> </a:t>
+            </a:r>
+            <a:r>
+              <a:rPr lang="it-IT" dirty="0" err="1"/>
+              <a:t>as</a:t>
+            </a:r>
+            <a:r>
+              <a:rPr lang="it-IT" dirty="0"/>
+              <a:t> </a:t>
+            </a:r>
+            <a:r>
+              <a:rPr lang="it-IT" dirty="0" err="1"/>
+              <a:t>before</a:t>
+            </a:r>
+            <a:r>
+              <a:rPr lang="it-IT" dirty="0"/>
+              <a:t>, </a:t>
+            </a:r>
+            <a:r>
+              <a:rPr lang="it-IT" dirty="0" err="1"/>
+              <a:t>but</a:t>
+            </a:r>
+            <a:r>
+              <a:rPr lang="it-IT" dirty="0"/>
+              <a:t> on </a:t>
+            </a:r>
+            <a:r>
+              <a:rPr lang="it-IT" dirty="0" err="1"/>
+              <a:t>this</a:t>
+            </a:r>
+            <a:r>
+              <a:rPr lang="it-IT" dirty="0"/>
+              <a:t> case the </a:t>
+            </a:r>
+            <a:r>
+              <a:rPr lang="it-IT" dirty="0" err="1"/>
+              <a:t>trick</a:t>
+            </a:r>
+            <a:r>
+              <a:rPr lang="it-IT" dirty="0"/>
+              <a:t> </a:t>
+            </a:r>
+            <a:r>
+              <a:rPr lang="it-IT" dirty="0" err="1"/>
+              <a:t>played</a:t>
+            </a:r>
+            <a:r>
+              <a:rPr lang="it-IT" dirty="0"/>
+              <a:t> </a:t>
+            </a:r>
+            <a:r>
+              <a:rPr lang="it-IT" dirty="0" err="1"/>
+              <a:t>is</a:t>
+            </a:r>
+            <a:r>
+              <a:rPr lang="it-IT" dirty="0"/>
+              <a:t> </a:t>
+            </a:r>
+            <a:r>
+              <a:rPr lang="it-IT" dirty="0" err="1"/>
+              <a:t>that</a:t>
+            </a:r>
+            <a:r>
+              <a:rPr lang="it-IT" dirty="0"/>
+              <a:t> of </a:t>
+            </a:r>
+            <a:r>
+              <a:rPr lang="it-IT" dirty="0" err="1"/>
+              <a:t>crafting</a:t>
+            </a:r>
+            <a:r>
+              <a:rPr lang="it-IT" dirty="0"/>
+              <a:t> queries </a:t>
+            </a:r>
+            <a:r>
+              <a:rPr lang="it-IT" dirty="0" err="1"/>
+              <a:t>taking</a:t>
+            </a:r>
+            <a:r>
+              <a:rPr lang="it-IT" dirty="0"/>
+              <a:t> the domain of the target and </a:t>
+            </a:r>
+            <a:r>
+              <a:rPr lang="it-IT" dirty="0" err="1"/>
+              <a:t>adding</a:t>
+            </a:r>
+            <a:r>
+              <a:rPr lang="it-IT" dirty="0"/>
+              <a:t> a random </a:t>
+            </a:r>
+            <a:r>
+              <a:rPr lang="it-IT" dirty="0" err="1"/>
+              <a:t>string</a:t>
+            </a:r>
+            <a:r>
+              <a:rPr lang="it-IT" dirty="0"/>
+              <a:t>.</a:t>
+            </a:r>
+          </a:p>
+          <a:p>
+            <a:pPr marL="0" lvl="0" indent="0" algn="l" rtl="0">
+              <a:spcBef>
+                <a:spcPts val="0"/>
+              </a:spcBef>
+              <a:spcAft>
+                <a:spcPts val="0"/>
+              </a:spcAft>
+              <a:buNone/>
+            </a:pPr>
+            <a:endParaRPr lang="it-IT" dirty="0"/>
+          </a:p>
+          <a:p>
+            <a:pPr marL="0" lvl="0" indent="0" algn="l" rtl="0">
+              <a:spcBef>
+                <a:spcPts val="0"/>
+              </a:spcBef>
+              <a:spcAft>
+                <a:spcPts val="0"/>
+              </a:spcAft>
+              <a:buNone/>
+            </a:pPr>
+            <a:r>
+              <a:rPr lang="it-IT" dirty="0" err="1"/>
+              <a:t>That</a:t>
+            </a:r>
+            <a:r>
+              <a:rPr lang="it-IT" dirty="0"/>
+              <a:t> way, </a:t>
+            </a:r>
+            <a:r>
+              <a:rPr lang="it-IT" dirty="0" err="1"/>
+              <a:t>we</a:t>
+            </a:r>
+            <a:r>
+              <a:rPr lang="it-IT" dirty="0"/>
+              <a:t> are sure the queries </a:t>
+            </a:r>
+            <a:r>
+              <a:rPr lang="it-IT" dirty="0" err="1"/>
+              <a:t>reach</a:t>
+            </a:r>
+            <a:r>
+              <a:rPr lang="it-IT" dirty="0"/>
+              <a:t> the target </a:t>
+            </a:r>
+            <a:r>
+              <a:rPr lang="it-IT" dirty="0" err="1"/>
+              <a:t>using</a:t>
+            </a:r>
+            <a:r>
+              <a:rPr lang="it-IT" dirty="0"/>
+              <a:t> </a:t>
+            </a:r>
+            <a:r>
+              <a:rPr lang="it-IT" dirty="0" err="1"/>
+              <a:t>its</a:t>
+            </a:r>
+            <a:r>
+              <a:rPr lang="it-IT" dirty="0"/>
+              <a:t> </a:t>
+            </a:r>
+            <a:r>
+              <a:rPr lang="it-IT" dirty="0" err="1"/>
+              <a:t>resources</a:t>
+            </a:r>
+            <a:r>
+              <a:rPr lang="it-IT" dirty="0"/>
+              <a:t> to </a:t>
+            </a:r>
+            <a:r>
+              <a:rPr lang="it-IT" dirty="0" err="1"/>
+              <a:t>answer</a:t>
+            </a:r>
+            <a:r>
+              <a:rPr lang="it-IT" dirty="0"/>
+              <a:t> to </a:t>
+            </a:r>
+            <a:r>
+              <a:rPr lang="it-IT" dirty="0" err="1"/>
+              <a:t>them</a:t>
+            </a:r>
+            <a:r>
+              <a:rPr lang="it-IT" dirty="0"/>
+              <a:t> NXDOMAIN.</a:t>
+            </a:r>
+            <a:endParaRPr dirty="0"/>
           </a:p>
         </p:txBody>
       </p:sp>
     </p:spTree>
     <p:extLst>
       <p:ext uri="{BB962C8B-B14F-4D97-AF65-F5344CB8AC3E}">
-        <p14:creationId xmlns:p14="http://schemas.microsoft.com/office/powerpoint/2010/main" val="1700399122"/>
+        <p14:creationId xmlns:p14="http://schemas.microsoft.com/office/powerpoint/2010/main" val="2816039107"/>
       </p:ext>
     </p:extLst>
   </p:cSld>
@@ -1901,14 +3675,229 @@
               </a:spcAft>
               <a:buNone/>
             </a:pPr>
-            <a:endParaRPr/>
+            <a:r>
+              <a:rPr lang="it-IT" dirty="0"/>
+              <a:t>TCP flood </a:t>
+            </a:r>
+            <a:r>
+              <a:rPr lang="it-IT" dirty="0" err="1"/>
+              <a:t>attack</a:t>
+            </a:r>
+            <a:r>
+              <a:rPr lang="it-IT" dirty="0"/>
+              <a:t> </a:t>
+            </a:r>
+            <a:r>
+              <a:rPr lang="it-IT" dirty="0" err="1"/>
+              <a:t>has</a:t>
+            </a:r>
+            <a:r>
+              <a:rPr lang="it-IT" dirty="0"/>
+              <a:t> </a:t>
+            </a:r>
+            <a:r>
+              <a:rPr lang="it-IT" dirty="0" err="1"/>
+              <a:t>still</a:t>
+            </a:r>
+            <a:r>
+              <a:rPr lang="it-IT" dirty="0"/>
+              <a:t> the goal of </a:t>
+            </a:r>
+            <a:r>
+              <a:rPr lang="it-IT" dirty="0" err="1"/>
+              <a:t>exhausting</a:t>
+            </a:r>
+            <a:r>
+              <a:rPr lang="it-IT" dirty="0"/>
+              <a:t> the target </a:t>
+            </a:r>
+            <a:r>
+              <a:rPr lang="it-IT" dirty="0" err="1"/>
+              <a:t>resources</a:t>
+            </a:r>
+            <a:r>
+              <a:rPr lang="it-IT" dirty="0"/>
+              <a:t> </a:t>
+            </a:r>
+            <a:r>
+              <a:rPr lang="it-IT" dirty="0" err="1"/>
+              <a:t>but</a:t>
+            </a:r>
+            <a:r>
+              <a:rPr lang="it-IT" dirty="0"/>
+              <a:t> </a:t>
+            </a:r>
+            <a:r>
+              <a:rPr lang="it-IT" dirty="0" err="1"/>
+              <a:t>instead</a:t>
+            </a:r>
+            <a:r>
+              <a:rPr lang="it-IT" dirty="0"/>
+              <a:t> of </a:t>
+            </a:r>
+            <a:r>
+              <a:rPr lang="it-IT" dirty="0" err="1"/>
+              <a:t>using</a:t>
+            </a:r>
+            <a:r>
+              <a:rPr lang="it-IT" dirty="0"/>
+              <a:t> UDP </a:t>
+            </a:r>
+            <a:r>
+              <a:rPr lang="it-IT" dirty="0" err="1"/>
+              <a:t>traffic</a:t>
+            </a:r>
+            <a:r>
+              <a:rPr lang="it-IT" dirty="0"/>
+              <a:t> </a:t>
+            </a:r>
+            <a:r>
+              <a:rPr lang="it-IT" dirty="0" err="1"/>
+              <a:t>it</a:t>
+            </a:r>
+            <a:r>
+              <a:rPr lang="it-IT" dirty="0"/>
+              <a:t> exploits the THREE-WAY </a:t>
+            </a:r>
+            <a:r>
+              <a:rPr lang="it-IT" dirty="0" err="1"/>
+              <a:t>handshaking</a:t>
+            </a:r>
+            <a:r>
+              <a:rPr lang="it-IT" dirty="0"/>
+              <a:t> of TCP.</a:t>
+            </a:r>
+          </a:p>
+          <a:p>
+            <a:pPr marL="0" lvl="0" indent="0" algn="l" rtl="0">
+              <a:spcBef>
+                <a:spcPts val="0"/>
+              </a:spcBef>
+              <a:spcAft>
+                <a:spcPts val="0"/>
+              </a:spcAft>
+              <a:buNone/>
+            </a:pPr>
+            <a:endParaRPr lang="it-IT" dirty="0"/>
+          </a:p>
+          <a:p>
+            <a:pPr marL="0" lvl="0" indent="0" algn="l" rtl="0">
+              <a:spcBef>
+                <a:spcPts val="0"/>
+              </a:spcBef>
+              <a:spcAft>
+                <a:spcPts val="0"/>
+              </a:spcAft>
+              <a:buNone/>
+            </a:pPr>
+            <a:r>
+              <a:rPr lang="it-IT" dirty="0"/>
+              <a:t>The </a:t>
+            </a:r>
+            <a:r>
+              <a:rPr lang="it-IT" dirty="0" err="1"/>
+              <a:t>trick</a:t>
+            </a:r>
+            <a:r>
+              <a:rPr lang="it-IT" dirty="0"/>
+              <a:t> </a:t>
+            </a:r>
+            <a:r>
+              <a:rPr lang="it-IT" dirty="0" err="1"/>
+              <a:t>is</a:t>
+            </a:r>
+            <a:r>
+              <a:rPr lang="it-IT" dirty="0"/>
+              <a:t> to open a large </a:t>
+            </a:r>
+            <a:r>
+              <a:rPr lang="it-IT" dirty="0" err="1"/>
+              <a:t>number</a:t>
+            </a:r>
+            <a:r>
+              <a:rPr lang="it-IT" dirty="0"/>
+              <a:t> of TCP connections </a:t>
+            </a:r>
+            <a:r>
+              <a:rPr lang="it-IT" dirty="0" err="1"/>
+              <a:t>without</a:t>
+            </a:r>
+            <a:r>
+              <a:rPr lang="it-IT" dirty="0"/>
+              <a:t> closing </a:t>
+            </a:r>
+            <a:r>
+              <a:rPr lang="it-IT" dirty="0" err="1"/>
+              <a:t>them</a:t>
+            </a:r>
+            <a:r>
+              <a:rPr lang="it-IT" dirty="0"/>
+              <a:t>, </a:t>
+            </a:r>
+            <a:r>
+              <a:rPr lang="it-IT" dirty="0" err="1"/>
+              <a:t>therefore</a:t>
+            </a:r>
+            <a:r>
+              <a:rPr lang="it-IT" dirty="0"/>
+              <a:t> forcing the target to use </a:t>
+            </a:r>
+            <a:r>
+              <a:rPr lang="it-IT" dirty="0" err="1"/>
+              <a:t>its</a:t>
+            </a:r>
+            <a:r>
+              <a:rPr lang="it-IT" dirty="0"/>
+              <a:t> </a:t>
+            </a:r>
+            <a:r>
+              <a:rPr lang="it-IT" dirty="0" err="1"/>
+              <a:t>resources</a:t>
+            </a:r>
+            <a:r>
+              <a:rPr lang="it-IT" dirty="0"/>
+              <a:t> to handle </a:t>
+            </a:r>
+            <a:r>
+              <a:rPr lang="it-IT" dirty="0" err="1"/>
+              <a:t>it</a:t>
+            </a:r>
+            <a:r>
+              <a:rPr lang="it-IT" dirty="0"/>
+              <a:t>, </a:t>
+            </a:r>
+            <a:r>
+              <a:rPr lang="it-IT" dirty="0" err="1"/>
+              <a:t>until</a:t>
+            </a:r>
+            <a:r>
+              <a:rPr lang="it-IT" dirty="0"/>
+              <a:t> </a:t>
+            </a:r>
+            <a:r>
+              <a:rPr lang="it-IT" dirty="0" err="1"/>
+              <a:t>they</a:t>
+            </a:r>
+            <a:r>
+              <a:rPr lang="it-IT" dirty="0"/>
+              <a:t> are </a:t>
+            </a:r>
+            <a:r>
+              <a:rPr lang="it-IT" dirty="0" err="1"/>
+              <a:t>exhausted</a:t>
+            </a:r>
+            <a:r>
+              <a:rPr lang="it-IT" dirty="0"/>
+              <a:t>.</a:t>
+            </a:r>
+            <a:endParaRPr dirty="0"/>
           </a:p>
         </p:txBody>
       </p:sp>
     </p:spTree>
     <p:extLst>
       <p:ext uri="{BB962C8B-B14F-4D97-AF65-F5344CB8AC3E}">
-        <p14:creationId xmlns:p14="http://schemas.microsoft.com/office/powerpoint/2010/main" val="1260587386"/>
+        <p14:creationId xmlns:p14="http://schemas.microsoft.com/office/powerpoint/2010/main" val="1700399122"/>
       </p:ext>
     </p:extLst>
   </p:cSld>
@@ -1923,7 +3912,7 @@
   <p:cSld>
     <p:spTree>
       <p:nvGrpSpPr>
-        <p:cNvPr id="1" name="Shape 453"/>
+        <p:cNvPr id="1" name="Shape 413"/>
         <p:cNvGrpSpPr/>
         <p:nvPr/>
       </p:nvGrpSpPr>
@@ -1937,7 +3926,7 @@
       </p:grpSpPr>
       <p:sp>
         <p:nvSpPr>
-          <p:cNvPr id="454" name="Google Shape;454;g13a4d1c76c4_0_373:notes"/>
+          <p:cNvPr id="414" name="Google Shape;414;ga073618e60_0_63:notes"/>
           <p:cNvSpPr>
             <a:spLocks noGrp="1" noRot="1" noChangeAspect="1"/>
           </p:cNvSpPr>
@@ -1978,7 +3967,7 @@
       </p:sp>
       <p:sp>
         <p:nvSpPr>
-          <p:cNvPr id="455" name="Google Shape;455;g13a4d1c76c4_0_373:notes"/>
+          <p:cNvPr id="415" name="Google Shape;415;ga073618e60_0_63:notes"/>
           <p:cNvSpPr txBox="1">
             <a:spLocks noGrp="1"/>
           </p:cNvSpPr>
@@ -2010,14 +3999,724 @@
               </a:spcAft>
               <a:buNone/>
             </a:pPr>
-            <a:endParaRPr/>
+            <a:r>
+              <a:rPr lang="it-IT" dirty="0"/>
+              <a:t>The last </a:t>
+            </a:r>
+            <a:r>
+              <a:rPr lang="it-IT" dirty="0" err="1"/>
+              <a:t>type</a:t>
+            </a:r>
+            <a:r>
+              <a:rPr lang="it-IT" dirty="0"/>
+              <a:t> of </a:t>
+            </a:r>
+            <a:r>
+              <a:rPr lang="it-IT" dirty="0" err="1"/>
+              <a:t>attack</a:t>
+            </a:r>
+            <a:r>
+              <a:rPr lang="it-IT" dirty="0"/>
+              <a:t> </a:t>
+            </a:r>
+            <a:r>
+              <a:rPr lang="it-IT" dirty="0" err="1"/>
+              <a:t>is</a:t>
+            </a:r>
+            <a:r>
+              <a:rPr lang="it-IT" dirty="0"/>
+              <a:t> the DNS </a:t>
+            </a:r>
+            <a:r>
+              <a:rPr lang="it-IT" dirty="0" err="1"/>
+              <a:t>reflection</a:t>
+            </a:r>
+            <a:r>
+              <a:rPr lang="it-IT" dirty="0"/>
+              <a:t> and </a:t>
+            </a:r>
+            <a:r>
+              <a:rPr lang="it-IT" dirty="0" err="1"/>
+              <a:t>amplification</a:t>
+            </a:r>
+            <a:r>
+              <a:rPr lang="it-IT" dirty="0"/>
+              <a:t>.</a:t>
+            </a:r>
+          </a:p>
+          <a:p>
+            <a:pPr marL="0" lvl="0" indent="0" algn="l" rtl="0">
+              <a:spcBef>
+                <a:spcPts val="0"/>
+              </a:spcBef>
+              <a:spcAft>
+                <a:spcPts val="0"/>
+              </a:spcAft>
+              <a:buNone/>
+            </a:pPr>
+            <a:endParaRPr lang="it-IT" dirty="0"/>
+          </a:p>
+          <a:p>
+            <a:pPr marL="0" lvl="0" indent="0" algn="l" rtl="0">
+              <a:spcBef>
+                <a:spcPts val="0"/>
+              </a:spcBef>
+              <a:spcAft>
+                <a:spcPts val="0"/>
+              </a:spcAft>
+              <a:buNone/>
+            </a:pPr>
+            <a:r>
+              <a:rPr lang="it-IT" dirty="0"/>
+              <a:t>The goal of </a:t>
+            </a:r>
+            <a:r>
+              <a:rPr lang="it-IT" dirty="0" err="1"/>
+              <a:t>this</a:t>
+            </a:r>
+            <a:r>
+              <a:rPr lang="it-IT" dirty="0"/>
+              <a:t> </a:t>
+            </a:r>
+            <a:r>
+              <a:rPr lang="it-IT" dirty="0" err="1"/>
+              <a:t>attack</a:t>
+            </a:r>
+            <a:r>
+              <a:rPr lang="it-IT" dirty="0"/>
+              <a:t> </a:t>
+            </a:r>
+            <a:r>
+              <a:rPr lang="it-IT" dirty="0" err="1"/>
+              <a:t>is</a:t>
+            </a:r>
+            <a:r>
+              <a:rPr lang="it-IT" dirty="0"/>
+              <a:t> to </a:t>
+            </a:r>
+            <a:r>
+              <a:rPr lang="it-IT" dirty="0" err="1"/>
+              <a:t>exhaust</a:t>
+            </a:r>
+            <a:r>
+              <a:rPr lang="it-IT" dirty="0"/>
+              <a:t> the target network </a:t>
+            </a:r>
+            <a:r>
+              <a:rPr lang="it-IT" dirty="0" err="1"/>
+              <a:t>bandwidth</a:t>
+            </a:r>
+            <a:r>
+              <a:rPr lang="it-IT" dirty="0"/>
+              <a:t> by </a:t>
+            </a:r>
+            <a:r>
+              <a:rPr lang="it-IT" dirty="0" err="1"/>
+              <a:t>exploiting</a:t>
+            </a:r>
+            <a:r>
+              <a:rPr lang="it-IT" dirty="0"/>
+              <a:t> the concepts of </a:t>
+            </a:r>
+            <a:r>
+              <a:rPr lang="it-IT" dirty="0" err="1"/>
+              <a:t>reflection</a:t>
+            </a:r>
+            <a:r>
+              <a:rPr lang="it-IT" dirty="0"/>
+              <a:t> and </a:t>
+            </a:r>
+            <a:r>
+              <a:rPr lang="it-IT" dirty="0" err="1"/>
+              <a:t>amplification</a:t>
+            </a:r>
+            <a:r>
+              <a:rPr lang="it-IT" dirty="0"/>
+              <a:t>.</a:t>
+            </a:r>
+          </a:p>
+          <a:p>
+            <a:pPr marL="0" lvl="0" indent="0" algn="l" rtl="0">
+              <a:spcBef>
+                <a:spcPts val="0"/>
+              </a:spcBef>
+              <a:spcAft>
+                <a:spcPts val="0"/>
+              </a:spcAft>
+              <a:buNone/>
+            </a:pPr>
+            <a:endParaRPr lang="it-IT" dirty="0"/>
+          </a:p>
+          <a:p>
+            <a:pPr marL="0" lvl="0" indent="0" algn="l" rtl="0">
+              <a:spcBef>
+                <a:spcPts val="0"/>
+              </a:spcBef>
+              <a:spcAft>
+                <a:spcPts val="0"/>
+              </a:spcAft>
+              <a:buNone/>
+            </a:pPr>
+            <a:r>
+              <a:rPr lang="it-IT" dirty="0" err="1"/>
+              <a:t>It</a:t>
+            </a:r>
+            <a:r>
+              <a:rPr lang="it-IT" dirty="0"/>
+              <a:t> starts with the spoofing of the IP </a:t>
+            </a:r>
+            <a:r>
+              <a:rPr lang="it-IT" dirty="0" err="1"/>
+              <a:t>address</a:t>
+            </a:r>
+            <a:r>
+              <a:rPr lang="it-IT" dirty="0"/>
+              <a:t> of a </a:t>
+            </a:r>
+            <a:r>
+              <a:rPr lang="it-IT" dirty="0" err="1"/>
+              <a:t>victim</a:t>
+            </a:r>
+            <a:r>
+              <a:rPr lang="it-IT" dirty="0"/>
+              <a:t> by the </a:t>
+            </a:r>
+            <a:r>
+              <a:rPr lang="it-IT" dirty="0" err="1"/>
+              <a:t>attacker</a:t>
+            </a:r>
+            <a:r>
+              <a:rPr lang="it-IT" dirty="0"/>
+              <a:t>. </a:t>
+            </a:r>
+            <a:r>
+              <a:rPr lang="it-IT" dirty="0" err="1"/>
+              <a:t>Then</a:t>
+            </a:r>
+            <a:r>
+              <a:rPr lang="it-IT" dirty="0"/>
+              <a:t> the </a:t>
+            </a:r>
+            <a:r>
+              <a:rPr lang="it-IT" dirty="0" err="1"/>
+              <a:t>attacker</a:t>
+            </a:r>
+            <a:r>
+              <a:rPr lang="it-IT" dirty="0"/>
+              <a:t> </a:t>
+            </a:r>
+            <a:r>
+              <a:rPr lang="it-IT" dirty="0" err="1"/>
+              <a:t>sends</a:t>
+            </a:r>
+            <a:r>
+              <a:rPr lang="it-IT" dirty="0"/>
+              <a:t> </a:t>
+            </a:r>
+            <a:r>
+              <a:rPr lang="it-IT" dirty="0" err="1"/>
+              <a:t>lots</a:t>
+            </a:r>
+            <a:r>
+              <a:rPr lang="it-IT" dirty="0"/>
+              <a:t> of queries to a </a:t>
+            </a:r>
+            <a:r>
+              <a:rPr lang="it-IT" dirty="0" err="1"/>
+              <a:t>misconfigured</a:t>
+            </a:r>
+            <a:r>
+              <a:rPr lang="it-IT" dirty="0"/>
+              <a:t> DNS recursive server </a:t>
+            </a:r>
+            <a:r>
+              <a:rPr lang="it-IT" dirty="0" err="1"/>
+              <a:t>that</a:t>
+            </a:r>
+            <a:r>
+              <a:rPr lang="it-IT" dirty="0"/>
+              <a:t> </a:t>
+            </a:r>
+            <a:r>
+              <a:rPr lang="it-IT" dirty="0" err="1"/>
+              <a:t>will</a:t>
+            </a:r>
+            <a:r>
+              <a:rPr lang="it-IT" dirty="0"/>
+              <a:t> </a:t>
+            </a:r>
+            <a:r>
+              <a:rPr lang="it-IT" dirty="0" err="1"/>
+              <a:t>consequently</a:t>
+            </a:r>
+            <a:r>
+              <a:rPr lang="it-IT" dirty="0"/>
+              <a:t> </a:t>
+            </a:r>
+            <a:r>
+              <a:rPr lang="it-IT" dirty="0" err="1"/>
+              <a:t>respond</a:t>
+            </a:r>
+            <a:r>
+              <a:rPr lang="it-IT" dirty="0"/>
+              <a:t> to the </a:t>
+            </a:r>
+            <a:r>
+              <a:rPr lang="it-IT" dirty="0" err="1"/>
+              <a:t>victim</a:t>
+            </a:r>
+            <a:r>
+              <a:rPr lang="it-IT" dirty="0"/>
+              <a:t> IP.</a:t>
+            </a:r>
+          </a:p>
+          <a:p>
+            <a:pPr marL="0" lvl="0" indent="0" algn="l" rtl="0">
+              <a:spcBef>
+                <a:spcPts val="0"/>
+              </a:spcBef>
+              <a:spcAft>
+                <a:spcPts val="0"/>
+              </a:spcAft>
+              <a:buNone/>
+            </a:pPr>
+            <a:endParaRPr lang="it-IT" dirty="0"/>
+          </a:p>
+          <a:p>
+            <a:pPr marL="0" lvl="0" indent="0" algn="l" rtl="0">
+              <a:spcBef>
+                <a:spcPts val="0"/>
+              </a:spcBef>
+              <a:spcAft>
+                <a:spcPts val="0"/>
+              </a:spcAft>
+              <a:buNone/>
+            </a:pPr>
+            <a:r>
+              <a:rPr lang="it-IT" dirty="0"/>
+              <a:t>So </a:t>
+            </a:r>
+            <a:r>
+              <a:rPr lang="it-IT" dirty="0" err="1"/>
+              <a:t>we</a:t>
+            </a:r>
+            <a:r>
+              <a:rPr lang="it-IT" dirty="0"/>
+              <a:t> </a:t>
+            </a:r>
+            <a:r>
+              <a:rPr lang="it-IT" dirty="0" err="1"/>
+              <a:t>have</a:t>
+            </a:r>
+            <a:r>
+              <a:rPr lang="it-IT" dirty="0"/>
+              <a:t> a </a:t>
+            </a:r>
+            <a:r>
+              <a:rPr lang="it-IT" dirty="0" err="1"/>
+              <a:t>kind</a:t>
+            </a:r>
+            <a:r>
+              <a:rPr lang="it-IT" dirty="0"/>
+              <a:t> of </a:t>
+            </a:r>
+            <a:r>
+              <a:rPr lang="it-IT" dirty="0" err="1"/>
+              <a:t>reflection</a:t>
+            </a:r>
+            <a:r>
+              <a:rPr lang="it-IT" dirty="0"/>
+              <a:t> on the name server.</a:t>
+            </a:r>
+          </a:p>
+          <a:p>
+            <a:pPr marL="0" lvl="0" indent="0" algn="l" rtl="0">
+              <a:spcBef>
+                <a:spcPts val="0"/>
+              </a:spcBef>
+              <a:spcAft>
+                <a:spcPts val="0"/>
+              </a:spcAft>
+              <a:buNone/>
+            </a:pPr>
+            <a:endParaRPr lang="it-IT" dirty="0"/>
+          </a:p>
+          <a:p>
+            <a:pPr marL="0" lvl="0" indent="0" algn="l" rtl="0">
+              <a:spcBef>
+                <a:spcPts val="0"/>
+              </a:spcBef>
+              <a:spcAft>
+                <a:spcPts val="0"/>
+              </a:spcAft>
+              <a:buNone/>
+            </a:pPr>
+            <a:r>
+              <a:rPr lang="it-IT" dirty="0"/>
+              <a:t>The </a:t>
+            </a:r>
+            <a:r>
+              <a:rPr lang="it-IT" dirty="0" err="1"/>
+              <a:t>amplification</a:t>
+            </a:r>
+            <a:r>
+              <a:rPr lang="it-IT" dirty="0"/>
+              <a:t> </a:t>
+            </a:r>
+            <a:r>
+              <a:rPr lang="it-IT" dirty="0" err="1"/>
+              <a:t>affect</a:t>
+            </a:r>
+            <a:r>
+              <a:rPr lang="it-IT" dirty="0"/>
+              <a:t> </a:t>
+            </a:r>
+            <a:r>
+              <a:rPr lang="it-IT" dirty="0" err="1"/>
+              <a:t>is</a:t>
+            </a:r>
+            <a:r>
+              <a:rPr lang="it-IT" dirty="0"/>
+              <a:t> </a:t>
+            </a:r>
+            <a:r>
+              <a:rPr lang="it-IT" dirty="0" err="1"/>
+              <a:t>obtained</a:t>
+            </a:r>
+            <a:r>
+              <a:rPr lang="it-IT" dirty="0"/>
+              <a:t> </a:t>
+            </a:r>
+            <a:r>
+              <a:rPr lang="it-IT" dirty="0" err="1"/>
+              <a:t>since</a:t>
+            </a:r>
+            <a:r>
+              <a:rPr lang="it-IT" dirty="0"/>
+              <a:t> </a:t>
+            </a:r>
+            <a:r>
+              <a:rPr lang="it-IT" dirty="0" err="1"/>
+              <a:t>usually</a:t>
+            </a:r>
+            <a:r>
+              <a:rPr lang="it-IT" dirty="0"/>
+              <a:t> the </a:t>
+            </a:r>
+            <a:r>
+              <a:rPr lang="it-IT" dirty="0" err="1"/>
+              <a:t>types</a:t>
+            </a:r>
+            <a:r>
+              <a:rPr lang="it-IT" dirty="0"/>
+              <a:t> of queries </a:t>
+            </a:r>
+            <a:r>
+              <a:rPr lang="it-IT" dirty="0" err="1"/>
+              <a:t>performed</a:t>
+            </a:r>
+            <a:r>
+              <a:rPr lang="it-IT" dirty="0"/>
+              <a:t> are of </a:t>
+            </a:r>
+            <a:r>
+              <a:rPr lang="it-IT" dirty="0" err="1"/>
+              <a:t>type</a:t>
+            </a:r>
+            <a:r>
+              <a:rPr lang="it-IT" dirty="0"/>
+              <a:t> ANY, </a:t>
+            </a:r>
+            <a:r>
+              <a:rPr lang="it-IT" dirty="0" err="1"/>
+              <a:t>therefore</a:t>
+            </a:r>
+            <a:r>
+              <a:rPr lang="it-IT" dirty="0"/>
+              <a:t> the </a:t>
+            </a:r>
+            <a:r>
+              <a:rPr lang="it-IT" dirty="0" err="1"/>
+              <a:t>response</a:t>
+            </a:r>
+            <a:r>
+              <a:rPr lang="it-IT" dirty="0"/>
+              <a:t> size </a:t>
+            </a:r>
+            <a:r>
+              <a:rPr lang="it-IT" dirty="0" err="1"/>
+              <a:t>is</a:t>
+            </a:r>
+            <a:r>
+              <a:rPr lang="it-IT" dirty="0"/>
+              <a:t> </a:t>
+            </a:r>
+            <a:r>
+              <a:rPr lang="it-IT" dirty="0" err="1"/>
+              <a:t>larger</a:t>
+            </a:r>
+            <a:r>
+              <a:rPr lang="it-IT" dirty="0"/>
+              <a:t> </a:t>
+            </a:r>
+            <a:r>
+              <a:rPr lang="it-IT" dirty="0" err="1"/>
+              <a:t>than</a:t>
+            </a:r>
+            <a:r>
+              <a:rPr lang="it-IT" dirty="0"/>
+              <a:t> the query, </a:t>
+            </a:r>
+            <a:r>
+              <a:rPr lang="it-IT" dirty="0" err="1"/>
+              <a:t>leading</a:t>
+            </a:r>
+            <a:r>
+              <a:rPr lang="it-IT" dirty="0"/>
+              <a:t> to an </a:t>
+            </a:r>
+            <a:r>
+              <a:rPr lang="it-IT" dirty="0" err="1"/>
+              <a:t>amplification</a:t>
+            </a:r>
+            <a:r>
+              <a:rPr lang="it-IT" dirty="0"/>
+              <a:t> </a:t>
+            </a:r>
+            <a:r>
+              <a:rPr lang="it-IT" dirty="0" err="1"/>
+              <a:t>effect</a:t>
+            </a:r>
+            <a:r>
+              <a:rPr lang="it-IT" dirty="0"/>
+              <a:t>.</a:t>
+            </a:r>
+          </a:p>
+          <a:p>
+            <a:pPr marL="0" lvl="0" indent="0" algn="l" rtl="0">
+              <a:spcBef>
+                <a:spcPts val="0"/>
+              </a:spcBef>
+              <a:spcAft>
+                <a:spcPts val="0"/>
+              </a:spcAft>
+              <a:buNone/>
+            </a:pPr>
+            <a:endParaRPr lang="it-IT" dirty="0"/>
+          </a:p>
+          <a:p>
+            <a:pPr marL="0" lvl="0" indent="0" algn="l" rtl="0">
+              <a:spcBef>
+                <a:spcPts val="0"/>
+              </a:spcBef>
+              <a:spcAft>
+                <a:spcPts val="0"/>
+              </a:spcAft>
+              <a:buNone/>
+            </a:pPr>
+            <a:r>
+              <a:rPr lang="it-IT" dirty="0"/>
+              <a:t>The </a:t>
+            </a:r>
+            <a:r>
+              <a:rPr lang="it-IT" dirty="0" err="1"/>
+              <a:t>higher</a:t>
+            </a:r>
+            <a:r>
+              <a:rPr lang="it-IT" dirty="0"/>
+              <a:t> the </a:t>
+            </a:r>
+            <a:r>
+              <a:rPr lang="it-IT" dirty="0" err="1"/>
+              <a:t>amplification</a:t>
+            </a:r>
+            <a:r>
+              <a:rPr lang="it-IT" dirty="0"/>
+              <a:t> </a:t>
+            </a:r>
+            <a:r>
+              <a:rPr lang="it-IT" dirty="0" err="1"/>
+              <a:t>factor</a:t>
+            </a:r>
+            <a:r>
+              <a:rPr lang="it-IT" dirty="0"/>
+              <a:t>, the </a:t>
+            </a:r>
+            <a:r>
+              <a:rPr lang="it-IT" dirty="0" err="1"/>
+              <a:t>higher</a:t>
+            </a:r>
+            <a:r>
+              <a:rPr lang="it-IT" dirty="0"/>
+              <a:t> the impact of </a:t>
+            </a:r>
+            <a:r>
+              <a:rPr lang="it-IT" dirty="0" err="1"/>
+              <a:t>this</a:t>
+            </a:r>
+            <a:r>
+              <a:rPr lang="it-IT" dirty="0"/>
+              <a:t> </a:t>
+            </a:r>
+            <a:r>
+              <a:rPr lang="it-IT" dirty="0" err="1"/>
+              <a:t>attack</a:t>
+            </a:r>
+            <a:r>
+              <a:rPr lang="it-IT" dirty="0"/>
+              <a:t>.</a:t>
+            </a:r>
+          </a:p>
+          <a:p>
+            <a:pPr marL="0" lvl="0" indent="0" algn="l" rtl="0">
+              <a:spcBef>
+                <a:spcPts val="0"/>
+              </a:spcBef>
+              <a:spcAft>
+                <a:spcPts val="0"/>
+              </a:spcAft>
+              <a:buNone/>
+            </a:pPr>
+            <a:endParaRPr lang="it-IT" dirty="0"/>
+          </a:p>
+          <a:p>
+            <a:pPr marL="0" lvl="0" indent="0" algn="l" rtl="0">
+              <a:spcBef>
+                <a:spcPts val="0"/>
+              </a:spcBef>
+              <a:spcAft>
+                <a:spcPts val="0"/>
+              </a:spcAft>
+              <a:buNone/>
+            </a:pPr>
+            <a:r>
+              <a:rPr lang="it-IT" dirty="0" err="1"/>
+              <a:t>According</a:t>
+            </a:r>
+            <a:r>
+              <a:rPr lang="it-IT" dirty="0"/>
+              <a:t> to the </a:t>
+            </a:r>
+            <a:r>
+              <a:rPr lang="it-IT" dirty="0" err="1"/>
+              <a:t>already</a:t>
+            </a:r>
+            <a:r>
+              <a:rPr lang="it-IT" dirty="0"/>
+              <a:t> </a:t>
+            </a:r>
+            <a:r>
+              <a:rPr lang="it-IT" dirty="0" err="1"/>
+              <a:t>cited</a:t>
+            </a:r>
+            <a:r>
+              <a:rPr lang="it-IT" dirty="0"/>
+              <a:t> report, DNS </a:t>
+            </a:r>
+            <a:r>
+              <a:rPr lang="it-IT" dirty="0" err="1"/>
+              <a:t>reflection</a:t>
+            </a:r>
+            <a:r>
+              <a:rPr lang="it-IT" dirty="0"/>
+              <a:t> </a:t>
+            </a:r>
+            <a:r>
+              <a:rPr lang="it-IT" dirty="0" err="1"/>
+              <a:t>is</a:t>
+            </a:r>
+            <a:r>
+              <a:rPr lang="it-IT" dirty="0"/>
+              <a:t> the </a:t>
+            </a:r>
+            <a:r>
+              <a:rPr lang="it-IT" dirty="0" err="1"/>
+              <a:t>most</a:t>
+            </a:r>
+            <a:r>
+              <a:rPr lang="it-IT" dirty="0"/>
+              <a:t> </a:t>
+            </a:r>
+            <a:r>
+              <a:rPr lang="it-IT" dirty="0" err="1"/>
+              <a:t>commonly</a:t>
+            </a:r>
+            <a:r>
+              <a:rPr lang="it-IT" dirty="0"/>
+              <a:t> </a:t>
+            </a:r>
+            <a:r>
+              <a:rPr lang="it-IT" dirty="0" err="1"/>
+              <a:t>used</a:t>
+            </a:r>
+            <a:r>
+              <a:rPr lang="it-IT" dirty="0"/>
+              <a:t> </a:t>
+            </a:r>
+            <a:r>
+              <a:rPr lang="it-IT" dirty="0" err="1"/>
+              <a:t>attack</a:t>
+            </a:r>
+            <a:r>
+              <a:rPr lang="it-IT" dirty="0"/>
+              <a:t> </a:t>
+            </a:r>
+            <a:r>
+              <a:rPr lang="it-IT" dirty="0" err="1"/>
+              <a:t>among</a:t>
+            </a:r>
+            <a:r>
+              <a:rPr lang="it-IT" dirty="0"/>
+              <a:t> the </a:t>
+            </a:r>
+            <a:r>
+              <a:rPr lang="it-IT" dirty="0" err="1"/>
+              <a:t>dns-based</a:t>
+            </a:r>
+            <a:r>
+              <a:rPr lang="it-IT" dirty="0"/>
+              <a:t> </a:t>
+            </a:r>
+            <a:r>
+              <a:rPr lang="it-IT" dirty="0" err="1"/>
+              <a:t>ddos</a:t>
+            </a:r>
+            <a:r>
+              <a:rPr lang="it-IT" dirty="0"/>
+              <a:t>, so </a:t>
+            </a:r>
+            <a:r>
+              <a:rPr lang="it-IT" dirty="0" err="1"/>
+              <a:t>we</a:t>
+            </a:r>
+            <a:r>
+              <a:rPr lang="it-IT" dirty="0"/>
+              <a:t> </a:t>
+            </a:r>
+            <a:r>
+              <a:rPr lang="it-IT" dirty="0" err="1"/>
+              <a:t>decided</a:t>
+            </a:r>
+            <a:r>
+              <a:rPr lang="it-IT" dirty="0"/>
+              <a:t> to simulate </a:t>
+            </a:r>
+            <a:r>
+              <a:rPr lang="it-IT" dirty="0" err="1"/>
+              <a:t>it</a:t>
+            </a:r>
+            <a:r>
+              <a:rPr lang="it-IT" dirty="0"/>
+              <a:t>.</a:t>
+            </a:r>
+            <a:endParaRPr dirty="0"/>
           </a:p>
         </p:txBody>
       </p:sp>
     </p:spTree>
     <p:extLst>
       <p:ext uri="{BB962C8B-B14F-4D97-AF65-F5344CB8AC3E}">
-        <p14:creationId xmlns:p14="http://schemas.microsoft.com/office/powerpoint/2010/main" val="4106909393"/>
+        <p14:creationId xmlns:p14="http://schemas.microsoft.com/office/powerpoint/2010/main" val="1260587386"/>
       </p:ext>
     </p:extLst>
   </p:cSld>
@@ -20244,16 +22943,68 @@
               <a:buNone/>
             </a:pPr>
             <a:r>
-              <a:rPr lang="en" sz="6600" dirty="0">
+              <a:rPr lang="en" sz="4800" dirty="0">
+                <a:solidFill>
+                  <a:schemeClr val="tx1"/>
+                </a:solidFill>
+              </a:rPr>
+              <a:t>From</a:t>
+            </a:r>
+            <a:r>
+              <a:rPr lang="en" sz="4800" dirty="0">
                 <a:solidFill>
                   <a:schemeClr val="accent3"/>
                 </a:solidFill>
               </a:rPr>
-              <a:t>DDoS</a:t>
-            </a:r>
-            <a:r>
-              <a:rPr lang="en" sz="6600" dirty="0"/>
-              <a:t> Attack</a:t>
+              <a:t> </a:t>
+            </a:r>
+            <a:r>
+              <a:rPr lang="en" sz="4400" dirty="0">
+                <a:solidFill>
+                  <a:schemeClr val="accent3"/>
+                </a:solidFill>
+              </a:rPr>
+              <a:t>Ripple</a:t>
+            </a:r>
+            <a:r>
+              <a:rPr lang="en" sz="4000" dirty="0">
+                <a:solidFill>
+                  <a:schemeClr val="accent3"/>
+                </a:solidFill>
+              </a:rPr>
+              <a:t>s</a:t>
+            </a:r>
+            <a:r>
+              <a:rPr lang="en" sz="4800" dirty="0">
+                <a:solidFill>
+                  <a:schemeClr val="accent3"/>
+                </a:solidFill>
+              </a:rPr>
+              <a:t> </a:t>
+            </a:r>
+            <a:r>
+              <a:rPr lang="en" sz="4800" dirty="0">
+                <a:solidFill>
+                  <a:schemeClr val="tx1"/>
+                </a:solidFill>
+              </a:rPr>
+              <a:t>to</a:t>
+            </a:r>
+            <a:r>
+              <a:rPr lang="en" sz="4800" dirty="0">
+                <a:solidFill>
+                  <a:schemeClr val="accent3"/>
+                </a:solidFill>
+              </a:rPr>
+              <a:t> </a:t>
+            </a:r>
+            <a:r>
+              <a:rPr lang="en" sz="6000" dirty="0">
+                <a:solidFill>
+                  <a:schemeClr val="accent1"/>
+                </a:solidFill>
+              </a:rPr>
+              <a:t>Waves</a:t>
             </a:r>
             <a:br>
               <a:rPr lang="en" sz="4400" dirty="0"/>
@@ -20262,7 +23013,7 @@
               <a:rPr lang="en" sz="4400" dirty="0"/>
             </a:br>
             <a:r>
-              <a:rPr lang="en" sz="5400" dirty="0">
+              <a:rPr lang="en" sz="4800" dirty="0">
                 <a:solidFill>
                   <a:schemeClr val="tx1"/>
                 </a:solidFill>
@@ -20275,25 +23026,61 @@
                   <a:schemeClr val="accent1"/>
                 </a:solidFill>
               </a:rPr>
-              <a:t> reflection </a:t>
+              <a:t> </a:t>
+            </a:r>
+            <a:r>
+              <a:rPr lang="en" sz="4400" dirty="0">
+                <a:solidFill>
+                  <a:schemeClr val="accent3"/>
+                </a:solidFill>
+              </a:rPr>
+              <a:t>Reflection</a:t>
             </a:r>
             <a:r>
               <a:rPr lang="en" sz="5400" dirty="0">
                 <a:solidFill>
+                  <a:schemeClr val="accent1"/>
+                </a:solidFill>
+              </a:rPr>
+              <a:t> </a:t>
+            </a:r>
+            <a:r>
+              <a:rPr lang="en" sz="4800" dirty="0">
+                <a:solidFill>
                   <a:schemeClr val="tx1"/>
                 </a:solidFill>
               </a:rPr>
-              <a:t>and </a:t>
+              <a:t>and</a:t>
             </a:r>
             <a:r>
               <a:rPr lang="en" sz="5400" dirty="0">
                 <a:solidFill>
+                  <a:schemeClr val="tx1"/>
+                </a:solidFill>
+              </a:rPr>
+              <a:t> </a:t>
+            </a:r>
+            <a:r>
+              <a:rPr lang="en" sz="5400" dirty="0">
+                <a:solidFill>
                   <a:schemeClr val="accent1"/>
                 </a:solidFill>
               </a:rPr>
-              <a:t>amplification</a:t>
-            </a:r>
-            <a:endParaRPr sz="4400" dirty="0"/>
+              <a:t>Amplification </a:t>
+            </a:r>
+            <a:r>
+              <a:rPr lang="en" sz="4800" dirty="0">
+                <a:solidFill>
+                  <a:schemeClr val="tx1"/>
+                </a:solidFill>
+              </a:rPr>
+              <a:t>Attack</a:t>
+            </a:r>
+            <a:endParaRPr sz="4800" dirty="0">
+              <a:solidFill>
+                <a:schemeClr val="tx1"/>
+              </a:solidFill>
+            </a:endParaRPr>
           </a:p>
         </p:txBody>
       </p:sp>
@@ -20356,6 +23143,212 @@
 </file>
 
 <file path=ppt/slides/slide10.xml><?xml version="1.0" encoding="utf-8"?>
+<p:sld xmlns:a="http://schemas.openxmlformats.org/drawingml/2006/main" xmlns:r="http://schemas.openxmlformats.org/officeDocument/2006/relationships" xmlns:p="http://schemas.openxmlformats.org/presentationml/2006/main">
+  <p:cSld>
+    <p:spTree>
+      <p:nvGrpSpPr>
+        <p:cNvPr id="1" name="Shape 456"/>
+        <p:cNvGrpSpPr/>
+        <p:nvPr/>
+      </p:nvGrpSpPr>
+      <p:grpSpPr>
+        <a:xfrm>
+          <a:off x="0" y="0"/>
+          <a:ext cx="0" cy="0"/>
+          <a:chOff x="0" y="0"/>
+          <a:chExt cx="0" cy="0"/>
+        </a:xfrm>
+      </p:grpSpPr>
+      <p:sp>
+        <p:nvSpPr>
+          <p:cNvPr id="457" name="Google Shape;457;p31"/>
+          <p:cNvSpPr txBox="1">
+            <a:spLocks noGrp="1"/>
+          </p:cNvSpPr>
+          <p:nvPr>
+            <p:ph type="body" idx="1"/>
+          </p:nvPr>
+        </p:nvSpPr>
+        <p:spPr>
+          <a:xfrm>
+            <a:off x="1653300" y="4052849"/>
+            <a:ext cx="8894400" cy="1009007"/>
+          </a:xfrm>
+          <a:prstGeom prst="rect">
+            <a:avLst/>
+          </a:prstGeom>
+        </p:spPr>
+        <p:txBody>
+          <a:bodyPr spcFirstLastPara="1" wrap="square" lIns="121900" tIns="121900" rIns="121900" bIns="121900" anchor="t" anchorCtr="0">
+            <a:noAutofit/>
+          </a:bodyPr>
+          <a:lstStyle/>
+          <a:p>
+            <a:pPr marL="0" lvl="0" indent="0" algn="l" rtl="0">
+              <a:spcBef>
+                <a:spcPts val="0"/>
+              </a:spcBef>
+              <a:spcAft>
+                <a:spcPts val="2100"/>
+              </a:spcAft>
+              <a:buNone/>
+            </a:pPr>
+            <a:r>
+              <a:rPr lang="en" sz="2100" dirty="0">
+                <a:solidFill>
+                  <a:schemeClr val="accent3"/>
+                </a:solidFill>
+              </a:rPr>
+              <a:t>&lt;p&gt; </a:t>
+            </a:r>
+            <a:r>
+              <a:rPr lang="en-US" dirty="0"/>
+              <a:t>DNS is vital for the Internet, so protecting it from DDoS attacks is crucial. </a:t>
+            </a:r>
+            <a:r>
+              <a:rPr lang="en" sz="2100" dirty="0">
+                <a:solidFill>
+                  <a:schemeClr val="accent3"/>
+                </a:solidFill>
+              </a:rPr>
+              <a:t>&lt;/p&gt;</a:t>
+            </a:r>
+            <a:endParaRPr dirty="0">
+              <a:solidFill>
+                <a:schemeClr val="accent3"/>
+              </a:solidFill>
+            </a:endParaRPr>
+          </a:p>
+        </p:txBody>
+      </p:sp>
+      <p:sp>
+        <p:nvSpPr>
+          <p:cNvPr id="458" name="Google Shape;458;p31"/>
+          <p:cNvSpPr txBox="1">
+            <a:spLocks noGrp="1"/>
+          </p:cNvSpPr>
+          <p:nvPr>
+            <p:ph type="title"/>
+          </p:nvPr>
+        </p:nvSpPr>
+        <p:spPr>
+          <a:xfrm>
+            <a:off x="3659300" y="2041675"/>
+            <a:ext cx="6730800" cy="1575000"/>
+          </a:xfrm>
+          <a:prstGeom prst="rect">
+            <a:avLst/>
+          </a:prstGeom>
+        </p:spPr>
+        <p:txBody>
+          <a:bodyPr spcFirstLastPara="1" wrap="square" lIns="121900" tIns="121900" rIns="121900" bIns="121900" anchor="t" anchorCtr="0">
+            <a:noAutofit/>
+          </a:bodyPr>
+          <a:lstStyle/>
+          <a:p>
+            <a:pPr marL="0" lvl="0" indent="0" algn="l" rtl="0">
+              <a:spcBef>
+                <a:spcPts val="0"/>
+              </a:spcBef>
+              <a:spcAft>
+                <a:spcPts val="0"/>
+              </a:spcAft>
+              <a:buNone/>
+            </a:pPr>
+            <a:r>
+              <a:rPr lang="en" sz="5800" dirty="0"/>
+              <a:t>Mechanisms for </a:t>
+            </a:r>
+            <a:r>
+              <a:rPr lang="en" sz="6800" dirty="0">
+                <a:solidFill>
+                  <a:schemeClr val="accent3"/>
+                </a:solidFill>
+              </a:rPr>
+              <a:t>MITIGATION </a:t>
+            </a:r>
+            <a:endParaRPr sz="6800" dirty="0">
+              <a:solidFill>
+                <a:schemeClr val="accent3"/>
+              </a:solidFill>
+            </a:endParaRPr>
+          </a:p>
+        </p:txBody>
+      </p:sp>
+      <p:sp>
+        <p:nvSpPr>
+          <p:cNvPr id="459" name="Google Shape;459;p31"/>
+          <p:cNvSpPr/>
+          <p:nvPr/>
+        </p:nvSpPr>
+        <p:spPr>
+          <a:xfrm>
+            <a:off x="1663550" y="2130577"/>
+            <a:ext cx="1858156" cy="1486099"/>
+          </a:xfrm>
+          <a:prstGeom prst="rect">
+            <a:avLst/>
+          </a:prstGeom>
+        </p:spPr>
+        <p:txBody>
+          <a:bodyPr>
+            <a:prstTxWarp prst="textPlain">
+              <a:avLst/>
+            </a:prstTxWarp>
+          </a:bodyPr>
+          <a:lstStyle/>
+          <a:p>
+            <a:pPr lvl="0" algn="ctr"/>
+            <a:r>
+              <a:rPr b="1" i="0" dirty="0">
+                <a:ln>
+                  <a:noFill/>
+                </a:ln>
+                <a:solidFill>
+                  <a:schemeClr val="accent3"/>
+                </a:solidFill>
+                <a:latin typeface="Roboto Mono"/>
+              </a:rPr>
+              <a:t>0</a:t>
+            </a:r>
+            <a:r>
+              <a:rPr lang="it-IT" b="1" i="0" dirty="0">
+                <a:ln>
+                  <a:noFill/>
+                </a:ln>
+                <a:solidFill>
+                  <a:schemeClr val="accent3"/>
+                </a:solidFill>
+                <a:latin typeface="Roboto Mono"/>
+              </a:rPr>
+              <a:t>6</a:t>
+            </a:r>
+            <a:endParaRPr b="1" i="0" dirty="0">
+              <a:ln>
+                <a:noFill/>
+              </a:ln>
+              <a:solidFill>
+                <a:schemeClr val="accent3"/>
+              </a:solidFill>
+              <a:latin typeface="Roboto Mono"/>
+            </a:endParaRPr>
+          </a:p>
+        </p:txBody>
+      </p:sp>
+    </p:spTree>
+    <p:extLst>
+      <p:ext uri="{BB962C8B-B14F-4D97-AF65-F5344CB8AC3E}">
+        <p14:creationId xmlns:p14="http://schemas.microsoft.com/office/powerpoint/2010/main" val="3340018122"/>
+      </p:ext>
+    </p:extLst>
+  </p:cSld>
+  <p:clrMapOvr>
+    <a:masterClrMapping/>
+  </p:clrMapOvr>
+</p:sld>
+</file>
+
+<file path=ppt/slides/slide11.xml><?xml version="1.0" encoding="utf-8"?>
 <p:sld xmlns:a="http://schemas.openxmlformats.org/drawingml/2006/main" xmlns:r="http://schemas.openxmlformats.org/officeDocument/2006/relationships" xmlns:p="http://schemas.openxmlformats.org/presentationml/2006/main">
   <p:cSld>
     <p:spTree>
@@ -21221,7 +24214,7 @@
 </p:sld>
 </file>
 
-<file path=ppt/slides/slide11.xml><?xml version="1.0" encoding="utf-8"?>
+<file path=ppt/slides/slide12.xml><?xml version="1.0" encoding="utf-8"?>
 <p:sld xmlns:a="http://schemas.openxmlformats.org/drawingml/2006/main" xmlns:r="http://schemas.openxmlformats.org/officeDocument/2006/relationships" xmlns:p="http://schemas.openxmlformats.org/presentationml/2006/main">
   <p:cSld>
     <p:spTree>
@@ -22156,7 +25149,7 @@
 </p:sld>
 </file>
 
-<file path=ppt/slides/slide12.xml><?xml version="1.0" encoding="utf-8"?>
+<file path=ppt/slides/slide13.xml><?xml version="1.0" encoding="utf-8"?>
 <p:sld xmlns:a="http://schemas.openxmlformats.org/drawingml/2006/main" xmlns:r="http://schemas.openxmlformats.org/officeDocument/2006/relationships" xmlns:p="http://schemas.openxmlformats.org/presentationml/2006/main">
   <p:cSld>
     <p:spTree>
@@ -23206,7 +26199,7 @@
             </a:pPr>
             <a:r>
               <a:rPr lang="en" dirty="0"/>
-              <a:t>We will talk about this </a:t>
+              <a:t>DDoS attack </a:t>
             </a:r>
             <a:r>
               <a:rPr lang="en" dirty="0">
@@ -23214,11 +26207,23 @@
                   <a:schemeClr val="accent1"/>
                 </a:solidFill>
               </a:rPr>
-              <a:t>first</a:t>
+              <a:t>types</a:t>
             </a:r>
             <a:r>
               <a:rPr lang="en" dirty="0"/>
-              <a:t>.</a:t>
+              <a:t> and </a:t>
+            </a:r>
+            <a:r>
+              <a:rPr lang="en" dirty="0">
+                <a:solidFill>
+                  <a:schemeClr val="accent1"/>
+                </a:solidFill>
+              </a:rPr>
+              <a:t>reasons</a:t>
+            </a:r>
+            <a:r>
+              <a:rPr lang="en" dirty="0"/>
+              <a:t> behind the chosen method.</a:t>
             </a:r>
             <a:endParaRPr dirty="0"/>
           </a:p>
@@ -23421,14 +26426,14 @@
               <a:buNone/>
             </a:pPr>
             <a:r>
-              <a:rPr lang="en">
+              <a:rPr lang="en" dirty="0">
                 <a:solidFill>
                   <a:schemeClr val="accent1"/>
                 </a:solidFill>
               </a:rPr>
               <a:t>01</a:t>
             </a:r>
-            <a:endParaRPr>
+            <a:endParaRPr dirty="0">
               <a:solidFill>
                 <a:schemeClr val="accent1"/>
               </a:solidFill>
@@ -23471,11 +26476,11 @@
               <a:buNone/>
             </a:pPr>
             <a:r>
-              <a:rPr lang="en"/>
+              <a:rPr lang="en" dirty="0"/>
               <a:t>Then, we will talk about </a:t>
             </a:r>
             <a:r>
-              <a:rPr lang="en">
+              <a:rPr lang="en" dirty="0">
                 <a:solidFill>
                   <a:schemeClr val="accent2"/>
                 </a:solidFill>
@@ -23483,10 +26488,10 @@
               <a:t>this</a:t>
             </a:r>
             <a:r>
-              <a:rPr lang="en"/>
+              <a:rPr lang="en" dirty="0"/>
               <a:t>.</a:t>
             </a:r>
-            <a:endParaRPr/>
+            <a:endParaRPr dirty="0"/>
           </a:p>
         </p:txBody>
       </p:sp>
@@ -23939,6 +26944,600 @@
   <p:cSld>
     <p:spTree>
       <p:nvGrpSpPr>
+        <p:cNvPr id="1" name="Shape 495"/>
+        <p:cNvGrpSpPr/>
+        <p:nvPr/>
+      </p:nvGrpSpPr>
+      <p:grpSpPr>
+        <a:xfrm>
+          <a:off x="0" y="0"/>
+          <a:ext cx="0" cy="0"/>
+          <a:chOff x="0" y="0"/>
+          <a:chExt cx="0" cy="0"/>
+        </a:xfrm>
+      </p:grpSpPr>
+      <p:sp>
+        <p:nvSpPr>
+          <p:cNvPr id="496" name="Google Shape;496;p34"/>
+          <p:cNvSpPr/>
+          <p:nvPr/>
+        </p:nvSpPr>
+        <p:spPr>
+          <a:xfrm>
+            <a:off x="316800" y="194225"/>
+            <a:ext cx="11648700" cy="6398100"/>
+          </a:xfrm>
+          <a:prstGeom prst="roundRect">
+            <a:avLst>
+              <a:gd name="adj" fmla="val 2468"/>
+            </a:avLst>
+          </a:prstGeom>
+          <a:solidFill>
+            <a:schemeClr val="lt2"/>
+          </a:solidFill>
+          <a:ln>
+            <a:noFill/>
+          </a:ln>
+          <a:effectLst>
+            <a:outerShdw blurRad="63500" sx="102000" sy="102000" algn="ctr" rotWithShape="0">
+              <a:srgbClr val="000000">
+                <a:alpha val="9800"/>
+              </a:srgbClr>
+            </a:outerShdw>
+          </a:effectLst>
+        </p:spPr>
+        <p:txBody>
+          <a:bodyPr spcFirstLastPara="1" wrap="square" lIns="91425" tIns="45700" rIns="91425" bIns="45700" anchor="ctr" anchorCtr="0">
+            <a:noAutofit/>
+          </a:bodyPr>
+          <a:lstStyle/>
+          <a:p>
+            <a:pPr marL="0" marR="0" lvl="0" indent="0" algn="ctr" rtl="0">
+              <a:spcBef>
+                <a:spcPts val="0"/>
+              </a:spcBef>
+              <a:spcAft>
+                <a:spcPts val="0"/>
+              </a:spcAft>
+              <a:buNone/>
+            </a:pPr>
+            <a:endParaRPr sz="1800" b="0" i="0" u="none" strike="noStrike" cap="none">
+              <a:solidFill>
+                <a:srgbClr val="FFFFFF"/>
+              </a:solidFill>
+              <a:latin typeface="Calibri"/>
+              <a:ea typeface="Calibri"/>
+              <a:cs typeface="Calibri"/>
+              <a:sym typeface="Calibri"/>
+            </a:endParaRPr>
+          </a:p>
+        </p:txBody>
+      </p:sp>
+      <p:pic>
+        <p:nvPicPr>
+          <p:cNvPr id="497" name="Google Shape;497;p34"/>
+          <p:cNvPicPr preferRelativeResize="0"/>
+          <p:nvPr/>
+        </p:nvPicPr>
+        <p:blipFill>
+          <a:blip r:embed="rId3"/>
+          <a:srcRect t="12422" b="12422"/>
+          <a:stretch/>
+        </p:blipFill>
+        <p:spPr>
+          <a:xfrm>
+            <a:off x="550225" y="802978"/>
+            <a:ext cx="5790000" cy="4351500"/>
+          </a:xfrm>
+          <a:prstGeom prst="roundRect">
+            <a:avLst>
+              <a:gd name="adj" fmla="val 3224"/>
+            </a:avLst>
+          </a:prstGeom>
+          <a:noFill/>
+          <a:ln>
+            <a:noFill/>
+          </a:ln>
+          <a:effectLst>
+            <a:outerShdw blurRad="63500" sx="102000" sy="102000" algn="ctr" rotWithShape="0">
+              <a:srgbClr val="000000">
+                <a:alpha val="9800"/>
+              </a:srgbClr>
+            </a:outerShdw>
+          </a:effectLst>
+        </p:spPr>
+      </p:pic>
+      <p:sp>
+        <p:nvSpPr>
+          <p:cNvPr id="498" name="Google Shape;498;p34"/>
+          <p:cNvSpPr txBox="1">
+            <a:spLocks noGrp="1"/>
+          </p:cNvSpPr>
+          <p:nvPr>
+            <p:ph type="title" idx="4294967295"/>
+          </p:nvPr>
+        </p:nvSpPr>
+        <p:spPr>
+          <a:xfrm>
+            <a:off x="6591400" y="802975"/>
+            <a:ext cx="5374200" cy="4351500"/>
+          </a:xfrm>
+          <a:prstGeom prst="rect">
+            <a:avLst/>
+          </a:prstGeom>
+        </p:spPr>
+        <p:txBody>
+          <a:bodyPr spcFirstLastPara="1" wrap="square" lIns="121900" tIns="121900" rIns="121900" bIns="121900" anchor="ctr" anchorCtr="0">
+            <a:noAutofit/>
+          </a:bodyPr>
+          <a:lstStyle/>
+          <a:p>
+            <a:pPr marL="0" lvl="0" indent="0" algn="l" rtl="0">
+              <a:spcBef>
+                <a:spcPts val="0"/>
+              </a:spcBef>
+              <a:spcAft>
+                <a:spcPts val="0"/>
+              </a:spcAft>
+              <a:buNone/>
+            </a:pPr>
+            <a:r>
+              <a:rPr lang="it-IT" sz="5400" dirty="0"/>
+              <a:t>THERE IS </a:t>
+            </a:r>
+            <a:r>
+              <a:rPr lang="it-IT" sz="6000" dirty="0">
+                <a:solidFill>
+                  <a:schemeClr val="accent3"/>
+                </a:solidFill>
+              </a:rPr>
+              <a:t>PLENTY</a:t>
+            </a:r>
+            <a:r>
+              <a:rPr lang="it-IT" sz="6500" dirty="0"/>
+              <a:t> </a:t>
+            </a:r>
+            <a:r>
+              <a:rPr lang="it-IT" sz="6000" dirty="0"/>
+              <a:t>OF DDOS </a:t>
+            </a:r>
+            <a:br>
+              <a:rPr lang="it-IT" sz="6000" dirty="0"/>
+            </a:br>
+            <a:r>
+              <a:rPr lang="it-IT" sz="6000" dirty="0"/>
+              <a:t>ATTACK </a:t>
+            </a:r>
+            <a:r>
+              <a:rPr lang="it-IT" sz="6000" dirty="0">
+                <a:solidFill>
+                  <a:schemeClr val="accent3"/>
+                </a:solidFill>
+              </a:rPr>
+              <a:t>TYPES</a:t>
+            </a:r>
+          </a:p>
+        </p:txBody>
+      </p:sp>
+      <p:sp>
+        <p:nvSpPr>
+          <p:cNvPr id="499" name="Google Shape;499;p34"/>
+          <p:cNvSpPr txBox="1">
+            <a:spLocks noGrp="1"/>
+          </p:cNvSpPr>
+          <p:nvPr>
+            <p:ph type="body" idx="4294967295"/>
+          </p:nvPr>
+        </p:nvSpPr>
+        <p:spPr>
+          <a:xfrm>
+            <a:off x="413996" y="5088835"/>
+            <a:ext cx="11129100" cy="1227365"/>
+          </a:xfrm>
+          <a:prstGeom prst="rect">
+            <a:avLst/>
+          </a:prstGeom>
+        </p:spPr>
+        <p:txBody>
+          <a:bodyPr spcFirstLastPara="1" wrap="square" lIns="121900" tIns="121900" rIns="121900" bIns="121900" anchor="t" anchorCtr="0">
+            <a:noAutofit/>
+          </a:bodyPr>
+          <a:lstStyle/>
+          <a:p>
+            <a:pPr marL="0" lvl="0" indent="0" algn="l" rtl="0">
+              <a:spcBef>
+                <a:spcPts val="2100"/>
+              </a:spcBef>
+              <a:spcAft>
+                <a:spcPts val="0"/>
+              </a:spcAft>
+              <a:buNone/>
+            </a:pPr>
+            <a:r>
+              <a:rPr lang="en-US" sz="2000" dirty="0"/>
+              <a:t>Our interest was in experimenting with a </a:t>
+            </a:r>
+            <a:r>
+              <a:rPr lang="en-US" sz="2000" dirty="0">
+                <a:solidFill>
+                  <a:schemeClr val="accent1"/>
+                </a:solidFill>
+                <a:latin typeface="Roboto Mono" pitchFamily="49" charset="0"/>
+                <a:ea typeface="Roboto Mono" pitchFamily="49" charset="0"/>
+                <a:cs typeface="Roboto"/>
+                <a:sym typeface="Roboto"/>
+              </a:rPr>
+              <a:t>commonly employed</a:t>
+            </a:r>
+            <a:r>
+              <a:rPr lang="en-US" sz="2000" dirty="0"/>
+              <a:t> approach in real-world scenarios, as </a:t>
+            </a:r>
+            <a:r>
+              <a:rPr lang="en-US" sz="2000" dirty="0">
+                <a:solidFill>
+                  <a:schemeClr val="accent3"/>
+                </a:solidFill>
+                <a:latin typeface="Roboto Mono" pitchFamily="49" charset="0"/>
+                <a:ea typeface="Roboto Mono" pitchFamily="49" charset="0"/>
+                <a:cs typeface="Roboto"/>
+                <a:sym typeface="Roboto"/>
+              </a:rPr>
+              <a:t>opposed</a:t>
+            </a:r>
+            <a:r>
+              <a:rPr lang="en-US" sz="2000" dirty="0"/>
+              <a:t> to </a:t>
+            </a:r>
+            <a:r>
+              <a:rPr lang="en-US" sz="2000" dirty="0">
+                <a:solidFill>
+                  <a:schemeClr val="accent3"/>
+                </a:solidFill>
+                <a:latin typeface="Roboto Mono" pitchFamily="49" charset="0"/>
+                <a:ea typeface="Roboto Mono" pitchFamily="49" charset="0"/>
+                <a:cs typeface="Roboto"/>
+              </a:rPr>
+              <a:t>sporadic</a:t>
+            </a:r>
+            <a:r>
+              <a:rPr lang="en-US" sz="2000" dirty="0"/>
+              <a:t> cases.</a:t>
+            </a:r>
+          </a:p>
+        </p:txBody>
+      </p:sp>
+      <p:grpSp>
+        <p:nvGrpSpPr>
+          <p:cNvPr id="500" name="Google Shape;500;p34"/>
+          <p:cNvGrpSpPr/>
+          <p:nvPr/>
+        </p:nvGrpSpPr>
+        <p:grpSpPr>
+          <a:xfrm>
+            <a:off x="704646" y="902484"/>
+            <a:ext cx="635280" cy="147600"/>
+            <a:chOff x="2147366" y="4139382"/>
+            <a:chExt cx="635280" cy="147600"/>
+          </a:xfrm>
+        </p:grpSpPr>
+        <p:sp>
+          <p:nvSpPr>
+            <p:cNvPr id="501" name="Google Shape;501;p34"/>
+            <p:cNvSpPr/>
+            <p:nvPr/>
+          </p:nvSpPr>
+          <p:spPr>
+            <a:xfrm>
+              <a:off x="2147366" y="4139382"/>
+              <a:ext cx="147600" cy="147600"/>
+            </a:xfrm>
+            <a:prstGeom prst="ellipse">
+              <a:avLst/>
+            </a:prstGeom>
+            <a:solidFill>
+              <a:schemeClr val="accent4"/>
+            </a:solidFill>
+            <a:ln>
+              <a:noFill/>
+            </a:ln>
+          </p:spPr>
+          <p:txBody>
+            <a:bodyPr spcFirstLastPara="1" wrap="square" lIns="91425" tIns="45700" rIns="91425" bIns="45700" anchor="ctr" anchorCtr="0">
+              <a:noAutofit/>
+            </a:bodyPr>
+            <a:lstStyle/>
+            <a:p>
+              <a:pPr marL="0" marR="0" lvl="0" indent="0" algn="ctr" rtl="0">
+                <a:spcBef>
+                  <a:spcPts val="0"/>
+                </a:spcBef>
+                <a:spcAft>
+                  <a:spcPts val="0"/>
+                </a:spcAft>
+                <a:buNone/>
+              </a:pPr>
+              <a:endParaRPr sz="1800" b="0" i="0" u="none" strike="noStrike" cap="none">
+                <a:solidFill>
+                  <a:srgbClr val="FFFFFF"/>
+                </a:solidFill>
+                <a:latin typeface="Calibri"/>
+                <a:ea typeface="Calibri"/>
+                <a:cs typeface="Calibri"/>
+                <a:sym typeface="Calibri"/>
+              </a:endParaRPr>
+            </a:p>
+          </p:txBody>
+        </p:sp>
+        <p:sp>
+          <p:nvSpPr>
+            <p:cNvPr id="502" name="Google Shape;502;p34"/>
+            <p:cNvSpPr/>
+            <p:nvPr/>
+          </p:nvSpPr>
+          <p:spPr>
+            <a:xfrm>
+              <a:off x="2391206" y="4139382"/>
+              <a:ext cx="147600" cy="147600"/>
+            </a:xfrm>
+            <a:prstGeom prst="ellipse">
+              <a:avLst/>
+            </a:prstGeom>
+            <a:solidFill>
+              <a:schemeClr val="accent5"/>
+            </a:solidFill>
+            <a:ln>
+              <a:noFill/>
+            </a:ln>
+          </p:spPr>
+          <p:txBody>
+            <a:bodyPr spcFirstLastPara="1" wrap="square" lIns="91425" tIns="45700" rIns="91425" bIns="45700" anchor="ctr" anchorCtr="0">
+              <a:noAutofit/>
+            </a:bodyPr>
+            <a:lstStyle/>
+            <a:p>
+              <a:pPr marL="0" marR="0" lvl="0" indent="0" algn="ctr" rtl="0">
+                <a:spcBef>
+                  <a:spcPts val="0"/>
+                </a:spcBef>
+                <a:spcAft>
+                  <a:spcPts val="0"/>
+                </a:spcAft>
+                <a:buNone/>
+              </a:pPr>
+              <a:endParaRPr sz="1800" b="0" i="0" u="none" strike="noStrike" cap="none">
+                <a:solidFill>
+                  <a:srgbClr val="FFFFFF"/>
+                </a:solidFill>
+                <a:latin typeface="Calibri"/>
+                <a:ea typeface="Calibri"/>
+                <a:cs typeface="Calibri"/>
+                <a:sym typeface="Calibri"/>
+              </a:endParaRPr>
+            </a:p>
+          </p:txBody>
+        </p:sp>
+        <p:sp>
+          <p:nvSpPr>
+            <p:cNvPr id="503" name="Google Shape;503;p34"/>
+            <p:cNvSpPr/>
+            <p:nvPr/>
+          </p:nvSpPr>
+          <p:spPr>
+            <a:xfrm>
+              <a:off x="2635046" y="4139382"/>
+              <a:ext cx="147600" cy="147600"/>
+            </a:xfrm>
+            <a:prstGeom prst="ellipse">
+              <a:avLst/>
+            </a:prstGeom>
+            <a:solidFill>
+              <a:schemeClr val="accent6"/>
+            </a:solidFill>
+            <a:ln>
+              <a:noFill/>
+            </a:ln>
+          </p:spPr>
+          <p:txBody>
+            <a:bodyPr spcFirstLastPara="1" wrap="square" lIns="91425" tIns="45700" rIns="91425" bIns="45700" anchor="ctr" anchorCtr="0">
+              <a:noAutofit/>
+            </a:bodyPr>
+            <a:lstStyle/>
+            <a:p>
+              <a:pPr marL="0" marR="0" lvl="0" indent="0" algn="ctr" rtl="0">
+                <a:spcBef>
+                  <a:spcPts val="0"/>
+                </a:spcBef>
+                <a:spcAft>
+                  <a:spcPts val="0"/>
+                </a:spcAft>
+                <a:buNone/>
+              </a:pPr>
+              <a:endParaRPr sz="1800" b="0" i="0" u="none" strike="noStrike" cap="none">
+                <a:solidFill>
+                  <a:srgbClr val="FFFFFF"/>
+                </a:solidFill>
+                <a:latin typeface="Calibri"/>
+                <a:ea typeface="Calibri"/>
+                <a:cs typeface="Calibri"/>
+                <a:sym typeface="Calibri"/>
+              </a:endParaRPr>
+            </a:p>
+          </p:txBody>
+        </p:sp>
+      </p:grpSp>
+      <p:grpSp>
+        <p:nvGrpSpPr>
+          <p:cNvPr id="504" name="Google Shape;504;p34"/>
+          <p:cNvGrpSpPr/>
+          <p:nvPr/>
+        </p:nvGrpSpPr>
+        <p:grpSpPr>
+          <a:xfrm>
+            <a:off x="413996" y="309734"/>
+            <a:ext cx="635280" cy="147600"/>
+            <a:chOff x="2147366" y="4139382"/>
+            <a:chExt cx="635280" cy="147600"/>
+          </a:xfrm>
+        </p:grpSpPr>
+        <p:sp>
+          <p:nvSpPr>
+            <p:cNvPr id="505" name="Google Shape;505;p34"/>
+            <p:cNvSpPr/>
+            <p:nvPr/>
+          </p:nvSpPr>
+          <p:spPr>
+            <a:xfrm>
+              <a:off x="2147366" y="4139382"/>
+              <a:ext cx="147600" cy="147600"/>
+            </a:xfrm>
+            <a:prstGeom prst="ellipse">
+              <a:avLst/>
+            </a:prstGeom>
+            <a:solidFill>
+              <a:schemeClr val="accent4"/>
+            </a:solidFill>
+            <a:ln>
+              <a:noFill/>
+            </a:ln>
+          </p:spPr>
+          <p:txBody>
+            <a:bodyPr spcFirstLastPara="1" wrap="square" lIns="91425" tIns="45700" rIns="91425" bIns="45700" anchor="ctr" anchorCtr="0">
+              <a:noAutofit/>
+            </a:bodyPr>
+            <a:lstStyle/>
+            <a:p>
+              <a:pPr marL="0" marR="0" lvl="0" indent="0" algn="ctr" rtl="0">
+                <a:spcBef>
+                  <a:spcPts val="0"/>
+                </a:spcBef>
+                <a:spcAft>
+                  <a:spcPts val="0"/>
+                </a:spcAft>
+                <a:buNone/>
+              </a:pPr>
+              <a:endParaRPr sz="1800" b="0" i="0" u="none" strike="noStrike" cap="none">
+                <a:solidFill>
+                  <a:srgbClr val="FFFFFF"/>
+                </a:solidFill>
+                <a:latin typeface="Calibri"/>
+                <a:ea typeface="Calibri"/>
+                <a:cs typeface="Calibri"/>
+                <a:sym typeface="Calibri"/>
+              </a:endParaRPr>
+            </a:p>
+          </p:txBody>
+        </p:sp>
+        <p:sp>
+          <p:nvSpPr>
+            <p:cNvPr id="506" name="Google Shape;506;p34"/>
+            <p:cNvSpPr/>
+            <p:nvPr/>
+          </p:nvSpPr>
+          <p:spPr>
+            <a:xfrm>
+              <a:off x="2391206" y="4139382"/>
+              <a:ext cx="147600" cy="147600"/>
+            </a:xfrm>
+            <a:prstGeom prst="ellipse">
+              <a:avLst/>
+            </a:prstGeom>
+            <a:solidFill>
+              <a:schemeClr val="accent5"/>
+            </a:solidFill>
+            <a:ln>
+              <a:noFill/>
+            </a:ln>
+          </p:spPr>
+          <p:txBody>
+            <a:bodyPr spcFirstLastPara="1" wrap="square" lIns="91425" tIns="45700" rIns="91425" bIns="45700" anchor="ctr" anchorCtr="0">
+              <a:noAutofit/>
+            </a:bodyPr>
+            <a:lstStyle/>
+            <a:p>
+              <a:pPr marL="0" marR="0" lvl="0" indent="0" algn="ctr" rtl="0">
+                <a:spcBef>
+                  <a:spcPts val="0"/>
+                </a:spcBef>
+                <a:spcAft>
+                  <a:spcPts val="0"/>
+                </a:spcAft>
+                <a:buNone/>
+              </a:pPr>
+              <a:endParaRPr sz="1800" b="0" i="0" u="none" strike="noStrike" cap="none">
+                <a:solidFill>
+                  <a:srgbClr val="FFFFFF"/>
+                </a:solidFill>
+                <a:latin typeface="Calibri"/>
+                <a:ea typeface="Calibri"/>
+                <a:cs typeface="Calibri"/>
+                <a:sym typeface="Calibri"/>
+              </a:endParaRPr>
+            </a:p>
+          </p:txBody>
+        </p:sp>
+        <p:sp>
+          <p:nvSpPr>
+            <p:cNvPr id="507" name="Google Shape;507;p34"/>
+            <p:cNvSpPr/>
+            <p:nvPr/>
+          </p:nvSpPr>
+          <p:spPr>
+            <a:xfrm>
+              <a:off x="2635046" y="4139382"/>
+              <a:ext cx="147600" cy="147600"/>
+            </a:xfrm>
+            <a:prstGeom prst="ellipse">
+              <a:avLst/>
+            </a:prstGeom>
+            <a:solidFill>
+              <a:schemeClr val="accent6"/>
+            </a:solidFill>
+            <a:ln>
+              <a:noFill/>
+            </a:ln>
+          </p:spPr>
+          <p:txBody>
+            <a:bodyPr spcFirstLastPara="1" wrap="square" lIns="91425" tIns="45700" rIns="91425" bIns="45700" anchor="ctr" anchorCtr="0">
+              <a:noAutofit/>
+            </a:bodyPr>
+            <a:lstStyle/>
+            <a:p>
+              <a:pPr marL="0" marR="0" lvl="0" indent="0" algn="ctr" rtl="0">
+                <a:spcBef>
+                  <a:spcPts val="0"/>
+                </a:spcBef>
+                <a:spcAft>
+                  <a:spcPts val="0"/>
+                </a:spcAft>
+                <a:buNone/>
+              </a:pPr>
+              <a:endParaRPr sz="1800" b="0" i="0" u="none" strike="noStrike" cap="none">
+                <a:solidFill>
+                  <a:srgbClr val="FFFFFF"/>
+                </a:solidFill>
+                <a:latin typeface="Calibri"/>
+                <a:ea typeface="Calibri"/>
+                <a:cs typeface="Calibri"/>
+                <a:sym typeface="Calibri"/>
+              </a:endParaRPr>
+            </a:p>
+          </p:txBody>
+        </p:sp>
+      </p:grpSp>
+    </p:spTree>
+  </p:cSld>
+  <p:clrMapOvr>
+    <a:masterClrMapping/>
+  </p:clrMapOvr>
+</p:sld>
+</file>
+
+<file path=ppt/slides/slide5.xml><?xml version="1.0" encoding="utf-8"?>
+<p:sld xmlns:a="http://schemas.openxmlformats.org/drawingml/2006/main" xmlns:r="http://schemas.openxmlformats.org/officeDocument/2006/relationships" xmlns:p="http://schemas.openxmlformats.org/presentationml/2006/main">
+  <p:cSld>
+    <p:spTree>
+      <p:nvGrpSpPr>
         <p:cNvPr id="1" name="Shape 479"/>
         <p:cNvGrpSpPr/>
         <p:nvPr/>
@@ -23959,7 +27558,7 @@
         </p:nvSpPr>
         <p:spPr>
           <a:xfrm>
-            <a:off x="627600" y="868575"/>
+            <a:off x="683259" y="846216"/>
             <a:ext cx="7272300" cy="5033100"/>
           </a:xfrm>
           <a:prstGeom prst="roundRect">
@@ -24436,7 +28035,7 @@
         </p:nvSpPr>
         <p:spPr>
           <a:xfrm>
-            <a:off x="1455197" y="2946099"/>
+            <a:off x="1290435" y="2947998"/>
             <a:ext cx="3746557" cy="612334"/>
           </a:xfrm>
           <a:prstGeom prst="rect">
@@ -24761,7 +28360,7 @@
         </p:nvSpPr>
         <p:spPr>
           <a:xfrm>
-            <a:off x="1486603" y="3558432"/>
+            <a:off x="1321841" y="3560331"/>
             <a:ext cx="3746557" cy="2218835"/>
           </a:xfrm>
           <a:prstGeom prst="rect">
@@ -25481,7 +29080,7 @@
 </p:sld>
 </file>
 
-<file path=ppt/slides/slide5.xml><?xml version="1.0" encoding="utf-8"?>
+<file path=ppt/slides/slide6.xml><?xml version="1.0" encoding="utf-8"?>
 <p:sld xmlns:a="http://schemas.openxmlformats.org/drawingml/2006/main" xmlns:r="http://schemas.openxmlformats.org/officeDocument/2006/relationships" xmlns:p="http://schemas.openxmlformats.org/presentationml/2006/main">
   <p:cSld>
     <p:spTree>
@@ -26595,7 +30194,7 @@
 </p:sld>
 </file>
 
-<file path=ppt/slides/slide6.xml><?xml version="1.0" encoding="utf-8"?>
+<file path=ppt/slides/slide7.xml><?xml version="1.0" encoding="utf-8"?>
 <p:sld xmlns:a="http://schemas.openxmlformats.org/drawingml/2006/main" xmlns:r="http://schemas.openxmlformats.org/officeDocument/2006/relationships" xmlns:p="http://schemas.openxmlformats.org/presentationml/2006/main">
   <p:cSld>
     <p:spTree>
@@ -27597,7 +31196,7 @@
 </p:sld>
 </file>
 
-<file path=ppt/slides/slide7.xml><?xml version="1.0" encoding="utf-8"?>
+<file path=ppt/slides/slide8.xml><?xml version="1.0" encoding="utf-8"?>
 <p:sld xmlns:a="http://schemas.openxmlformats.org/drawingml/2006/main" xmlns:r="http://schemas.openxmlformats.org/officeDocument/2006/relationships" xmlns:p="http://schemas.openxmlformats.org/presentationml/2006/main">
   <p:cSld>
     <p:spTree>
@@ -28591,7 +32190,7 @@
 </p:sld>
 </file>
 
-<file path=ppt/slides/slide8.xml><?xml version="1.0" encoding="utf-8"?>
+<file path=ppt/slides/slide9.xml><?xml version="1.0" encoding="utf-8"?>
 <p:sld xmlns:a="http://schemas.openxmlformats.org/drawingml/2006/main" xmlns:r="http://schemas.openxmlformats.org/officeDocument/2006/relationships" xmlns:p="http://schemas.openxmlformats.org/presentationml/2006/main">
   <p:cSld>
     <p:spTree>
@@ -29328,7 +32927,7 @@
         <p:spPr>
           <a:xfrm>
             <a:off x="1000319" y="4185839"/>
-            <a:ext cx="9556101" cy="717900"/>
+            <a:ext cx="9727550" cy="717900"/>
           </a:xfrm>
           <a:prstGeom prst="rect">
             <a:avLst/>
@@ -29596,7 +33195,7 @@
             </a:r>
             <a:r>
               <a:rPr lang="en-US" b="0" dirty="0"/>
-              <a:t>Spoofing IP (not difficult with UDP protocol)</a:t>
+              <a:t>Spoofing IP (not difficult with UDP protocol) + ANY</a:t>
             </a:r>
           </a:p>
         </p:txBody>
@@ -29651,212 +33250,6 @@
     <p:extLst>
       <p:ext uri="{BB962C8B-B14F-4D97-AF65-F5344CB8AC3E}">
         <p14:creationId xmlns:p14="http://schemas.microsoft.com/office/powerpoint/2010/main" val="2331663007"/>
-      </p:ext>
-    </p:extLst>
-  </p:cSld>
-  <p:clrMapOvr>
-    <a:masterClrMapping/>
-  </p:clrMapOvr>
-</p:sld>
-</file>
-
-<file path=ppt/slides/slide9.xml><?xml version="1.0" encoding="utf-8"?>
-<p:sld xmlns:a="http://schemas.openxmlformats.org/drawingml/2006/main" xmlns:r="http://schemas.openxmlformats.org/officeDocument/2006/relationships" xmlns:p="http://schemas.openxmlformats.org/presentationml/2006/main">
-  <p:cSld>
-    <p:spTree>
-      <p:nvGrpSpPr>
-        <p:cNvPr id="1" name="Shape 456"/>
-        <p:cNvGrpSpPr/>
-        <p:nvPr/>
-      </p:nvGrpSpPr>
-      <p:grpSpPr>
-        <a:xfrm>
-          <a:off x="0" y="0"/>
-          <a:ext cx="0" cy="0"/>
-          <a:chOff x="0" y="0"/>
-          <a:chExt cx="0" cy="0"/>
-        </a:xfrm>
-      </p:grpSpPr>
-      <p:sp>
-        <p:nvSpPr>
-          <p:cNvPr id="457" name="Google Shape;457;p31"/>
-          <p:cNvSpPr txBox="1">
-            <a:spLocks noGrp="1"/>
-          </p:cNvSpPr>
-          <p:nvPr>
-            <p:ph type="body" idx="1"/>
-          </p:nvPr>
-        </p:nvSpPr>
-        <p:spPr>
-          <a:xfrm>
-            <a:off x="1653300" y="4052849"/>
-            <a:ext cx="8894400" cy="1009007"/>
-          </a:xfrm>
-          <a:prstGeom prst="rect">
-            <a:avLst/>
-          </a:prstGeom>
-        </p:spPr>
-        <p:txBody>
-          <a:bodyPr spcFirstLastPara="1" wrap="square" lIns="121900" tIns="121900" rIns="121900" bIns="121900" anchor="t" anchorCtr="0">
-            <a:noAutofit/>
-          </a:bodyPr>
-          <a:lstStyle/>
-          <a:p>
-            <a:pPr marL="0" lvl="0" indent="0" algn="l" rtl="0">
-              <a:spcBef>
-                <a:spcPts val="0"/>
-              </a:spcBef>
-              <a:spcAft>
-                <a:spcPts val="2100"/>
-              </a:spcAft>
-              <a:buNone/>
-            </a:pPr>
-            <a:r>
-              <a:rPr lang="en" sz="2100" dirty="0">
-                <a:solidFill>
-                  <a:schemeClr val="accent3"/>
-                </a:solidFill>
-              </a:rPr>
-              <a:t>&lt;p&gt; </a:t>
-            </a:r>
-            <a:r>
-              <a:rPr lang="en-US" dirty="0"/>
-              <a:t>DNS is vital for the Internet, so protecting it from DDoS attacks is crucial. </a:t>
-            </a:r>
-            <a:r>
-              <a:rPr lang="en" sz="2100" dirty="0">
-                <a:solidFill>
-                  <a:schemeClr val="accent3"/>
-                </a:solidFill>
-              </a:rPr>
-              <a:t>&lt;/p&gt;</a:t>
-            </a:r>
-            <a:endParaRPr dirty="0">
-              <a:solidFill>
-                <a:schemeClr val="accent3"/>
-              </a:solidFill>
-            </a:endParaRPr>
-          </a:p>
-        </p:txBody>
-      </p:sp>
-      <p:sp>
-        <p:nvSpPr>
-          <p:cNvPr id="458" name="Google Shape;458;p31"/>
-          <p:cNvSpPr txBox="1">
-            <a:spLocks noGrp="1"/>
-          </p:cNvSpPr>
-          <p:nvPr>
-            <p:ph type="title"/>
-          </p:nvPr>
-        </p:nvSpPr>
-        <p:spPr>
-          <a:xfrm>
-            <a:off x="3659300" y="2041675"/>
-            <a:ext cx="6730800" cy="1575000"/>
-          </a:xfrm>
-          <a:prstGeom prst="rect">
-            <a:avLst/>
-          </a:prstGeom>
-        </p:spPr>
-        <p:txBody>
-          <a:bodyPr spcFirstLastPara="1" wrap="square" lIns="121900" tIns="121900" rIns="121900" bIns="121900" anchor="t" anchorCtr="0">
-            <a:noAutofit/>
-          </a:bodyPr>
-          <a:lstStyle/>
-          <a:p>
-            <a:pPr marL="0" lvl="0" indent="0" algn="l" rtl="0">
-              <a:spcBef>
-                <a:spcPts val="0"/>
-              </a:spcBef>
-              <a:spcAft>
-                <a:spcPts val="0"/>
-              </a:spcAft>
-              <a:buNone/>
-            </a:pPr>
-            <a:r>
-              <a:rPr lang="en" sz="5800" dirty="0"/>
-              <a:t>Mechanisms for </a:t>
-            </a:r>
-            <a:r>
-              <a:rPr lang="en" sz="6800" dirty="0">
-                <a:solidFill>
-                  <a:schemeClr val="accent3"/>
-                </a:solidFill>
-              </a:rPr>
-              <a:t>MITIGATION </a:t>
-            </a:r>
-            <a:endParaRPr sz="6800" dirty="0">
-              <a:solidFill>
-                <a:schemeClr val="accent3"/>
-              </a:solidFill>
-            </a:endParaRPr>
-          </a:p>
-        </p:txBody>
-      </p:sp>
-      <p:sp>
-        <p:nvSpPr>
-          <p:cNvPr id="459" name="Google Shape;459;p31"/>
-          <p:cNvSpPr/>
-          <p:nvPr/>
-        </p:nvSpPr>
-        <p:spPr>
-          <a:xfrm>
-            <a:off x="1663550" y="2130577"/>
-            <a:ext cx="1858156" cy="1486099"/>
-          </a:xfrm>
-          <a:prstGeom prst="rect">
-            <a:avLst/>
-          </a:prstGeom>
-        </p:spPr>
-        <p:txBody>
-          <a:bodyPr>
-            <a:prstTxWarp prst="textPlain">
-              <a:avLst/>
-            </a:prstTxWarp>
-          </a:bodyPr>
-          <a:lstStyle/>
-          <a:p>
-            <a:pPr lvl="0" algn="ctr"/>
-            <a:r>
-              <a:rPr b="1" i="0" dirty="0">
-                <a:ln>
-                  <a:noFill/>
-                </a:ln>
-                <a:solidFill>
-                  <a:schemeClr val="accent3"/>
-                </a:solidFill>
-                <a:latin typeface="Roboto Mono"/>
-              </a:rPr>
-              <a:t>0</a:t>
-            </a:r>
-            <a:r>
-              <a:rPr lang="it-IT" b="1" i="0" dirty="0">
-                <a:ln>
-                  <a:noFill/>
-                </a:ln>
-                <a:solidFill>
-                  <a:schemeClr val="accent3"/>
-                </a:solidFill>
-                <a:latin typeface="Roboto Mono"/>
-              </a:rPr>
-              <a:t>6</a:t>
-            </a:r>
-            <a:endParaRPr b="1" i="0" dirty="0">
-              <a:ln>
-                <a:noFill/>
-              </a:ln>
-              <a:solidFill>
-                <a:schemeClr val="accent3"/>
-              </a:solidFill>
-              <a:latin typeface="Roboto Mono"/>
-            </a:endParaRPr>
-          </a:p>
-        </p:txBody>
-      </p:sp>
-    </p:spTree>
-    <p:extLst>
-      <p:ext uri="{BB962C8B-B14F-4D97-AF65-F5344CB8AC3E}">
-        <p14:creationId xmlns:p14="http://schemas.microsoft.com/office/powerpoint/2010/main" val="3340018122"/>
       </p:ext>
     </p:extLst>
   </p:cSld>

</xml_diff>